<commit_message>
Update movie studio project presentation
</commit_message>
<xml_diff>
--- a/movie studio project.pptx
+++ b/movie studio project.pptx
@@ -8,26 +8,33 @@
     <p:sldId id="256" r:id="rId2"/>
     <p:sldId id="258" r:id="rId3"/>
     <p:sldId id="257" r:id="rId4"/>
-    <p:sldId id="259" r:id="rId5"/>
-    <p:sldId id="260" r:id="rId6"/>
-    <p:sldId id="266" r:id="rId7"/>
-    <p:sldId id="262" r:id="rId8"/>
-    <p:sldId id="263" r:id="rId9"/>
-    <p:sldId id="264" r:id="rId10"/>
-    <p:sldId id="265" r:id="rId11"/>
-    <p:sldId id="267" r:id="rId12"/>
-    <p:sldId id="268" r:id="rId13"/>
-    <p:sldId id="269" r:id="rId14"/>
-    <p:sldId id="270" r:id="rId15"/>
-    <p:sldId id="271" r:id="rId16"/>
-    <p:sldId id="272" r:id="rId17"/>
-    <p:sldId id="273" r:id="rId18"/>
-    <p:sldId id="274" r:id="rId19"/>
-    <p:sldId id="275" r:id="rId20"/>
-    <p:sldId id="276" r:id="rId21"/>
-    <p:sldId id="277" r:id="rId22"/>
-    <p:sldId id="278" r:id="rId23"/>
-    <p:sldId id="279" r:id="rId24"/>
+    <p:sldId id="280" r:id="rId5"/>
+    <p:sldId id="259" r:id="rId6"/>
+    <p:sldId id="281" r:id="rId7"/>
+    <p:sldId id="266" r:id="rId8"/>
+    <p:sldId id="262" r:id="rId9"/>
+    <p:sldId id="282" r:id="rId10"/>
+    <p:sldId id="283" r:id="rId11"/>
+    <p:sldId id="264" r:id="rId12"/>
+    <p:sldId id="265" r:id="rId13"/>
+    <p:sldId id="267" r:id="rId14"/>
+    <p:sldId id="268" r:id="rId15"/>
+    <p:sldId id="269" r:id="rId16"/>
+    <p:sldId id="270" r:id="rId17"/>
+    <p:sldId id="271" r:id="rId18"/>
+    <p:sldId id="272" r:id="rId19"/>
+    <p:sldId id="273" r:id="rId20"/>
+    <p:sldId id="274" r:id="rId21"/>
+    <p:sldId id="275" r:id="rId22"/>
+    <p:sldId id="276" r:id="rId23"/>
+    <p:sldId id="284" r:id="rId24"/>
+    <p:sldId id="285" r:id="rId25"/>
+    <p:sldId id="286" r:id="rId26"/>
+    <p:sldId id="278" r:id="rId27"/>
+    <p:sldId id="279" r:id="rId28"/>
+    <p:sldId id="287" r:id="rId29"/>
+    <p:sldId id="288" r:id="rId30"/>
+    <p:sldId id="289" r:id="rId31"/>
   </p:sldIdLst>
   <p:sldSz cx="12192000" cy="6858000"/>
   <p:notesSz cx="6858000" cy="9144000"/>
@@ -126,6 +133,11 @@
       </a:defRPr>
     </a:lvl9pPr>
   </p:defaultTextStyle>
+  <p:extLst>
+    <p:ext uri="{EFAFB233-063F-42B5-8137-9DF3F51BA10A}">
+      <p15:sldGuideLst xmlns:p15="http://schemas.microsoft.com/office/powerpoint/2012/main"/>
+    </p:ext>
+  </p:extLst>
 </p:presentation>
 </file>
 
@@ -268,7 +280,7 @@
           <a:p>
             <a:fld id="{83C426D8-AAC1-4EE0-A505-A74BCB95D2B0}" type="datetimeFigureOut">
               <a:rPr lang="en-KE" smtClean="0"/>
-              <a:t>29/04/2025</a:t>
+              <a:t>30/04/2025</a:t>
             </a:fld>
             <a:endParaRPr lang="en-KE"/>
           </a:p>
@@ -479,7 +491,7 @@
           <a:p>
             <a:fld id="{83C426D8-AAC1-4EE0-A505-A74BCB95D2B0}" type="datetimeFigureOut">
               <a:rPr lang="en-KE" smtClean="0"/>
-              <a:t>29/04/2025</a:t>
+              <a:t>30/04/2025</a:t>
             </a:fld>
             <a:endParaRPr lang="en-KE"/>
           </a:p>
@@ -694,7 +706,7 @@
           <a:p>
             <a:fld id="{83C426D8-AAC1-4EE0-A505-A74BCB95D2B0}" type="datetimeFigureOut">
               <a:rPr lang="en-KE" smtClean="0"/>
-              <a:t>29/04/2025</a:t>
+              <a:t>30/04/2025</a:t>
             </a:fld>
             <a:endParaRPr lang="en-KE"/>
           </a:p>
@@ -895,7 +907,7 @@
           <a:p>
             <a:fld id="{83C426D8-AAC1-4EE0-A505-A74BCB95D2B0}" type="datetimeFigureOut">
               <a:rPr lang="en-KE" smtClean="0"/>
-              <a:t>29/04/2025</a:t>
+              <a:t>30/04/2025</a:t>
             </a:fld>
             <a:endParaRPr lang="en-KE"/>
           </a:p>
@@ -1174,7 +1186,7 @@
           <a:p>
             <a:fld id="{83C426D8-AAC1-4EE0-A505-A74BCB95D2B0}" type="datetimeFigureOut">
               <a:rPr lang="en-KE" smtClean="0"/>
-              <a:t>29/04/2025</a:t>
+              <a:t>30/04/2025</a:t>
             </a:fld>
             <a:endParaRPr lang="en-KE"/>
           </a:p>
@@ -1442,7 +1454,7 @@
           <a:p>
             <a:fld id="{83C426D8-AAC1-4EE0-A505-A74BCB95D2B0}" type="datetimeFigureOut">
               <a:rPr lang="en-KE" smtClean="0"/>
-              <a:t>29/04/2025</a:t>
+              <a:t>30/04/2025</a:t>
             </a:fld>
             <a:endParaRPr lang="en-KE"/>
           </a:p>
@@ -1858,7 +1870,7 @@
           <a:p>
             <a:fld id="{83C426D8-AAC1-4EE0-A505-A74BCB95D2B0}" type="datetimeFigureOut">
               <a:rPr lang="en-KE" smtClean="0"/>
-              <a:t>29/04/2025</a:t>
+              <a:t>30/04/2025</a:t>
             </a:fld>
             <a:endParaRPr lang="en-KE"/>
           </a:p>
@@ -2007,7 +2019,7 @@
           <a:p>
             <a:fld id="{83C426D8-AAC1-4EE0-A505-A74BCB95D2B0}" type="datetimeFigureOut">
               <a:rPr lang="en-KE" smtClean="0"/>
-              <a:t>29/04/2025</a:t>
+              <a:t>30/04/2025</a:t>
             </a:fld>
             <a:endParaRPr lang="en-KE"/>
           </a:p>
@@ -2133,7 +2145,7 @@
           <a:p>
             <a:fld id="{83C426D8-AAC1-4EE0-A505-A74BCB95D2B0}" type="datetimeFigureOut">
               <a:rPr lang="en-KE" smtClean="0"/>
-              <a:t>29/04/2025</a:t>
+              <a:t>30/04/2025</a:t>
             </a:fld>
             <a:endParaRPr lang="en-KE"/>
           </a:p>
@@ -2384,7 +2396,7 @@
           <a:p>
             <a:fld id="{83C426D8-AAC1-4EE0-A505-A74BCB95D2B0}" type="datetimeFigureOut">
               <a:rPr lang="en-KE" smtClean="0"/>
-              <a:t>29/04/2025</a:t>
+              <a:t>30/04/2025</a:t>
             </a:fld>
             <a:endParaRPr lang="en-KE"/>
           </a:p>
@@ -2829,7 +2841,7 @@
           <a:p>
             <a:fld id="{83C426D8-AAC1-4EE0-A505-A74BCB95D2B0}" type="datetimeFigureOut">
               <a:rPr lang="en-KE" smtClean="0"/>
-              <a:t>29/04/2025</a:t>
+              <a:t>30/04/2025</a:t>
             </a:fld>
             <a:endParaRPr lang="en-KE"/>
           </a:p>
@@ -3155,7 +3167,7 @@
           <a:p>
             <a:fld id="{83C426D8-AAC1-4EE0-A505-A74BCB95D2B0}" type="datetimeFigureOut">
               <a:rPr lang="en-KE" smtClean="0"/>
-              <a:t>29/04/2025</a:t>
+              <a:t>30/04/2025</a:t>
             </a:fld>
             <a:endParaRPr lang="en-KE"/>
           </a:p>
@@ -3781,6 +3793,193 @@
       </p:grpSpPr>
       <p:sp>
         <p:nvSpPr>
+          <p:cNvPr id="3" name="Content Placeholder 2">
+            <a:extLst>
+              <a:ext uri="{FF2B5EF4-FFF2-40B4-BE49-F238E27FC236}">
+                <a16:creationId xmlns:a16="http://schemas.microsoft.com/office/drawing/2014/main" id="{0098DCB6-F361-4A15-BD83-0FF3F831A036}"/>
+              </a:ext>
+            </a:extLst>
+          </p:cNvPr>
+          <p:cNvSpPr>
+            <a:spLocks noGrp="1"/>
+          </p:cNvSpPr>
+          <p:nvPr>
+            <p:ph idx="1"/>
+          </p:nvPr>
+        </p:nvSpPr>
+        <p:spPr/>
+        <p:txBody>
+          <a:bodyPr/>
+          <a:lstStyle/>
+          <a:p>
+            <a:r>
+              <a:rPr lang="en-US" dirty="0"/>
+              <a:t>This then led to a </a:t>
+            </a:r>
+            <a:r>
+              <a:rPr lang="en-US" dirty="0" err="1"/>
+              <a:t>Anova</a:t>
+            </a:r>
+            <a:r>
+              <a:rPr lang="en-US" dirty="0"/>
+              <a:t> test to check if there was a significance in the performance of the studios:</a:t>
+            </a:r>
+          </a:p>
+          <a:p>
+            <a:pPr marL="0" indent="0">
+              <a:buNone/>
+            </a:pPr>
+            <a:endParaRPr lang="en-US" dirty="0"/>
+          </a:p>
+          <a:p>
+            <a:pPr marL="285750" indent="-285750"/>
+            <a:r>
+              <a:rPr lang="en-US" dirty="0"/>
+              <a:t>The test came back positive which suggests that the studio does play a role in determining box office success, and there is a meaningful difference in how the studios perform.</a:t>
+            </a:r>
+          </a:p>
+          <a:p>
+            <a:endParaRPr lang="en-KE" dirty="0"/>
+          </a:p>
+        </p:txBody>
+      </p:sp>
+    </p:spTree>
+    <p:extLst>
+      <p:ext uri="{BB962C8B-B14F-4D97-AF65-F5344CB8AC3E}">
+        <p14:creationId xmlns:p14="http://schemas.microsoft.com/office/powerpoint/2010/main" val="1028894191"/>
+      </p:ext>
+    </p:extLst>
+  </p:cSld>
+  <p:clrMapOvr>
+    <a:masterClrMapping/>
+  </p:clrMapOvr>
+</p:sld>
+</file>
+
+<file path=ppt/slides/slide11.xml><?xml version="1.0" encoding="utf-8"?>
+<p:sld xmlns:a="http://schemas.openxmlformats.org/drawingml/2006/main" xmlns:r="http://schemas.openxmlformats.org/officeDocument/2006/relationships" xmlns:p="http://schemas.openxmlformats.org/presentationml/2006/main">
+  <p:cSld>
+    <p:spTree>
+      <p:nvGrpSpPr>
+        <p:cNvPr id="1" name=""/>
+        <p:cNvGrpSpPr/>
+        <p:nvPr/>
+      </p:nvGrpSpPr>
+      <p:grpSpPr>
+        <a:xfrm>
+          <a:off x="0" y="0"/>
+          <a:ext cx="0" cy="0"/>
+          <a:chOff x="0" y="0"/>
+          <a:chExt cx="0" cy="0"/>
+        </a:xfrm>
+      </p:grpSpPr>
+      <p:sp>
+        <p:nvSpPr>
+          <p:cNvPr id="3" name="Content Placeholder 2">
+            <a:extLst>
+              <a:ext uri="{FF2B5EF4-FFF2-40B4-BE49-F238E27FC236}">
+                <a16:creationId xmlns:a16="http://schemas.microsoft.com/office/drawing/2014/main" id="{8EBACC88-DEA5-405D-BC59-082864F9EE39}"/>
+              </a:ext>
+            </a:extLst>
+          </p:cNvPr>
+          <p:cNvSpPr>
+            <a:spLocks noGrp="1"/>
+          </p:cNvSpPr>
+          <p:nvPr>
+            <p:ph idx="1"/>
+          </p:nvPr>
+        </p:nvSpPr>
+        <p:spPr>
+          <a:xfrm>
+            <a:off x="1470582" y="2262433"/>
+            <a:ext cx="8628270" cy="2658359"/>
+          </a:xfrm>
+        </p:spPr>
+        <p:txBody>
+          <a:bodyPr>
+            <a:noAutofit/>
+          </a:bodyPr>
+          <a:lstStyle/>
+          <a:p>
+            <a:r>
+              <a:rPr kumimoji="0" lang="en-KE" altLang="en-KE" sz="1800" b="1" i="0" u="none" strike="noStrike" cap="none" normalizeH="0" baseline="0" dirty="0">
+                <a:ln>
+                  <a:noFill/>
+                </a:ln>
+                <a:solidFill>
+                  <a:schemeClr val="tx1"/>
+                </a:solidFill>
+                <a:effectLst/>
+                <a:latin typeface="Arial" panose="020B0604020202020204" pitchFamily="34" charset="0"/>
+              </a:rPr>
+              <a:t>Conclusion</a:t>
+            </a:r>
+            <a:endParaRPr lang="en-US" altLang="en-KE" sz="1800" dirty="0">
+              <a:latin typeface="Arial" panose="020B0604020202020204" pitchFamily="34" charset="0"/>
+            </a:endParaRPr>
+          </a:p>
+          <a:p>
+            <a:pPr lvl="1"/>
+            <a:r>
+              <a:rPr kumimoji="0" lang="en-KE" altLang="en-KE" b="0" i="0" u="none" strike="noStrike" cap="none" normalizeH="0" baseline="0" dirty="0">
+                <a:ln>
+                  <a:noFill/>
+                </a:ln>
+                <a:solidFill>
+                  <a:schemeClr val="tx1"/>
+                </a:solidFill>
+                <a:effectLst/>
+                <a:latin typeface="Arial" panose="020B0604020202020204" pitchFamily="34" charset="0"/>
+              </a:rPr>
+              <a:t>There is a significant difference in box office performance between the studios. This means that some studios are performing significantly better than others at the box office.</a:t>
+            </a:r>
+          </a:p>
+          <a:p>
+            <a:pPr lvl="1"/>
+            <a:r>
+              <a:rPr lang="en-KE" altLang="en-KE" dirty="0">
+                <a:latin typeface="Arial" panose="020B0604020202020204" pitchFamily="34" charset="0"/>
+              </a:rPr>
+              <a:t>The studio behind a movie seems to play an important role in its box office success. Therefore, the studio factor is a major determinant of a film's financial performance.</a:t>
+            </a:r>
+          </a:p>
+          <a:p>
+            <a:endParaRPr lang="en-KE" sz="1800" dirty="0"/>
+          </a:p>
+        </p:txBody>
+      </p:sp>
+    </p:spTree>
+    <p:extLst>
+      <p:ext uri="{BB962C8B-B14F-4D97-AF65-F5344CB8AC3E}">
+        <p14:creationId xmlns:p14="http://schemas.microsoft.com/office/powerpoint/2010/main" val="753180281"/>
+      </p:ext>
+    </p:extLst>
+  </p:cSld>
+  <p:clrMapOvr>
+    <a:masterClrMapping/>
+  </p:clrMapOvr>
+</p:sld>
+</file>
+
+<file path=ppt/slides/slide12.xml><?xml version="1.0" encoding="utf-8"?>
+<p:sld xmlns:a="http://schemas.openxmlformats.org/drawingml/2006/main" xmlns:r="http://schemas.openxmlformats.org/officeDocument/2006/relationships" xmlns:p="http://schemas.openxmlformats.org/presentationml/2006/main">
+  <p:cSld>
+    <p:spTree>
+      <p:nvGrpSpPr>
+        <p:cNvPr id="1" name=""/>
+        <p:cNvGrpSpPr/>
+        <p:nvPr/>
+      </p:nvGrpSpPr>
+      <p:grpSpPr>
+        <a:xfrm>
+          <a:off x="0" y="0"/>
+          <a:ext cx="0" cy="0"/>
+          <a:chOff x="0" y="0"/>
+          <a:chExt cx="0" cy="0"/>
+        </a:xfrm>
+      </p:grpSpPr>
+      <p:sp>
+        <p:nvSpPr>
           <p:cNvPr id="2" name="Title 1">
             <a:extLst>
               <a:ext uri="{FF2B5EF4-FFF2-40B4-BE49-F238E27FC236}">
@@ -3862,7 +4061,7 @@
 </p:sld>
 </file>
 
-<file path=ppt/slides/slide11.xml><?xml version="1.0" encoding="utf-8"?>
+<file path=ppt/slides/slide13.xml><?xml version="1.0" encoding="utf-8"?>
 <p:sld xmlns:a="http://schemas.openxmlformats.org/drawingml/2006/main" xmlns:r="http://schemas.openxmlformats.org/officeDocument/2006/relationships" xmlns:p="http://schemas.openxmlformats.org/presentationml/2006/main">
   <p:cSld>
     <p:spTree>
@@ -3903,8 +4102,8 @@
         </p:blipFill>
         <p:spPr>
           <a:xfrm>
-            <a:off x="0" y="278448"/>
-            <a:ext cx="6773736" cy="5604192"/>
+            <a:off x="0" y="220432"/>
+            <a:ext cx="6843860" cy="6067246"/>
           </a:xfrm>
           <a:prstGeom prst="rect">
             <a:avLst/>
@@ -3925,8 +4124,8 @@
         </p:nvSpPr>
         <p:spPr>
           <a:xfrm>
-            <a:off x="6685280" y="558800"/>
-            <a:ext cx="5394960" cy="5078313"/>
+            <a:off x="6773736" y="1906833"/>
+            <a:ext cx="5394960" cy="4247317"/>
           </a:xfrm>
           <a:prstGeom prst="rect">
             <a:avLst/>
@@ -3939,269 +4138,209 @@
           </a:bodyPr>
           <a:lstStyle/>
           <a:p>
-            <a:r>
-              <a:rPr lang="en-US" dirty="0"/>
-              <a:t>From the graph on the right we came up with the following results:</a:t>
-            </a:r>
-          </a:p>
-          <a:p>
-            <a:pPr lvl="1" eaLnBrk="0" fontAlgn="base" hangingPunct="0">
-              <a:spcBef>
-                <a:spcPct val="0"/>
-              </a:spcBef>
-              <a:spcAft>
-                <a:spcPct val="0"/>
-              </a:spcAft>
-              <a:buFontTx/>
+            <a:pPr marL="285750" indent="-285750">
+              <a:buFont typeface="Arial" panose="020B0604020202020204" pitchFamily="34" charset="0"/>
               <a:buChar char="•"/>
             </a:pPr>
             <a:r>
+              <a:rPr lang="en-US" dirty="0">
+                <a:latin typeface="Arial" panose="020B0604020202020204" pitchFamily="34" charset="0"/>
+                <a:cs typeface="Arial" panose="020B0604020202020204" pitchFamily="34" charset="0"/>
+              </a:rPr>
+              <a:t>The graph here was created to check on the box office performance of the top directors in accordance of ratings.</a:t>
+            </a:r>
+          </a:p>
+          <a:p>
+            <a:pPr marL="285750" indent="-285750">
+              <a:buFont typeface="Arial" panose="020B0604020202020204" pitchFamily="34" charset="0"/>
+              <a:buChar char="•"/>
+            </a:pPr>
+            <a:r>
+              <a:rPr lang="en-US" dirty="0">
+                <a:latin typeface="Arial" panose="020B0604020202020204" pitchFamily="34" charset="0"/>
+                <a:cs typeface="Arial" panose="020B0604020202020204" pitchFamily="34" charset="0"/>
+              </a:rPr>
+              <a:t>So the false is movies without top directors and true was movies with top directors.</a:t>
+            </a:r>
+          </a:p>
+          <a:p>
+            <a:pPr marL="285750" indent="-285750">
+              <a:buFont typeface="Arial" panose="020B0604020202020204" pitchFamily="34" charset="0"/>
+              <a:buChar char="•"/>
+            </a:pPr>
+            <a:r>
               <a:rPr lang="en-KE" altLang="en-KE" dirty="0">
                 <a:latin typeface="Arial" panose="020B0604020202020204" pitchFamily="34" charset="0"/>
-              </a:rPr>
-              <a:t>A box plot was used to compare </a:t>
+                <a:cs typeface="Arial" panose="020B0604020202020204" pitchFamily="34" charset="0"/>
+              </a:rPr>
+              <a:t>Both </a:t>
+            </a:r>
+            <a:r>
+              <a:rPr lang="en-US" altLang="en-KE" dirty="0">
+                <a:latin typeface="Arial" panose="020B0604020202020204" pitchFamily="34" charset="0"/>
+                <a:cs typeface="Arial" panose="020B0604020202020204" pitchFamily="34" charset="0"/>
+              </a:rPr>
+              <a:t>groups</a:t>
+            </a:r>
+            <a:r>
+              <a:rPr lang="en-KE" altLang="en-KE" dirty="0">
+                <a:latin typeface="Arial" panose="020B0604020202020204" pitchFamily="34" charset="0"/>
+                <a:cs typeface="Arial" panose="020B0604020202020204" pitchFamily="34" charset="0"/>
+              </a:rPr>
+              <a:t> had similar </a:t>
             </a:r>
             <a:r>
               <a:rPr lang="en-KE" altLang="en-KE" b="1" dirty="0">
                 <a:latin typeface="Arial" panose="020B0604020202020204" pitchFamily="34" charset="0"/>
-              </a:rPr>
-              <a:t>domestic gross earnings</a:t>
+                <a:cs typeface="Arial" panose="020B0604020202020204" pitchFamily="34" charset="0"/>
+              </a:rPr>
+              <a:t>median earnings</a:t>
             </a:r>
             <a:r>
               <a:rPr lang="en-KE" altLang="en-KE" dirty="0">
                 <a:latin typeface="Arial" panose="020B0604020202020204" pitchFamily="34" charset="0"/>
-              </a:rPr>
-              <a:t> between </a:t>
+                <a:cs typeface="Arial" panose="020B0604020202020204" pitchFamily="34" charset="0"/>
+              </a:rPr>
+              <a:t>, but </a:t>
             </a:r>
             <a:r>
               <a:rPr lang="en-US" altLang="en-KE" dirty="0">
                 <a:latin typeface="Arial" panose="020B0604020202020204" pitchFamily="34" charset="0"/>
-              </a:rPr>
-              <a:t>top directors and non-top directors</a:t>
+                <a:cs typeface="Arial" panose="020B0604020202020204" pitchFamily="34" charset="0"/>
+              </a:rPr>
+              <a:t>top directors</a:t>
             </a:r>
             <a:r>
               <a:rPr lang="en-KE" altLang="en-KE" dirty="0">
                 <a:latin typeface="Arial" panose="020B0604020202020204" pitchFamily="34" charset="0"/>
+                <a:cs typeface="Arial" panose="020B0604020202020204" pitchFamily="34" charset="0"/>
+              </a:rPr>
+              <a:t> showed a </a:t>
+            </a:r>
+            <a:r>
+              <a:rPr lang="en-KE" altLang="en-KE" b="1" dirty="0">
+                <a:latin typeface="Arial" panose="020B0604020202020204" pitchFamily="34" charset="0"/>
+                <a:cs typeface="Arial" panose="020B0604020202020204" pitchFamily="34" charset="0"/>
+              </a:rPr>
+              <a:t>higher and more consistent performance</a:t>
+            </a:r>
+            <a:r>
+              <a:rPr lang="en-KE" altLang="en-KE" dirty="0">
+                <a:latin typeface="Arial" panose="020B0604020202020204" pitchFamily="34" charset="0"/>
+                <a:cs typeface="Arial" panose="020B0604020202020204" pitchFamily="34" charset="0"/>
               </a:rPr>
               <a:t>.</a:t>
             </a:r>
             <a:endParaRPr lang="en-US" altLang="en-KE" dirty="0">
               <a:latin typeface="Arial" panose="020B0604020202020204" pitchFamily="34" charset="0"/>
+              <a:cs typeface="Arial" panose="020B0604020202020204" pitchFamily="34" charset="0"/>
             </a:endParaRPr>
           </a:p>
           <a:p>
-            <a:pPr lvl="1" eaLnBrk="0" fontAlgn="base" hangingPunct="0">
-              <a:spcBef>
-                <a:spcPct val="0"/>
-              </a:spcBef>
-              <a:spcAft>
-                <a:spcPct val="0"/>
-              </a:spcAft>
-              <a:buFontTx/>
+            <a:pPr marL="285750" indent="-285750">
+              <a:buFont typeface="Arial" panose="020B0604020202020204" pitchFamily="34" charset="0"/>
               <a:buChar char="•"/>
             </a:pPr>
-            <a:endParaRPr lang="en-KE" altLang="en-KE" dirty="0">
+            <a:r>
+              <a:rPr lang="en-KE" altLang="en-KE" dirty="0">
+                <a:latin typeface="Arial" panose="020B0604020202020204" pitchFamily="34" charset="0"/>
+                <a:cs typeface="Arial" panose="020B0604020202020204" pitchFamily="34" charset="0"/>
+              </a:rPr>
+              <a:t>The </a:t>
+            </a:r>
+            <a:r>
+              <a:rPr lang="en-US" altLang="en-KE" dirty="0">
+                <a:latin typeface="Arial" panose="020B0604020202020204" pitchFamily="34" charset="0"/>
+                <a:cs typeface="Arial" panose="020B0604020202020204" pitchFamily="34" charset="0"/>
+              </a:rPr>
+              <a:t>top directors</a:t>
+            </a:r>
+            <a:r>
+              <a:rPr lang="en-KE" altLang="en-KE" dirty="0">
+                <a:latin typeface="Arial" panose="020B0604020202020204" pitchFamily="34" charset="0"/>
+                <a:cs typeface="Arial" panose="020B0604020202020204" pitchFamily="34" charset="0"/>
+              </a:rPr>
+              <a:t> group had </a:t>
+            </a:r>
+            <a:r>
+              <a:rPr lang="en-KE" altLang="en-KE" b="1" dirty="0">
+                <a:latin typeface="Arial" panose="020B0604020202020204" pitchFamily="34" charset="0"/>
+                <a:cs typeface="Arial" panose="020B0604020202020204" pitchFamily="34" charset="0"/>
+              </a:rPr>
+              <a:t>fewer low-performing films</a:t>
+            </a:r>
+            <a:r>
+              <a:rPr lang="en-KE" altLang="en-KE" dirty="0">
+                <a:latin typeface="Arial" panose="020B0604020202020204" pitchFamily="34" charset="0"/>
+                <a:cs typeface="Arial" panose="020B0604020202020204" pitchFamily="34" charset="0"/>
+              </a:rPr>
+              <a:t>, indicated by a smaller lower range.</a:t>
+            </a:r>
+            <a:endParaRPr lang="en-US" altLang="en-KE" dirty="0">
               <a:latin typeface="Arial" panose="020B0604020202020204" pitchFamily="34" charset="0"/>
+              <a:cs typeface="Arial" panose="020B0604020202020204" pitchFamily="34" charset="0"/>
             </a:endParaRPr>
           </a:p>
           <a:p>
-            <a:pPr lvl="1" eaLnBrk="0" fontAlgn="base" hangingPunct="0">
-              <a:spcBef>
-                <a:spcPct val="0"/>
-              </a:spcBef>
-              <a:spcAft>
-                <a:spcPct val="0"/>
-              </a:spcAft>
-              <a:buFontTx/>
+            <a:pPr marL="285750" indent="-285750">
+              <a:buFont typeface="Arial" panose="020B0604020202020204" pitchFamily="34" charset="0"/>
               <a:buChar char="•"/>
             </a:pPr>
             <a:r>
+              <a:rPr lang="en-US" altLang="en-KE" dirty="0">
+                <a:latin typeface="Arial" panose="020B0604020202020204" pitchFamily="34" charset="0"/>
+                <a:cs typeface="Arial" panose="020B0604020202020204" pitchFamily="34" charset="0"/>
+              </a:rPr>
+              <a:t>Top directors</a:t>
+            </a:r>
+            <a:r>
               <a:rPr lang="en-KE" altLang="en-KE" dirty="0">
                 <a:latin typeface="Arial" panose="020B0604020202020204" pitchFamily="34" charset="0"/>
-              </a:rPr>
-              <a:t>Both </a:t>
-            </a:r>
-            <a:r>
-              <a:rPr lang="en-US" altLang="en-KE" dirty="0">
-                <a:latin typeface="Arial" panose="020B0604020202020204" pitchFamily="34" charset="0"/>
-              </a:rPr>
-              <a:t>groups</a:t>
+                <a:cs typeface="Arial" panose="020B0604020202020204" pitchFamily="34" charset="0"/>
+              </a:rPr>
+              <a:t> also had </a:t>
+            </a:r>
+            <a:r>
+              <a:rPr lang="en-KE" altLang="en-KE" b="1" dirty="0">
+                <a:latin typeface="Arial" panose="020B0604020202020204" pitchFamily="34" charset="0"/>
+                <a:cs typeface="Arial" panose="020B0604020202020204" pitchFamily="34" charset="0"/>
+              </a:rPr>
+              <a:t>more high-grossing outliers</a:t>
             </a:r>
             <a:r>
               <a:rPr lang="en-KE" altLang="en-KE" dirty="0">
                 <a:latin typeface="Arial" panose="020B0604020202020204" pitchFamily="34" charset="0"/>
-              </a:rPr>
-              <a:t> had similar </a:t>
+                <a:cs typeface="Arial" panose="020B0604020202020204" pitchFamily="34" charset="0"/>
+              </a:rPr>
+              <a:t>, suggesting a stronger potential to produce </a:t>
             </a:r>
             <a:r>
               <a:rPr lang="en-KE" altLang="en-KE" b="1" dirty="0">
                 <a:latin typeface="Arial" panose="020B0604020202020204" pitchFamily="34" charset="0"/>
-              </a:rPr>
-              <a:t>median earnings</a:t>
+                <a:cs typeface="Arial" panose="020B0604020202020204" pitchFamily="34" charset="0"/>
+              </a:rPr>
+              <a:t>blockbuster movies</a:t>
             </a:r>
             <a:r>
               <a:rPr lang="en-KE" altLang="en-KE" dirty="0">
                 <a:latin typeface="Arial" panose="020B0604020202020204" pitchFamily="34" charset="0"/>
-              </a:rPr>
-              <a:t>, but </a:t>
-            </a:r>
-            <a:r>
-              <a:rPr lang="en-US" altLang="en-KE" dirty="0">
-                <a:latin typeface="Arial" panose="020B0604020202020204" pitchFamily="34" charset="0"/>
-              </a:rPr>
-              <a:t>top directors</a:t>
-            </a:r>
-            <a:r>
-              <a:rPr lang="en-KE" altLang="en-KE" dirty="0">
-                <a:latin typeface="Arial" panose="020B0604020202020204" pitchFamily="34" charset="0"/>
-              </a:rPr>
-              <a:t> showed a </a:t>
-            </a:r>
-            <a:r>
-              <a:rPr lang="en-KE" altLang="en-KE" b="1" dirty="0">
-                <a:latin typeface="Arial" panose="020B0604020202020204" pitchFamily="34" charset="0"/>
-              </a:rPr>
-              <a:t>higher and more consistent performance</a:t>
-            </a:r>
-            <a:r>
-              <a:rPr lang="en-KE" altLang="en-KE" dirty="0">
-                <a:latin typeface="Arial" panose="020B0604020202020204" pitchFamily="34" charset="0"/>
+                <a:cs typeface="Arial" panose="020B0604020202020204" pitchFamily="34" charset="0"/>
               </a:rPr>
               <a:t>.</a:t>
             </a:r>
-            <a:endParaRPr lang="en-US" altLang="en-KE" dirty="0">
+          </a:p>
+          <a:p>
+            <a:r>
+              <a:rPr lang="en-US" dirty="0">
+                <a:latin typeface="Arial" panose="020B0604020202020204" pitchFamily="34" charset="0"/>
+                <a:cs typeface="Arial" panose="020B0604020202020204" pitchFamily="34" charset="0"/>
+              </a:rPr>
+              <a:t> </a:t>
+            </a:r>
+            <a:endParaRPr lang="en-KE" dirty="0">
               <a:latin typeface="Arial" panose="020B0604020202020204" pitchFamily="34" charset="0"/>
+              <a:cs typeface="Arial" panose="020B0604020202020204" pitchFamily="34" charset="0"/>
             </a:endParaRPr>
-          </a:p>
-          <a:p>
-            <a:pPr lvl="1" eaLnBrk="0" fontAlgn="base" hangingPunct="0">
-              <a:spcBef>
-                <a:spcPct val="0"/>
-              </a:spcBef>
-              <a:spcAft>
-                <a:spcPct val="0"/>
-              </a:spcAft>
-              <a:buFontTx/>
-              <a:buChar char="•"/>
-            </a:pPr>
-            <a:endParaRPr lang="en-KE" altLang="en-KE" dirty="0">
-              <a:latin typeface="Arial" panose="020B0604020202020204" pitchFamily="34" charset="0"/>
-            </a:endParaRPr>
-          </a:p>
-          <a:p>
-            <a:pPr lvl="1" eaLnBrk="0" fontAlgn="base" hangingPunct="0">
-              <a:spcBef>
-                <a:spcPct val="0"/>
-              </a:spcBef>
-              <a:spcAft>
-                <a:spcPct val="0"/>
-              </a:spcAft>
-              <a:buFontTx/>
-              <a:buChar char="•"/>
-            </a:pPr>
-            <a:r>
-              <a:rPr lang="en-KE" altLang="en-KE" dirty="0">
-                <a:latin typeface="Arial" panose="020B0604020202020204" pitchFamily="34" charset="0"/>
-              </a:rPr>
-              <a:t>The </a:t>
-            </a:r>
-            <a:r>
-              <a:rPr lang="en-US" altLang="en-KE" dirty="0">
-                <a:latin typeface="Arial" panose="020B0604020202020204" pitchFamily="34" charset="0"/>
-              </a:rPr>
-              <a:t>top directors</a:t>
-            </a:r>
-            <a:r>
-              <a:rPr lang="en-KE" altLang="en-KE" dirty="0">
-                <a:latin typeface="Arial" panose="020B0604020202020204" pitchFamily="34" charset="0"/>
-              </a:rPr>
-              <a:t> group had </a:t>
-            </a:r>
-            <a:r>
-              <a:rPr lang="en-KE" altLang="en-KE" b="1" dirty="0">
-                <a:latin typeface="Arial" panose="020B0604020202020204" pitchFamily="34" charset="0"/>
-              </a:rPr>
-              <a:t>fewer low-performing films</a:t>
-            </a:r>
-            <a:r>
-              <a:rPr lang="en-KE" altLang="en-KE" dirty="0">
-                <a:latin typeface="Arial" panose="020B0604020202020204" pitchFamily="34" charset="0"/>
-              </a:rPr>
-              <a:t>, indicated by a smaller lower range.</a:t>
-            </a:r>
-            <a:endParaRPr lang="en-US" altLang="en-KE" dirty="0">
-              <a:latin typeface="Arial" panose="020B0604020202020204" pitchFamily="34" charset="0"/>
-            </a:endParaRPr>
-          </a:p>
-          <a:p>
-            <a:pPr lvl="1" eaLnBrk="0" fontAlgn="base" hangingPunct="0">
-              <a:spcBef>
-                <a:spcPct val="0"/>
-              </a:spcBef>
-              <a:spcAft>
-                <a:spcPct val="0"/>
-              </a:spcAft>
-              <a:buFontTx/>
-              <a:buChar char="•"/>
-            </a:pPr>
-            <a:endParaRPr lang="en-KE" altLang="en-KE" dirty="0">
-              <a:latin typeface="Arial" panose="020B0604020202020204" pitchFamily="34" charset="0"/>
-            </a:endParaRPr>
-          </a:p>
-          <a:p>
-            <a:pPr lvl="1" eaLnBrk="0" fontAlgn="base" hangingPunct="0">
-              <a:spcBef>
-                <a:spcPct val="0"/>
-              </a:spcBef>
-              <a:spcAft>
-                <a:spcPct val="0"/>
-              </a:spcAft>
-              <a:buFontTx/>
-              <a:buChar char="•"/>
-            </a:pPr>
-            <a:r>
-              <a:rPr lang="en-US" altLang="en-KE" dirty="0">
-                <a:latin typeface="Arial" panose="020B0604020202020204" pitchFamily="34" charset="0"/>
-              </a:rPr>
-              <a:t>Top directors</a:t>
-            </a:r>
-            <a:r>
-              <a:rPr lang="en-KE" altLang="en-KE" dirty="0">
-                <a:latin typeface="Arial" panose="020B0604020202020204" pitchFamily="34" charset="0"/>
-              </a:rPr>
-              <a:t> also had </a:t>
-            </a:r>
-            <a:r>
-              <a:rPr lang="en-KE" altLang="en-KE" b="1" dirty="0">
-                <a:latin typeface="Arial" panose="020B0604020202020204" pitchFamily="34" charset="0"/>
-              </a:rPr>
-              <a:t>more high-grossing outliers</a:t>
-            </a:r>
-            <a:r>
-              <a:rPr lang="en-KE" altLang="en-KE" dirty="0">
-                <a:latin typeface="Arial" panose="020B0604020202020204" pitchFamily="34" charset="0"/>
-              </a:rPr>
-              <a:t>, suggesting a stronger potential to produce </a:t>
-            </a:r>
-            <a:r>
-              <a:rPr lang="en-KE" altLang="en-KE" b="1" dirty="0">
-                <a:latin typeface="Arial" panose="020B0604020202020204" pitchFamily="34" charset="0"/>
-              </a:rPr>
-              <a:t>blockbuster movies</a:t>
-            </a:r>
-            <a:r>
-              <a:rPr lang="en-KE" altLang="en-KE" dirty="0">
-                <a:latin typeface="Arial" panose="020B0604020202020204" pitchFamily="34" charset="0"/>
-              </a:rPr>
-              <a:t>.</a:t>
-            </a:r>
-          </a:p>
-          <a:p>
-            <a:r>
-              <a:rPr lang="en-US" dirty="0"/>
-              <a:t> </a:t>
-            </a:r>
-            <a:endParaRPr lang="en-KE" dirty="0"/>
           </a:p>
         </p:txBody>
       </p:sp>
@@ -4218,7 +4357,7 @@
 </p:sld>
 </file>
 
-<file path=ppt/slides/slide12.xml><?xml version="1.0" encoding="utf-8"?>
+<file path=ppt/slides/slide14.xml><?xml version="1.0" encoding="utf-8"?>
 <p:sld xmlns:a="http://schemas.openxmlformats.org/drawingml/2006/main" xmlns:r="http://schemas.openxmlformats.org/officeDocument/2006/relationships" xmlns:p="http://schemas.openxmlformats.org/presentationml/2006/main">
   <p:cSld>
     <p:spTree>
@@ -4253,8 +4392,8 @@
         </p:nvSpPr>
         <p:spPr>
           <a:xfrm>
-            <a:off x="838200" y="941704"/>
-            <a:ext cx="10896600" cy="4869815"/>
+            <a:off x="834468" y="1974045"/>
+            <a:ext cx="10523063" cy="3814013"/>
           </a:xfrm>
         </p:spPr>
         <p:txBody>
@@ -4267,18 +4406,11 @@
             </a:r>
             <a:r>
               <a:rPr lang="en-US" b="1" dirty="0"/>
-              <a:t>two-tailed independent samples t-test</a:t>
+              <a:t>samples t-test</a:t>
             </a:r>
             <a:r>
               <a:rPr lang="en-US" dirty="0"/>
-              <a:t>, to check for significance the results were as follows:</a:t>
-            </a:r>
-          </a:p>
-          <a:p>
-            <a:pPr lvl="1"/>
-            <a:r>
-              <a:rPr lang="en-US" b="1" dirty="0"/>
-              <a:t>T-statistic: 26.0987, P-value: 0.0000</a:t>
+              <a:t>, to check for significance .</a:t>
             </a:r>
           </a:p>
           <a:p>
@@ -4290,7 +4422,7 @@
           <a:p>
             <a:r>
               <a:rPr lang="en-US" dirty="0"/>
-              <a:t>Since the p-value is essentially 0, we can confidently conclude that the box office earnings for movies directed by top directors are significantly higher than those directed by others.</a:t>
+              <a:t>The test results were positive therefore we can confidently conclude that the box office earnings for movies directed by top directors are significantly higher than those directed by others.</a:t>
             </a:r>
           </a:p>
           <a:p>
@@ -4311,7 +4443,7 @@
 </p:sld>
 </file>
 
-<file path=ppt/slides/slide13.xml><?xml version="1.0" encoding="utf-8"?>
+<file path=ppt/slides/slide15.xml><?xml version="1.0" encoding="utf-8"?>
 <p:sld xmlns:a="http://schemas.openxmlformats.org/drawingml/2006/main" xmlns:r="http://schemas.openxmlformats.org/officeDocument/2006/relationships" xmlns:p="http://schemas.openxmlformats.org/presentationml/2006/main">
   <p:cSld>
     <p:spTree>
@@ -4411,7 +4543,7 @@
 </p:sld>
 </file>
 
-<file path=ppt/slides/slide14.xml><?xml version="1.0" encoding="utf-8"?>
+<file path=ppt/slides/slide16.xml><?xml version="1.0" encoding="utf-8"?>
 <p:sld xmlns:a="http://schemas.openxmlformats.org/drawingml/2006/main" xmlns:r="http://schemas.openxmlformats.org/officeDocument/2006/relationships" xmlns:p="http://schemas.openxmlformats.org/presentationml/2006/main">
   <p:cSld>
     <p:spTree>
@@ -4474,7 +4606,7 @@
         </p:nvSpPr>
         <p:spPr>
           <a:xfrm>
-            <a:off x="7609840" y="589280"/>
+            <a:off x="7445878" y="1843045"/>
             <a:ext cx="4043680" cy="3693319"/>
           </a:xfrm>
           <a:prstGeom prst="rect">
@@ -4545,7 +4677,7 @@
 </p:sld>
 </file>
 
-<file path=ppt/slides/slide15.xml><?xml version="1.0" encoding="utf-8"?>
+<file path=ppt/slides/slide17.xml><?xml version="1.0" encoding="utf-8"?>
 <p:sld xmlns:a="http://schemas.openxmlformats.org/drawingml/2006/main" xmlns:r="http://schemas.openxmlformats.org/officeDocument/2006/relationships" xmlns:p="http://schemas.openxmlformats.org/presentationml/2006/main">
   <p:cSld>
     <p:spTree>
@@ -4726,7 +4858,7 @@
 </p:sld>
 </file>
 
-<file path=ppt/slides/slide16.xml><?xml version="1.0" encoding="utf-8"?>
+<file path=ppt/slides/slide18.xml><?xml version="1.0" encoding="utf-8"?>
 <p:sld xmlns:a="http://schemas.openxmlformats.org/drawingml/2006/main" xmlns:r="http://schemas.openxmlformats.org/officeDocument/2006/relationships" xmlns:p="http://schemas.openxmlformats.org/presentationml/2006/main">
   <p:cSld>
     <p:spTree>
@@ -5128,228 +5260,6 @@
 </p:sld>
 </file>
 
-<file path=ppt/slides/slide17.xml><?xml version="1.0" encoding="utf-8"?>
-<p:sld xmlns:a="http://schemas.openxmlformats.org/drawingml/2006/main" xmlns:r="http://schemas.openxmlformats.org/officeDocument/2006/relationships" xmlns:p="http://schemas.openxmlformats.org/presentationml/2006/main">
-  <p:cSld>
-    <p:spTree>
-      <p:nvGrpSpPr>
-        <p:cNvPr id="1" name=""/>
-        <p:cNvGrpSpPr/>
-        <p:nvPr/>
-      </p:nvGrpSpPr>
-      <p:grpSpPr>
-        <a:xfrm>
-          <a:off x="0" y="0"/>
-          <a:ext cx="0" cy="0"/>
-          <a:chOff x="0" y="0"/>
-          <a:chExt cx="0" cy="0"/>
-        </a:xfrm>
-      </p:grpSpPr>
-      <p:sp>
-        <p:nvSpPr>
-          <p:cNvPr id="2" name="Title 1">
-            <a:extLst>
-              <a:ext uri="{FF2B5EF4-FFF2-40B4-BE49-F238E27FC236}">
-                <a16:creationId xmlns:a16="http://schemas.microsoft.com/office/drawing/2014/main" id="{C202DEBE-AC68-4D5C-8D17-3FDDBEC683CF}"/>
-              </a:ext>
-            </a:extLst>
-          </p:cNvPr>
-          <p:cNvSpPr>
-            <a:spLocks noGrp="1"/>
-          </p:cNvSpPr>
-          <p:nvPr>
-            <p:ph type="title"/>
-          </p:nvPr>
-        </p:nvSpPr>
-        <p:spPr/>
-        <p:txBody>
-          <a:bodyPr/>
-          <a:lstStyle/>
-          <a:p>
-            <a:r>
-              <a:rPr lang="en-US" dirty="0"/>
-              <a:t>GENRE VS RELEASE DATE</a:t>
-            </a:r>
-            <a:endParaRPr lang="en-KE" dirty="0"/>
-          </a:p>
-        </p:txBody>
-      </p:sp>
-      <p:sp>
-        <p:nvSpPr>
-          <p:cNvPr id="3" name="Content Placeholder 2">
-            <a:extLst>
-              <a:ext uri="{FF2B5EF4-FFF2-40B4-BE49-F238E27FC236}">
-                <a16:creationId xmlns:a16="http://schemas.microsoft.com/office/drawing/2014/main" id="{603D5BB7-2260-44B8-B682-DD96DE8A761B}"/>
-              </a:ext>
-            </a:extLst>
-          </p:cNvPr>
-          <p:cNvSpPr>
-            <a:spLocks noGrp="1"/>
-          </p:cNvSpPr>
-          <p:nvPr>
-            <p:ph idx="1"/>
-          </p:nvPr>
-        </p:nvSpPr>
-        <p:spPr/>
-        <p:txBody>
-          <a:bodyPr/>
-          <a:lstStyle/>
-          <a:p>
-            <a:r>
-              <a:rPr lang="en-US" dirty="0"/>
-              <a:t>After getting the top 10 genres according to box office performance we looked into the release date and wanted to analyze our data with the date in mind.</a:t>
-            </a:r>
-          </a:p>
-          <a:p>
-            <a:r>
-              <a:rPr lang="en-US" dirty="0"/>
-              <a:t>First we found the mode which is the most common month that our top 10 genres are released.</a:t>
-            </a:r>
-          </a:p>
-          <a:p>
-            <a:r>
-              <a:rPr lang="en-US" dirty="0"/>
-              <a:t>This will give some info on the best month to release the specific genre that we have on our top genre list.</a:t>
-            </a:r>
-            <a:endParaRPr lang="en-KE" dirty="0"/>
-          </a:p>
-        </p:txBody>
-      </p:sp>
-    </p:spTree>
-    <p:extLst>
-      <p:ext uri="{BB962C8B-B14F-4D97-AF65-F5344CB8AC3E}">
-        <p14:creationId xmlns:p14="http://schemas.microsoft.com/office/powerpoint/2010/main" val="2350389813"/>
-      </p:ext>
-    </p:extLst>
-  </p:cSld>
-  <p:clrMapOvr>
-    <a:masterClrMapping/>
-  </p:clrMapOvr>
-</p:sld>
-</file>
-
-<file path=ppt/slides/slide18.xml><?xml version="1.0" encoding="utf-8"?>
-<p:sld xmlns:a="http://schemas.openxmlformats.org/drawingml/2006/main" xmlns:r="http://schemas.openxmlformats.org/officeDocument/2006/relationships" xmlns:p="http://schemas.openxmlformats.org/presentationml/2006/main">
-  <p:cSld>
-    <p:spTree>
-      <p:nvGrpSpPr>
-        <p:cNvPr id="1" name=""/>
-        <p:cNvGrpSpPr/>
-        <p:nvPr/>
-      </p:nvGrpSpPr>
-      <p:grpSpPr>
-        <a:xfrm>
-          <a:off x="0" y="0"/>
-          <a:ext cx="0" cy="0"/>
-          <a:chOff x="0" y="0"/>
-          <a:chExt cx="0" cy="0"/>
-        </a:xfrm>
-      </p:grpSpPr>
-      <p:sp>
-        <p:nvSpPr>
-          <p:cNvPr id="3" name="Content Placeholder 2">
-            <a:extLst>
-              <a:ext uri="{FF2B5EF4-FFF2-40B4-BE49-F238E27FC236}">
-                <a16:creationId xmlns:a16="http://schemas.microsoft.com/office/drawing/2014/main" id="{43F6C2F1-17AF-4B6B-8FA5-2F8391C41B54}"/>
-              </a:ext>
-            </a:extLst>
-          </p:cNvPr>
-          <p:cNvSpPr>
-            <a:spLocks noGrp="1"/>
-          </p:cNvSpPr>
-          <p:nvPr>
-            <p:ph idx="1"/>
-          </p:nvPr>
-        </p:nvSpPr>
-        <p:spPr>
-          <a:xfrm>
-            <a:off x="746760" y="504824"/>
-            <a:ext cx="10897372" cy="6173767"/>
-          </a:xfrm>
-        </p:spPr>
-        <p:txBody>
-          <a:bodyPr>
-            <a:normAutofit/>
-          </a:bodyPr>
-          <a:lstStyle/>
-          <a:p>
-            <a:r>
-              <a:rPr lang="en-US" dirty="0"/>
-              <a:t>From our top genres the most common month to release the movies were </a:t>
-            </a:r>
-            <a:r>
-              <a:rPr lang="en-US" dirty="0" err="1"/>
-              <a:t>analysed</a:t>
-            </a:r>
-            <a:r>
-              <a:rPr lang="en-US" dirty="0"/>
-              <a:t> to be this below:</a:t>
-            </a:r>
-          </a:p>
-          <a:p>
-            <a:pPr lvl="3"/>
-            <a:r>
-              <a:rPr lang="en-US" sz="2600" dirty="0"/>
-              <a:t>Animation    December</a:t>
-            </a:r>
-          </a:p>
-          <a:p>
-            <a:pPr lvl="3"/>
-            <a:r>
-              <a:rPr lang="en-US" sz="2600" dirty="0"/>
-              <a:t>Comedy        January</a:t>
-            </a:r>
-          </a:p>
-          <a:p>
-            <a:pPr lvl="3"/>
-            <a:r>
-              <a:rPr lang="en-US" sz="2600" dirty="0"/>
-              <a:t>Drama         October</a:t>
-            </a:r>
-          </a:p>
-          <a:p>
-            <a:pPr lvl="3"/>
-            <a:r>
-              <a:rPr lang="en-US" sz="2600" dirty="0"/>
-              <a:t>Western          June</a:t>
-            </a:r>
-          </a:p>
-          <a:p>
-            <a:r>
-              <a:rPr lang="en-US" dirty="0"/>
-              <a:t>From this we looked into a hypothesis test to check if the month where a movie is released is related to its genre.</a:t>
-            </a:r>
-          </a:p>
-          <a:p>
-            <a:endParaRPr lang="en-US" dirty="0"/>
-          </a:p>
-          <a:p>
-            <a:r>
-              <a:rPr lang="en-US" dirty="0"/>
-              <a:t>For this since both were categorical data meaning the release month and the genre we are going to use a Chi-Square Test of Independence</a:t>
-            </a:r>
-          </a:p>
-          <a:p>
-            <a:pPr marL="0" indent="0">
-              <a:buNone/>
-            </a:pPr>
-            <a:endParaRPr lang="en-KE" dirty="0"/>
-          </a:p>
-        </p:txBody>
-      </p:sp>
-    </p:spTree>
-    <p:extLst>
-      <p:ext uri="{BB962C8B-B14F-4D97-AF65-F5344CB8AC3E}">
-        <p14:creationId xmlns:p14="http://schemas.microsoft.com/office/powerpoint/2010/main" val="483764289"/>
-      </p:ext>
-    </p:extLst>
-  </p:cSld>
-  <p:clrMapOvr>
-    <a:masterClrMapping/>
-  </p:clrMapOvr>
-</p:sld>
-</file>
-
 <file path=ppt/slides/slide19.xml><?xml version="1.0" encoding="utf-8"?>
 <p:sld xmlns:a="http://schemas.openxmlformats.org/drawingml/2006/main" xmlns:r="http://schemas.openxmlformats.org/officeDocument/2006/relationships" xmlns:p="http://schemas.openxmlformats.org/presentationml/2006/main">
   <p:cSld>
@@ -5369,10 +5279,39 @@
       </p:grpSpPr>
       <p:sp>
         <p:nvSpPr>
+          <p:cNvPr id="2" name="Title 1">
+            <a:extLst>
+              <a:ext uri="{FF2B5EF4-FFF2-40B4-BE49-F238E27FC236}">
+                <a16:creationId xmlns:a16="http://schemas.microsoft.com/office/drawing/2014/main" id="{C202DEBE-AC68-4D5C-8D17-3FDDBEC683CF}"/>
+              </a:ext>
+            </a:extLst>
+          </p:cNvPr>
+          <p:cNvSpPr>
+            <a:spLocks noGrp="1"/>
+          </p:cNvSpPr>
+          <p:nvPr>
+            <p:ph type="title"/>
+          </p:nvPr>
+        </p:nvSpPr>
+        <p:spPr/>
+        <p:txBody>
+          <a:bodyPr/>
+          <a:lstStyle/>
+          <a:p>
+            <a:r>
+              <a:rPr lang="en-US" dirty="0"/>
+              <a:t>GENRE VS RELEASE DATE</a:t>
+            </a:r>
+            <a:endParaRPr lang="en-KE" dirty="0"/>
+          </a:p>
+        </p:txBody>
+      </p:sp>
+      <p:sp>
+        <p:nvSpPr>
           <p:cNvPr id="3" name="Content Placeholder 2">
             <a:extLst>
               <a:ext uri="{FF2B5EF4-FFF2-40B4-BE49-F238E27FC236}">
-                <a16:creationId xmlns:a16="http://schemas.microsoft.com/office/drawing/2014/main" id="{B209D3EC-A0B6-4B32-941B-46454BF33557}"/>
+                <a16:creationId xmlns:a16="http://schemas.microsoft.com/office/drawing/2014/main" id="{603D5BB7-2260-44B8-B682-DD96DE8A761B}"/>
               </a:ext>
             </a:extLst>
           </p:cNvPr>
@@ -5383,216 +5322,27 @@
             <p:ph idx="1"/>
           </p:nvPr>
         </p:nvSpPr>
-        <p:spPr>
-          <a:xfrm>
-            <a:off x="838200" y="714456"/>
-            <a:ext cx="10875380" cy="5373828"/>
-          </a:xfrm>
-        </p:spPr>
+        <p:spPr/>
         <p:txBody>
           <a:bodyPr/>
           <a:lstStyle/>
           <a:p>
-            <a:pPr marL="0" lvl="0" indent="0" eaLnBrk="0" fontAlgn="base" hangingPunct="0">
-              <a:lnSpc>
-                <a:spcPct val="100000"/>
-              </a:lnSpc>
-              <a:spcBef>
-                <a:spcPct val="0"/>
-              </a:spcBef>
-              <a:spcAft>
-                <a:spcPct val="0"/>
-              </a:spcAft>
-              <a:buFontTx/>
-              <a:buChar char="•"/>
-            </a:pPr>
             <a:r>
               <a:rPr lang="en-US" dirty="0"/>
-              <a:t>The output of the test was</a:t>
-            </a:r>
-          </a:p>
-          <a:p>
-            <a:pPr marL="457200" lvl="1" indent="0" eaLnBrk="0" fontAlgn="base" hangingPunct="0">
-              <a:lnSpc>
-                <a:spcPct val="100000"/>
-              </a:lnSpc>
-              <a:spcBef>
-                <a:spcPct val="0"/>
-              </a:spcBef>
-              <a:spcAft>
-                <a:spcPct val="0"/>
-              </a:spcAft>
-              <a:buFontTx/>
-              <a:buChar char="•"/>
-            </a:pPr>
+              <a:t>After getting the top 10 genres according to box office performance we looked into the release date and wanted to analyze our data with the date in mind.</a:t>
+            </a:r>
+          </a:p>
+          <a:p>
             <a:r>
               <a:rPr lang="en-US" dirty="0"/>
-              <a:t> </a:t>
-            </a:r>
-            <a:r>
-              <a:rPr lang="en-KE" altLang="en-KE" b="1" dirty="0">
-                <a:latin typeface="Arial" panose="020B0604020202020204" pitchFamily="34" charset="0"/>
-              </a:rPr>
-              <a:t>Chi-square statistic:</a:t>
-            </a:r>
-            <a:r>
-              <a:rPr lang="en-KE" altLang="en-KE" dirty="0">
-                <a:latin typeface="Arial" panose="020B0604020202020204" pitchFamily="34" charset="0"/>
-              </a:rPr>
-              <a:t> 267.66</a:t>
-            </a:r>
-          </a:p>
-          <a:p>
-            <a:pPr marL="457200" lvl="1" indent="0" eaLnBrk="0" fontAlgn="base" hangingPunct="0">
-              <a:lnSpc>
-                <a:spcPct val="100000"/>
-              </a:lnSpc>
-              <a:spcBef>
-                <a:spcPct val="0"/>
-              </a:spcBef>
-              <a:spcAft>
-                <a:spcPct val="0"/>
-              </a:spcAft>
-              <a:buFontTx/>
-              <a:buChar char="•"/>
-            </a:pPr>
-            <a:r>
-              <a:rPr lang="en-KE" altLang="en-KE" b="1" dirty="0">
-                <a:latin typeface="Arial" panose="020B0604020202020204" pitchFamily="34" charset="0"/>
-              </a:rPr>
-              <a:t>P-value:</a:t>
-            </a:r>
-            <a:r>
-              <a:rPr lang="en-KE" altLang="en-KE" dirty="0">
-                <a:latin typeface="Arial" panose="020B0604020202020204" pitchFamily="34" charset="0"/>
-              </a:rPr>
-              <a:t> 0.0000 (i.e., less than 0.05)</a:t>
-            </a:r>
-            <a:endParaRPr lang="en-US" altLang="en-KE" dirty="0">
-              <a:latin typeface="Arial" panose="020B0604020202020204" pitchFamily="34" charset="0"/>
-            </a:endParaRPr>
-          </a:p>
-          <a:p>
-            <a:pPr marL="457200" lvl="1" indent="0" eaLnBrk="0" fontAlgn="base" hangingPunct="0">
-              <a:lnSpc>
-                <a:spcPct val="100000"/>
-              </a:lnSpc>
-              <a:spcBef>
-                <a:spcPct val="0"/>
-              </a:spcBef>
-              <a:spcAft>
-                <a:spcPct val="0"/>
-              </a:spcAft>
-              <a:buFontTx/>
-              <a:buChar char="•"/>
-            </a:pPr>
-            <a:endParaRPr lang="en-KE" altLang="en-KE" dirty="0">
-              <a:latin typeface="Arial" panose="020B0604020202020204" pitchFamily="34" charset="0"/>
-            </a:endParaRPr>
-          </a:p>
-          <a:p>
-            <a:pPr marL="0" lvl="0" indent="0" eaLnBrk="0" fontAlgn="base" hangingPunct="0">
-              <a:lnSpc>
-                <a:spcPct val="100000"/>
-              </a:lnSpc>
-              <a:spcBef>
-                <a:spcPct val="0"/>
-              </a:spcBef>
-              <a:spcAft>
-                <a:spcPct val="0"/>
-              </a:spcAft>
-              <a:buFontTx/>
-              <a:buChar char="•"/>
-            </a:pPr>
-            <a:r>
-              <a:rPr lang="en-KE" altLang="en-KE" b="1" dirty="0">
-                <a:latin typeface="Arial" panose="020B0604020202020204" pitchFamily="34" charset="0"/>
-              </a:rPr>
-              <a:t>Interpretation:</a:t>
-            </a:r>
-            <a:r>
-              <a:rPr lang="en-KE" altLang="en-KE" dirty="0">
-                <a:latin typeface="Arial" panose="020B0604020202020204" pitchFamily="34" charset="0"/>
-              </a:rPr>
-              <a:t> There is a </a:t>
-            </a:r>
-            <a:r>
-              <a:rPr lang="en-KE" altLang="en-KE" b="1" dirty="0">
-                <a:latin typeface="Arial" panose="020B0604020202020204" pitchFamily="34" charset="0"/>
-              </a:rPr>
-              <a:t>significant relationship</a:t>
-            </a:r>
-            <a:r>
-              <a:rPr lang="en-KE" altLang="en-KE" dirty="0">
-                <a:latin typeface="Arial" panose="020B0604020202020204" pitchFamily="34" charset="0"/>
-              </a:rPr>
-              <a:t> between movie genre and release month.</a:t>
-            </a:r>
-            <a:endParaRPr lang="en-US" altLang="en-KE" dirty="0">
-              <a:latin typeface="Arial" panose="020B0604020202020204" pitchFamily="34" charset="0"/>
-            </a:endParaRPr>
-          </a:p>
-          <a:p>
-            <a:pPr marL="0" lvl="0" indent="0" eaLnBrk="0" fontAlgn="base" hangingPunct="0">
-              <a:lnSpc>
-                <a:spcPct val="100000"/>
-              </a:lnSpc>
-              <a:spcBef>
-                <a:spcPct val="0"/>
-              </a:spcBef>
-              <a:spcAft>
-                <a:spcPct val="0"/>
-              </a:spcAft>
-              <a:buFontTx/>
-              <a:buChar char="•"/>
-            </a:pPr>
-            <a:endParaRPr lang="en-KE" altLang="en-KE" dirty="0">
-              <a:latin typeface="Arial" panose="020B0604020202020204" pitchFamily="34" charset="0"/>
-            </a:endParaRPr>
-          </a:p>
-          <a:p>
-            <a:pPr marL="0" lvl="0" indent="0" eaLnBrk="0" fontAlgn="base" hangingPunct="0">
-              <a:lnSpc>
-                <a:spcPct val="100000"/>
-              </a:lnSpc>
-              <a:spcBef>
-                <a:spcPct val="0"/>
-              </a:spcBef>
-              <a:spcAft>
-                <a:spcPct val="0"/>
-              </a:spcAft>
-              <a:buFontTx/>
-              <a:buChar char="•"/>
-            </a:pPr>
-            <a:r>
-              <a:rPr lang="en-KE" altLang="en-KE" dirty="0">
-                <a:latin typeface="Arial" panose="020B0604020202020204" pitchFamily="34" charset="0"/>
-              </a:rPr>
-              <a:t>This suggests studios may </a:t>
-            </a:r>
-            <a:r>
-              <a:rPr lang="en-KE" altLang="en-KE" b="1" dirty="0">
-                <a:latin typeface="Arial" panose="020B0604020202020204" pitchFamily="34" charset="0"/>
-              </a:rPr>
-              <a:t>strategically release certain genres</a:t>
-            </a:r>
-            <a:r>
-              <a:rPr lang="en-KE" altLang="en-KE" dirty="0">
-                <a:latin typeface="Arial" panose="020B0604020202020204" pitchFamily="34" charset="0"/>
-              </a:rPr>
-              <a:t> during specific months </a:t>
-            </a:r>
-            <a:r>
-              <a:rPr lang="en-US" altLang="en-KE" dirty="0">
-                <a:latin typeface="Arial" panose="020B0604020202020204" pitchFamily="34" charset="0"/>
-              </a:rPr>
-              <a:t>to ensure and also bolster box office performance.</a:t>
-            </a:r>
-            <a:endParaRPr lang="en-KE" altLang="en-KE" dirty="0">
-              <a:latin typeface="Arial" panose="020B0604020202020204" pitchFamily="34" charset="0"/>
-            </a:endParaRPr>
-          </a:p>
-          <a:p>
+              <a:t>First we found the mode which is the most common month that our top 10 genres are released.</a:t>
+            </a:r>
+          </a:p>
+          <a:p>
+            <a:r>
+              <a:rPr lang="en-US" dirty="0"/>
+              <a:t>This will give some info on the best month to release the specific genre that we have on our top genre list.</a:t>
+            </a:r>
             <a:endParaRPr lang="en-KE" dirty="0"/>
           </a:p>
         </p:txBody>
@@ -5600,7 +5350,7 @@
     </p:spTree>
     <p:extLst>
       <p:ext uri="{BB962C8B-B14F-4D97-AF65-F5344CB8AC3E}">
-        <p14:creationId xmlns:p14="http://schemas.microsoft.com/office/powerpoint/2010/main" val="173752300"/>
+        <p14:creationId xmlns:p14="http://schemas.microsoft.com/office/powerpoint/2010/main" val="2350389813"/>
       </p:ext>
     </p:extLst>
   </p:cSld>
@@ -5691,7 +5441,7 @@
           <a:p>
             <a:r>
               <a:rPr lang="en-US" dirty="0"/>
-              <a:t>Methods</a:t>
+              <a:t>Objectives</a:t>
             </a:r>
           </a:p>
           <a:p>
@@ -5704,6 +5454,12 @@
             <a:r>
               <a:rPr lang="en-US" dirty="0"/>
               <a:t>Conclusions</a:t>
+            </a:r>
+          </a:p>
+          <a:p>
+            <a:r>
+              <a:rPr lang="en-US" dirty="0"/>
+              <a:t>Limitations</a:t>
             </a:r>
             <a:endParaRPr lang="en-KE" dirty="0"/>
           </a:p>
@@ -5741,10 +5497,10 @@
       </p:grpSpPr>
       <p:sp>
         <p:nvSpPr>
-          <p:cNvPr id="2" name="Title 1">
+          <p:cNvPr id="3" name="Content Placeholder 2">
             <a:extLst>
               <a:ext uri="{FF2B5EF4-FFF2-40B4-BE49-F238E27FC236}">
-                <a16:creationId xmlns:a16="http://schemas.microsoft.com/office/drawing/2014/main" id="{279F1B92-D7C1-485E-9C5D-11D055EAC023}"/>
+                <a16:creationId xmlns:a16="http://schemas.microsoft.com/office/drawing/2014/main" id="{43F6C2F1-17AF-4B6B-8FA5-2F8391C41B54}"/>
               </a:ext>
             </a:extLst>
           </p:cNvPr>
@@ -5752,31 +5508,122 @@
             <a:spLocks noGrp="1"/>
           </p:cNvSpPr>
           <p:nvPr>
-            <p:ph type="title"/>
+            <p:ph idx="1"/>
           </p:nvPr>
         </p:nvSpPr>
         <p:spPr>
           <a:xfrm>
-            <a:off x="838200" y="2298097"/>
-            <a:ext cx="10515600" cy="1325563"/>
+            <a:off x="763570" y="1866508"/>
+            <a:ext cx="11173906" cy="4242062"/>
           </a:xfrm>
         </p:spPr>
         <p:txBody>
-          <a:bodyPr/>
-          <a:lstStyle/>
-          <a:p>
-            <a:r>
-              <a:rPr lang="en-US" dirty="0"/>
-              <a:t>CONCLUSIONS</a:t>
-            </a:r>
-            <a:endParaRPr lang="en-KE" dirty="0"/>
+          <a:bodyPr>
+            <a:normAutofit fontScale="92500"/>
+          </a:bodyPr>
+          <a:lstStyle/>
+          <a:p>
+            <a:r>
+              <a:rPr lang="en-US" dirty="0">
+                <a:latin typeface="Arial" panose="020B0604020202020204" pitchFamily="34" charset="0"/>
+                <a:cs typeface="Arial" panose="020B0604020202020204" pitchFamily="34" charset="0"/>
+              </a:rPr>
+              <a:t>From our top genres the most common month to release the movies were </a:t>
+            </a:r>
+            <a:r>
+              <a:rPr lang="en-US" dirty="0" err="1">
+                <a:latin typeface="Arial" panose="020B0604020202020204" pitchFamily="34" charset="0"/>
+                <a:cs typeface="Arial" panose="020B0604020202020204" pitchFamily="34" charset="0"/>
+              </a:rPr>
+              <a:t>analysed</a:t>
+            </a:r>
+            <a:r>
+              <a:rPr lang="en-US" dirty="0">
+                <a:latin typeface="Arial" panose="020B0604020202020204" pitchFamily="34" charset="0"/>
+                <a:cs typeface="Arial" panose="020B0604020202020204" pitchFamily="34" charset="0"/>
+              </a:rPr>
+              <a:t> to be this below:</a:t>
+            </a:r>
+          </a:p>
+          <a:p>
+            <a:pPr lvl="3"/>
+            <a:r>
+              <a:rPr lang="en-US" sz="1900" dirty="0">
+                <a:latin typeface="Arial" panose="020B0604020202020204" pitchFamily="34" charset="0"/>
+                <a:cs typeface="Arial" panose="020B0604020202020204" pitchFamily="34" charset="0"/>
+              </a:rPr>
+              <a:t>Animation    December</a:t>
+            </a:r>
+          </a:p>
+          <a:p>
+            <a:pPr lvl="3"/>
+            <a:r>
+              <a:rPr lang="en-US" sz="1900" dirty="0">
+                <a:latin typeface="Arial" panose="020B0604020202020204" pitchFamily="34" charset="0"/>
+                <a:cs typeface="Arial" panose="020B0604020202020204" pitchFamily="34" charset="0"/>
+              </a:rPr>
+              <a:t>Comedy        January</a:t>
+            </a:r>
+          </a:p>
+          <a:p>
+            <a:pPr lvl="3"/>
+            <a:r>
+              <a:rPr lang="en-US" sz="1900" dirty="0">
+                <a:latin typeface="Arial" panose="020B0604020202020204" pitchFamily="34" charset="0"/>
+                <a:cs typeface="Arial" panose="020B0604020202020204" pitchFamily="34" charset="0"/>
+              </a:rPr>
+              <a:t>Drama         October</a:t>
+            </a:r>
+          </a:p>
+          <a:p>
+            <a:pPr lvl="3"/>
+            <a:r>
+              <a:rPr lang="en-US" sz="1900" dirty="0">
+                <a:latin typeface="Arial" panose="020B0604020202020204" pitchFamily="34" charset="0"/>
+                <a:cs typeface="Arial" panose="020B0604020202020204" pitchFamily="34" charset="0"/>
+              </a:rPr>
+              <a:t>Western          June</a:t>
+            </a:r>
+          </a:p>
+          <a:p>
+            <a:r>
+              <a:rPr lang="en-US" dirty="0">
+                <a:latin typeface="Arial" panose="020B0604020202020204" pitchFamily="34" charset="0"/>
+                <a:cs typeface="Arial" panose="020B0604020202020204" pitchFamily="34" charset="0"/>
+              </a:rPr>
+              <a:t>From this we looked into a hypothesis test to check if the month where a movie is released is related to its genre.</a:t>
+            </a:r>
+          </a:p>
+          <a:p>
+            <a:endParaRPr lang="en-US" dirty="0">
+              <a:latin typeface="Arial" panose="020B0604020202020204" pitchFamily="34" charset="0"/>
+              <a:cs typeface="Arial" panose="020B0604020202020204" pitchFamily="34" charset="0"/>
+            </a:endParaRPr>
+          </a:p>
+          <a:p>
+            <a:r>
+              <a:rPr lang="en-US" dirty="0">
+                <a:latin typeface="Arial" panose="020B0604020202020204" pitchFamily="34" charset="0"/>
+                <a:cs typeface="Arial" panose="020B0604020202020204" pitchFamily="34" charset="0"/>
+              </a:rPr>
+              <a:t>For this since both were categorical data meaning the release month and the genre we are going to use a Chi-Square Test of Independence</a:t>
+            </a:r>
+          </a:p>
+          <a:p>
+            <a:pPr marL="0" indent="0">
+              <a:buNone/>
+            </a:pPr>
+            <a:endParaRPr lang="en-KE" dirty="0">
+              <a:latin typeface="Arial" panose="020B0604020202020204" pitchFamily="34" charset="0"/>
+              <a:cs typeface="Arial" panose="020B0604020202020204" pitchFamily="34" charset="0"/>
+            </a:endParaRPr>
           </a:p>
         </p:txBody>
       </p:sp>
     </p:spTree>
     <p:extLst>
       <p:ext uri="{BB962C8B-B14F-4D97-AF65-F5344CB8AC3E}">
-        <p14:creationId xmlns:p14="http://schemas.microsoft.com/office/powerpoint/2010/main" val="1371836298"/>
+        <p14:creationId xmlns:p14="http://schemas.microsoft.com/office/powerpoint/2010/main" val="483764289"/>
       </p:ext>
     </p:extLst>
   </p:cSld>
@@ -5805,10 +5652,10 @@
       </p:grpSpPr>
       <p:sp>
         <p:nvSpPr>
-          <p:cNvPr id="2" name="Title 1">
+          <p:cNvPr id="3" name="Content Placeholder 2">
             <a:extLst>
               <a:ext uri="{FF2B5EF4-FFF2-40B4-BE49-F238E27FC236}">
-                <a16:creationId xmlns:a16="http://schemas.microsoft.com/office/drawing/2014/main" id="{CD8ECA06-3990-41A5-8078-95CF243AC7FE}"/>
+                <a16:creationId xmlns:a16="http://schemas.microsoft.com/office/drawing/2014/main" id="{B209D3EC-A0B6-4B32-941B-46454BF33557}"/>
               </a:ext>
             </a:extLst>
           </p:cNvPr>
@@ -5816,90 +5663,20 @@
             <a:spLocks noGrp="1"/>
           </p:cNvSpPr>
           <p:nvPr>
-            <p:ph type="title"/>
-          </p:nvPr>
-        </p:nvSpPr>
-        <p:spPr/>
+            <p:ph idx="1"/>
+          </p:nvPr>
+        </p:nvSpPr>
+        <p:spPr>
+          <a:xfrm>
+            <a:off x="672843" y="2037230"/>
+            <a:ext cx="11519157" cy="3901657"/>
+          </a:xfrm>
+        </p:spPr>
         <p:txBody>
           <a:bodyPr/>
           <a:lstStyle/>
           <a:p>
-            <a:r>
-              <a:rPr lang="en-US" dirty="0"/>
-              <a:t>Test Recommendations</a:t>
-            </a:r>
-            <a:endParaRPr lang="en-KE" dirty="0"/>
-          </a:p>
-        </p:txBody>
-      </p:sp>
-      <p:sp>
-        <p:nvSpPr>
-          <p:cNvPr id="4" name="Rectangle 1">
-            <a:extLst>
-              <a:ext uri="{FF2B5EF4-FFF2-40B4-BE49-F238E27FC236}">
-                <a16:creationId xmlns:a16="http://schemas.microsoft.com/office/drawing/2014/main" id="{2E62E50C-C422-41B1-B4BA-C74BEDB80B64}"/>
-              </a:ext>
-            </a:extLst>
-          </p:cNvPr>
-          <p:cNvSpPr>
-            <a:spLocks noGrp="1" noChangeArrowheads="1"/>
-          </p:cNvSpPr>
-          <p:nvPr>
-            <p:ph idx="1"/>
-          </p:nvPr>
-        </p:nvSpPr>
-        <p:spPr bwMode="auto">
-          <a:xfrm>
-            <a:off x="235834" y="1358176"/>
-            <a:ext cx="11720332" cy="4893647"/>
-          </a:xfrm>
-          <a:prstGeom prst="rect">
-            <a:avLst/>
-          </a:prstGeom>
-          <a:noFill/>
-          <a:ln>
-            <a:noFill/>
-          </a:ln>
-          <a:effectLst/>
-          <a:extLst>
-            <a:ext uri="{909E8E84-426E-40DD-AFC4-6F175D3DCCD1}">
-              <a14:hiddenFill xmlns:a14="http://schemas.microsoft.com/office/drawing/2010/main">
-                <a:solidFill>
-                  <a:schemeClr val="accent1"/>
-                </a:solidFill>
-              </a14:hiddenFill>
-            </a:ext>
-            <a:ext uri="{91240B29-F687-4F45-9708-019B960494DF}">
-              <a14:hiddenLine xmlns:a14="http://schemas.microsoft.com/office/drawing/2010/main" w="9525">
-                <a:solidFill>
-                  <a:schemeClr val="tx1"/>
-                </a:solidFill>
-                <a:miter lim="800000"/>
-                <a:headEnd/>
-                <a:tailEnd/>
-              </a14:hiddenLine>
-            </a:ext>
-            <a:ext uri="{AF507438-7753-43E0-B8FC-AC1667EBCBE1}">
-              <a14:hiddenEffects xmlns:a14="http://schemas.microsoft.com/office/drawing/2010/main">
-                <a:effectLst>
-                  <a:outerShdw dist="35921" dir="2700000" algn="ctr" rotWithShape="0">
-                    <a:schemeClr val="bg2"/>
-                  </a:outerShdw>
-                </a:effectLst>
-              </a14:hiddenEffects>
-            </a:ext>
-          </a:extLst>
-        </p:spPr>
-        <p:txBody>
-          <a:bodyPr vert="horz" wrap="square" lIns="91440" tIns="45720" rIns="91440" bIns="45720" numCol="1" anchor="ctr" anchorCtr="0" compatLnSpc="1">
-            <a:prstTxWarp prst="textNoShape">
-              <a:avLst/>
-            </a:prstTxWarp>
-            <a:spAutoFit/>
-          </a:bodyPr>
-          <a:lstStyle/>
-          <a:p>
-            <a:pPr marL="0" marR="0" lvl="0" indent="0" algn="l" defTabSz="914400" rtl="0" eaLnBrk="0" fontAlgn="base" latinLnBrk="0" hangingPunct="0">
+            <a:pPr marL="0" lvl="0" indent="0" eaLnBrk="0" fontAlgn="base" hangingPunct="0">
               <a:lnSpc>
                 <a:spcPct val="100000"/>
               </a:lnSpc>
@@ -5909,77 +5686,18 @@
               <a:spcAft>
                 <a:spcPct val="0"/>
               </a:spcAft>
-              <a:buClrTx/>
-              <a:buSzTx/>
               <a:buFontTx/>
               <a:buChar char="•"/>
-              <a:tabLst/>
             </a:pPr>
             <a:r>
-              <a:rPr kumimoji="0" lang="en-KE" altLang="en-KE" sz="2400" b="1" i="0" u="none" strike="noStrike" cap="none" normalizeH="0" baseline="0" dirty="0">
-                <a:ln>
-                  <a:noFill/>
-                </a:ln>
-                <a:solidFill>
-                  <a:schemeClr val="tx1"/>
-                </a:solidFill>
-                <a:effectLst/>
-                <a:latin typeface="Arial" panose="020B0604020202020204" pitchFamily="34" charset="0"/>
-              </a:rPr>
-              <a:t>Genre matters</a:t>
-            </a:r>
-            <a:r>
-              <a:rPr kumimoji="0" lang="en-KE" altLang="en-KE" sz="2400" b="0" i="0" u="none" strike="noStrike" cap="none" normalizeH="0" baseline="0" dirty="0">
-                <a:ln>
-                  <a:noFill/>
-                </a:ln>
-                <a:solidFill>
-                  <a:schemeClr val="tx1"/>
-                </a:solidFill>
-                <a:effectLst/>
-                <a:latin typeface="Arial" panose="020B0604020202020204" pitchFamily="34" charset="0"/>
-              </a:rPr>
-              <a:t>: One-way ANOVA showed significant differences in average box office revenue across the top 10 genres (</a:t>
-            </a:r>
-            <a:r>
-              <a:rPr kumimoji="0" lang="en-KE" altLang="en-KE" sz="2400" b="1" i="0" u="none" strike="noStrike" cap="none" normalizeH="0" baseline="0" dirty="0">
-                <a:ln>
-                  <a:noFill/>
-                </a:ln>
-                <a:solidFill>
-                  <a:schemeClr val="tx1"/>
-                </a:solidFill>
-                <a:effectLst/>
-                <a:latin typeface="Arial" panose="020B0604020202020204" pitchFamily="34" charset="0"/>
-              </a:rPr>
-              <a:t>p &lt; 0.001</a:t>
-            </a:r>
-            <a:r>
-              <a:rPr kumimoji="0" lang="en-KE" altLang="en-KE" sz="2400" b="0" i="0" u="none" strike="noStrike" cap="none" normalizeH="0" baseline="0" dirty="0">
-                <a:ln>
-                  <a:noFill/>
-                </a:ln>
-                <a:solidFill>
-                  <a:schemeClr val="tx1"/>
-                </a:solidFill>
-                <a:effectLst/>
-                <a:latin typeface="Arial" panose="020B0604020202020204" pitchFamily="34" charset="0"/>
-              </a:rPr>
-              <a:t>).</a:t>
-            </a:r>
-            <a:endParaRPr kumimoji="0" lang="en-US" altLang="en-KE" sz="2400" b="0" i="0" u="none" strike="noStrike" cap="none" normalizeH="0" baseline="0" dirty="0">
-              <a:ln>
-                <a:noFill/>
-              </a:ln>
-              <a:solidFill>
-                <a:schemeClr val="tx1"/>
-              </a:solidFill>
-              <a:effectLst/>
-              <a:latin typeface="Arial" panose="020B0604020202020204" pitchFamily="34" charset="0"/>
-            </a:endParaRPr>
-          </a:p>
-          <a:p>
-            <a:pPr marL="0" marR="0" lvl="0" indent="0" algn="l" defTabSz="914400" rtl="0" eaLnBrk="0" fontAlgn="base" latinLnBrk="0" hangingPunct="0">
+              <a:rPr lang="en-US" altLang="en-KE" dirty="0">
+                <a:latin typeface="Arial" panose="020B0604020202020204" pitchFamily="34" charset="0"/>
+              </a:rPr>
+              <a:t>The output was positive therefore:</a:t>
+            </a:r>
+          </a:p>
+          <a:p>
+            <a:pPr marL="0" lvl="0" indent="0" eaLnBrk="0" fontAlgn="base" hangingPunct="0">
               <a:lnSpc>
                 <a:spcPct val="100000"/>
               </a:lnSpc>
@@ -5989,24 +5707,15 @@
               <a:spcAft>
                 <a:spcPct val="0"/>
               </a:spcAft>
-              <a:buClrTx/>
-              <a:buSzTx/>
-              <a:buNone/>
-              <a:tabLst/>
+              <a:buFontTx/>
+              <a:buChar char="•"/>
             </a:pPr>
-            <a:endParaRPr kumimoji="0" lang="en-KE" altLang="en-KE" sz="2400" b="0" i="0" u="none" strike="noStrike" cap="none" normalizeH="0" baseline="0" dirty="0">
-              <a:ln>
-                <a:noFill/>
-              </a:ln>
-              <a:solidFill>
-                <a:schemeClr val="tx1"/>
-              </a:solidFill>
-              <a:effectLst/>
+            <a:endParaRPr lang="en-US" altLang="en-KE" b="1" dirty="0">
               <a:latin typeface="Arial" panose="020B0604020202020204" pitchFamily="34" charset="0"/>
             </a:endParaRPr>
           </a:p>
           <a:p>
-            <a:pPr marL="0" marR="0" lvl="0" indent="0" algn="l" defTabSz="914400" rtl="0" eaLnBrk="0" fontAlgn="base" latinLnBrk="0" hangingPunct="0">
+            <a:pPr marL="0" lvl="0" indent="0" eaLnBrk="0" fontAlgn="base" hangingPunct="0">
               <a:lnSpc>
                 <a:spcPct val="100000"/>
               </a:lnSpc>
@@ -6016,77 +5725,39 @@
               <a:spcAft>
                 <a:spcPct val="0"/>
               </a:spcAft>
-              <a:buClrTx/>
-              <a:buSzTx/>
               <a:buFontTx/>
               <a:buChar char="•"/>
-              <a:tabLst/>
             </a:pPr>
             <a:r>
-              <a:rPr kumimoji="0" lang="en-KE" altLang="en-KE" sz="2400" b="1" i="0" u="none" strike="noStrike" cap="none" normalizeH="0" baseline="0" dirty="0">
-                <a:ln>
-                  <a:noFill/>
-                </a:ln>
-                <a:solidFill>
-                  <a:schemeClr val="tx1"/>
-                </a:solidFill>
-                <a:effectLst/>
-                <a:latin typeface="Arial" panose="020B0604020202020204" pitchFamily="34" charset="0"/>
-              </a:rPr>
-              <a:t>Directors influence success</a:t>
-            </a:r>
-            <a:r>
-              <a:rPr kumimoji="0" lang="en-KE" altLang="en-KE" sz="2400" b="0" i="0" u="none" strike="noStrike" cap="none" normalizeH="0" baseline="0" dirty="0">
-                <a:ln>
-                  <a:noFill/>
-                </a:ln>
-                <a:solidFill>
-                  <a:schemeClr val="tx1"/>
-                </a:solidFill>
-                <a:effectLst/>
-                <a:latin typeface="Arial" panose="020B0604020202020204" pitchFamily="34" charset="0"/>
-              </a:rPr>
-              <a:t>: T-test revealed that movies by top directors earn significantly more at the box office (</a:t>
-            </a:r>
-            <a:r>
-              <a:rPr kumimoji="0" lang="en-KE" altLang="en-KE" sz="2400" b="1" i="0" u="none" strike="noStrike" cap="none" normalizeH="0" baseline="0" dirty="0">
-                <a:ln>
-                  <a:noFill/>
-                </a:ln>
-                <a:solidFill>
-                  <a:schemeClr val="tx1"/>
-                </a:solidFill>
-                <a:effectLst/>
-                <a:latin typeface="Arial" panose="020B0604020202020204" pitchFamily="34" charset="0"/>
-              </a:rPr>
-              <a:t>p &lt; 0.001</a:t>
-            </a:r>
-            <a:r>
-              <a:rPr kumimoji="0" lang="en-KE" altLang="en-KE" sz="2400" b="0" i="0" u="none" strike="noStrike" cap="none" normalizeH="0" baseline="0" dirty="0">
-                <a:ln>
-                  <a:noFill/>
-                </a:ln>
-                <a:solidFill>
-                  <a:schemeClr val="tx1"/>
-                </a:solidFill>
-                <a:effectLst/>
-                <a:latin typeface="Arial" panose="020B0604020202020204" pitchFamily="34" charset="0"/>
-              </a:rPr>
-              <a:t>).</a:t>
-            </a:r>
-            <a:endParaRPr kumimoji="0" lang="en-US" altLang="en-KE" sz="2400" b="0" i="0" u="none" strike="noStrike" cap="none" normalizeH="0" baseline="0" dirty="0">
-              <a:ln>
-                <a:noFill/>
-              </a:ln>
-              <a:solidFill>
-                <a:schemeClr val="tx1"/>
-              </a:solidFill>
-              <a:effectLst/>
+              <a:rPr lang="en-KE" altLang="en-KE" b="1" dirty="0">
+                <a:latin typeface="Arial" panose="020B0604020202020204" pitchFamily="34" charset="0"/>
+              </a:rPr>
+              <a:t>Interpretation:</a:t>
+            </a:r>
+            <a:r>
+              <a:rPr lang="en-KE" altLang="en-KE" dirty="0">
+                <a:latin typeface="Arial" panose="020B0604020202020204" pitchFamily="34" charset="0"/>
+              </a:rPr>
+              <a:t> There is a </a:t>
+            </a:r>
+            <a:r>
+              <a:rPr lang="en-KE" altLang="en-KE" b="1" dirty="0">
+                <a:latin typeface="Arial" panose="020B0604020202020204" pitchFamily="34" charset="0"/>
+              </a:rPr>
+              <a:t>significant relationship</a:t>
+            </a:r>
+            <a:r>
+              <a:rPr lang="en-KE" altLang="en-KE" dirty="0">
+                <a:latin typeface="Arial" panose="020B0604020202020204" pitchFamily="34" charset="0"/>
+              </a:rPr>
+              <a:t> between movie genre and release month.</a:t>
+            </a:r>
+            <a:endParaRPr lang="en-US" altLang="en-KE" dirty="0">
               <a:latin typeface="Arial" panose="020B0604020202020204" pitchFamily="34" charset="0"/>
             </a:endParaRPr>
           </a:p>
           <a:p>
-            <a:pPr marL="0" marR="0" lvl="0" indent="0" algn="l" defTabSz="914400" rtl="0" eaLnBrk="0" fontAlgn="base" latinLnBrk="0" hangingPunct="0">
+            <a:pPr marL="0" lvl="0" indent="0" eaLnBrk="0" fontAlgn="base" hangingPunct="0">
               <a:lnSpc>
                 <a:spcPct val="100000"/>
               </a:lnSpc>
@@ -6096,25 +5767,15 @@
               <a:spcAft>
                 <a:spcPct val="0"/>
               </a:spcAft>
-              <a:buClrTx/>
-              <a:buSzTx/>
               <a:buFontTx/>
               <a:buChar char="•"/>
-              <a:tabLst/>
             </a:pPr>
-            <a:endParaRPr kumimoji="0" lang="en-KE" altLang="en-KE" sz="2400" b="0" i="0" u="none" strike="noStrike" cap="none" normalizeH="0" baseline="0" dirty="0">
-              <a:ln>
-                <a:noFill/>
-              </a:ln>
-              <a:solidFill>
-                <a:schemeClr val="tx1"/>
-              </a:solidFill>
-              <a:effectLst/>
+            <a:endParaRPr lang="en-KE" altLang="en-KE" dirty="0">
               <a:latin typeface="Arial" panose="020B0604020202020204" pitchFamily="34" charset="0"/>
             </a:endParaRPr>
           </a:p>
           <a:p>
-            <a:pPr marL="0" marR="0" lvl="0" indent="0" algn="l" defTabSz="914400" rtl="0" eaLnBrk="0" fontAlgn="base" latinLnBrk="0" hangingPunct="0">
+            <a:pPr marL="0" lvl="0" indent="0" eaLnBrk="0" fontAlgn="base" hangingPunct="0">
               <a:lnSpc>
                 <a:spcPct val="100000"/>
               </a:lnSpc>
@@ -6124,205 +5785,46 @@
               <a:spcAft>
                 <a:spcPct val="0"/>
               </a:spcAft>
-              <a:buClrTx/>
-              <a:buSzTx/>
               <a:buFontTx/>
               <a:buChar char="•"/>
-              <a:tabLst/>
             </a:pPr>
             <a:r>
-              <a:rPr kumimoji="0" lang="en-KE" altLang="en-KE" sz="2400" b="1" i="0" u="none" strike="noStrike" cap="none" normalizeH="0" baseline="0" dirty="0">
-                <a:ln>
-                  <a:noFill/>
-                </a:ln>
-                <a:solidFill>
-                  <a:schemeClr val="tx1"/>
-                </a:solidFill>
-                <a:effectLst/>
-                <a:latin typeface="Arial" panose="020B0604020202020204" pitchFamily="34" charset="0"/>
-              </a:rPr>
-              <a:t>Studios differ in performance</a:t>
-            </a:r>
-            <a:r>
-              <a:rPr kumimoji="0" lang="en-KE" altLang="en-KE" sz="2400" b="0" i="0" u="none" strike="noStrike" cap="none" normalizeH="0" baseline="0" dirty="0">
-                <a:ln>
-                  <a:noFill/>
-                </a:ln>
-                <a:solidFill>
-                  <a:schemeClr val="tx1"/>
-                </a:solidFill>
-                <a:effectLst/>
-                <a:latin typeface="Arial" panose="020B0604020202020204" pitchFamily="34" charset="0"/>
-              </a:rPr>
-              <a:t>: ANOVA showed that some studios consistently produce higher-grossing films (</a:t>
-            </a:r>
-            <a:r>
-              <a:rPr kumimoji="0" lang="en-KE" altLang="en-KE" sz="2400" b="1" i="0" u="none" strike="noStrike" cap="none" normalizeH="0" baseline="0" dirty="0">
-                <a:ln>
-                  <a:noFill/>
-                </a:ln>
-                <a:solidFill>
-                  <a:schemeClr val="tx1"/>
-                </a:solidFill>
-                <a:effectLst/>
-                <a:latin typeface="Arial" panose="020B0604020202020204" pitchFamily="34" charset="0"/>
-              </a:rPr>
-              <a:t>p &lt; 0.001</a:t>
-            </a:r>
-            <a:r>
-              <a:rPr kumimoji="0" lang="en-KE" altLang="en-KE" sz="2400" b="0" i="0" u="none" strike="noStrike" cap="none" normalizeH="0" baseline="0" dirty="0">
-                <a:ln>
-                  <a:noFill/>
-                </a:ln>
-                <a:solidFill>
-                  <a:schemeClr val="tx1"/>
-                </a:solidFill>
-                <a:effectLst/>
-                <a:latin typeface="Arial" panose="020B0604020202020204" pitchFamily="34" charset="0"/>
-              </a:rPr>
-              <a:t>), which can inform strategic partnerships or hiring.</a:t>
-            </a:r>
-            <a:endParaRPr kumimoji="0" lang="en-US" altLang="en-KE" sz="2400" b="0" i="0" u="none" strike="noStrike" cap="none" normalizeH="0" baseline="0" dirty="0">
-              <a:ln>
-                <a:noFill/>
-              </a:ln>
-              <a:solidFill>
-                <a:schemeClr val="tx1"/>
-              </a:solidFill>
-              <a:effectLst/>
+              <a:rPr lang="en-KE" altLang="en-KE" dirty="0">
+                <a:latin typeface="Arial" panose="020B0604020202020204" pitchFamily="34" charset="0"/>
+              </a:rPr>
+              <a:t>This suggests studios may </a:t>
+            </a:r>
+            <a:r>
+              <a:rPr lang="en-KE" altLang="en-KE" b="1" dirty="0">
+                <a:latin typeface="Arial" panose="020B0604020202020204" pitchFamily="34" charset="0"/>
+              </a:rPr>
+              <a:t>strategically release certain genres</a:t>
+            </a:r>
+            <a:r>
+              <a:rPr lang="en-KE" altLang="en-KE" dirty="0">
+                <a:latin typeface="Arial" panose="020B0604020202020204" pitchFamily="34" charset="0"/>
+              </a:rPr>
+              <a:t> during specific months </a:t>
+            </a:r>
+            <a:r>
+              <a:rPr lang="en-US" altLang="en-KE" dirty="0">
+                <a:latin typeface="Arial" panose="020B0604020202020204" pitchFamily="34" charset="0"/>
+              </a:rPr>
+              <a:t>to ensure and also bolster box office performance.</a:t>
+            </a:r>
+            <a:endParaRPr lang="en-KE" altLang="en-KE" dirty="0">
               <a:latin typeface="Arial" panose="020B0604020202020204" pitchFamily="34" charset="0"/>
             </a:endParaRPr>
           </a:p>
           <a:p>
-            <a:pPr marL="0" marR="0" lvl="0" indent="0" algn="l" defTabSz="914400" rtl="0" eaLnBrk="0" fontAlgn="base" latinLnBrk="0" hangingPunct="0">
-              <a:lnSpc>
-                <a:spcPct val="100000"/>
-              </a:lnSpc>
-              <a:spcBef>
-                <a:spcPct val="0"/>
-              </a:spcBef>
-              <a:spcAft>
-                <a:spcPct val="0"/>
-              </a:spcAft>
-              <a:buClrTx/>
-              <a:buSzTx/>
-              <a:buFontTx/>
-              <a:buChar char="•"/>
-              <a:tabLst/>
-            </a:pPr>
-            <a:endParaRPr kumimoji="0" lang="en-KE" altLang="en-KE" sz="2400" b="0" i="0" u="none" strike="noStrike" cap="none" normalizeH="0" baseline="0" dirty="0">
-              <a:ln>
-                <a:noFill/>
-              </a:ln>
-              <a:solidFill>
-                <a:schemeClr val="tx1"/>
-              </a:solidFill>
-              <a:effectLst/>
-              <a:latin typeface="Arial" panose="020B0604020202020204" pitchFamily="34" charset="0"/>
-            </a:endParaRPr>
-          </a:p>
-          <a:p>
-            <a:pPr marL="0" marR="0" lvl="0" indent="0" algn="l" defTabSz="914400" rtl="0" eaLnBrk="0" fontAlgn="base" latinLnBrk="0" hangingPunct="0">
-              <a:lnSpc>
-                <a:spcPct val="100000"/>
-              </a:lnSpc>
-              <a:spcBef>
-                <a:spcPct val="0"/>
-              </a:spcBef>
-              <a:spcAft>
-                <a:spcPct val="0"/>
-              </a:spcAft>
-              <a:buClrTx/>
-              <a:buSzTx/>
-              <a:buFontTx/>
-              <a:buChar char="•"/>
-              <a:tabLst/>
-            </a:pPr>
-            <a:r>
-              <a:rPr kumimoji="0" lang="en-KE" altLang="en-KE" sz="2400" b="1" i="0" u="none" strike="noStrike" cap="none" normalizeH="0" baseline="0" dirty="0">
-                <a:ln>
-                  <a:noFill/>
-                </a:ln>
-                <a:solidFill>
-                  <a:schemeClr val="tx1"/>
-                </a:solidFill>
-                <a:effectLst/>
-                <a:latin typeface="Arial" panose="020B0604020202020204" pitchFamily="34" charset="0"/>
-              </a:rPr>
-              <a:t>Timing is strategic</a:t>
-            </a:r>
-            <a:r>
-              <a:rPr kumimoji="0" lang="en-KE" altLang="en-KE" sz="2400" b="0" i="0" u="none" strike="noStrike" cap="none" normalizeH="0" baseline="0" dirty="0">
-                <a:ln>
-                  <a:noFill/>
-                </a:ln>
-                <a:solidFill>
-                  <a:schemeClr val="tx1"/>
-                </a:solidFill>
-                <a:effectLst/>
-                <a:latin typeface="Arial" panose="020B0604020202020204" pitchFamily="34" charset="0"/>
-              </a:rPr>
-              <a:t>: Chi-square test indicated a strong relationship between </a:t>
-            </a:r>
-            <a:r>
-              <a:rPr kumimoji="0" lang="en-KE" altLang="en-KE" sz="2400" b="1" i="0" u="none" strike="noStrike" cap="none" normalizeH="0" baseline="0" dirty="0">
-                <a:ln>
-                  <a:noFill/>
-                </a:ln>
-                <a:solidFill>
-                  <a:schemeClr val="tx1"/>
-                </a:solidFill>
-                <a:effectLst/>
-                <a:latin typeface="Arial" panose="020B0604020202020204" pitchFamily="34" charset="0"/>
-              </a:rPr>
-              <a:t>genre and release month</a:t>
-            </a:r>
-            <a:r>
-              <a:rPr kumimoji="0" lang="en-KE" altLang="en-KE" sz="2400" b="0" i="0" u="none" strike="noStrike" cap="none" normalizeH="0" baseline="0" dirty="0">
-                <a:ln>
-                  <a:noFill/>
-                </a:ln>
-                <a:solidFill>
-                  <a:schemeClr val="tx1"/>
-                </a:solidFill>
-                <a:effectLst/>
-                <a:latin typeface="Arial" panose="020B0604020202020204" pitchFamily="34" charset="0"/>
-              </a:rPr>
-              <a:t> (</a:t>
-            </a:r>
-            <a:r>
-              <a:rPr kumimoji="0" lang="en-KE" altLang="en-KE" sz="2400" b="1" i="0" u="none" strike="noStrike" cap="none" normalizeH="0" baseline="0" dirty="0">
-                <a:ln>
-                  <a:noFill/>
-                </a:ln>
-                <a:solidFill>
-                  <a:schemeClr val="tx1"/>
-                </a:solidFill>
-                <a:effectLst/>
-                <a:latin typeface="Arial" panose="020B0604020202020204" pitchFamily="34" charset="0"/>
-              </a:rPr>
-              <a:t>p &lt; 0.001</a:t>
-            </a:r>
-            <a:r>
-              <a:rPr kumimoji="0" lang="en-KE" altLang="en-KE" sz="2400" b="0" i="0" u="none" strike="noStrike" cap="none" normalizeH="0" baseline="0" dirty="0">
-                <a:ln>
-                  <a:noFill/>
-                </a:ln>
-                <a:solidFill>
-                  <a:schemeClr val="tx1"/>
-                </a:solidFill>
-                <a:effectLst/>
-                <a:latin typeface="Arial" panose="020B0604020202020204" pitchFamily="34" charset="0"/>
-              </a:rPr>
-              <a:t>), suggesting that studios time genre releases for maximum impact (e.g., horror in October).</a:t>
-            </a:r>
+            <a:endParaRPr lang="en-KE" dirty="0"/>
           </a:p>
         </p:txBody>
       </p:sp>
     </p:spTree>
     <p:extLst>
       <p:ext uri="{BB962C8B-B14F-4D97-AF65-F5344CB8AC3E}">
-        <p14:creationId xmlns:p14="http://schemas.microsoft.com/office/powerpoint/2010/main" val="2053269616"/>
+        <p14:creationId xmlns:p14="http://schemas.microsoft.com/office/powerpoint/2010/main" val="173752300"/>
       </p:ext>
     </p:extLst>
   </p:cSld>
@@ -6351,10 +5853,10 @@
       </p:grpSpPr>
       <p:sp>
         <p:nvSpPr>
-          <p:cNvPr id="3" name="Content Placeholder 2">
+          <p:cNvPr id="2" name="Title 1">
             <a:extLst>
               <a:ext uri="{FF2B5EF4-FFF2-40B4-BE49-F238E27FC236}">
-                <a16:creationId xmlns:a16="http://schemas.microsoft.com/office/drawing/2014/main" id="{CF1F485A-C5F5-43D9-8FE0-A5532557F62D}"/>
+                <a16:creationId xmlns:a16="http://schemas.microsoft.com/office/drawing/2014/main" id="{279F1B92-D7C1-485E-9C5D-11D055EAC023}"/>
               </a:ext>
             </a:extLst>
           </p:cNvPr>
@@ -6362,71 +5864,31 @@
             <a:spLocks noGrp="1"/>
           </p:cNvSpPr>
           <p:nvPr>
-            <p:ph idx="1"/>
+            <p:ph type="title"/>
           </p:nvPr>
         </p:nvSpPr>
         <p:spPr>
           <a:xfrm>
-            <a:off x="479384" y="357869"/>
-            <a:ext cx="10515600" cy="1218518"/>
+            <a:off x="838200" y="2298097"/>
+            <a:ext cx="10515600" cy="1325563"/>
           </a:xfrm>
         </p:spPr>
         <p:txBody>
-          <a:bodyPr>
-            <a:normAutofit/>
-          </a:bodyPr>
+          <a:bodyPr/>
           <a:lstStyle/>
           <a:p>
             <a:r>
               <a:rPr lang="en-US" dirty="0"/>
-              <a:t>For director purposes we compiled a list of top directors according to box office performance that would be </a:t>
-            </a:r>
-            <a:r>
-              <a:rPr lang="en-US" dirty="0" err="1"/>
-              <a:t>favourable</a:t>
-            </a:r>
-            <a:r>
-              <a:rPr lang="en-US" dirty="0"/>
-              <a:t> to boost performance</a:t>
+              <a:t>CONCLUSIONS</a:t>
             </a:r>
             <a:endParaRPr lang="en-KE" dirty="0"/>
           </a:p>
         </p:txBody>
       </p:sp>
-      <p:pic>
-        <p:nvPicPr>
-          <p:cNvPr id="5" name="Picture 4">
-            <a:extLst>
-              <a:ext uri="{FF2B5EF4-FFF2-40B4-BE49-F238E27FC236}">
-                <a16:creationId xmlns:a16="http://schemas.microsoft.com/office/drawing/2014/main" id="{66C356B0-2AB7-4C8A-AFB1-EBF7AEE62F4E}"/>
-              </a:ext>
-            </a:extLst>
-          </p:cNvPr>
-          <p:cNvPicPr>
-            <a:picLocks noChangeAspect="1"/>
-          </p:cNvPicPr>
-          <p:nvPr/>
-        </p:nvPicPr>
-        <p:blipFill>
-          <a:blip r:embed="rId2"/>
-          <a:stretch>
-            <a:fillRect/>
-          </a:stretch>
-        </p:blipFill>
-        <p:spPr>
-          <a:xfrm>
-            <a:off x="0" y="1590191"/>
-            <a:ext cx="11948834" cy="4909939"/>
-          </a:xfrm>
-          <a:prstGeom prst="rect">
-            <a:avLst/>
-          </a:prstGeom>
-        </p:spPr>
-      </p:pic>
     </p:spTree>
     <p:extLst>
       <p:ext uri="{BB962C8B-B14F-4D97-AF65-F5344CB8AC3E}">
-        <p14:creationId xmlns:p14="http://schemas.microsoft.com/office/powerpoint/2010/main" val="3644974613"/>
+        <p14:creationId xmlns:p14="http://schemas.microsoft.com/office/powerpoint/2010/main" val="1371836298"/>
       </p:ext>
     </p:extLst>
   </p:cSld>
@@ -6455,6 +5917,438 @@
       </p:grpSpPr>
       <p:sp>
         <p:nvSpPr>
+          <p:cNvPr id="2" name="Title 1">
+            <a:extLst>
+              <a:ext uri="{FF2B5EF4-FFF2-40B4-BE49-F238E27FC236}">
+                <a16:creationId xmlns:a16="http://schemas.microsoft.com/office/drawing/2014/main" id="{516D0B11-85BA-4AD6-835D-20A0E036B2FA}"/>
+              </a:ext>
+            </a:extLst>
+          </p:cNvPr>
+          <p:cNvSpPr>
+            <a:spLocks noGrp="1"/>
+          </p:cNvSpPr>
+          <p:nvPr>
+            <p:ph type="title"/>
+          </p:nvPr>
+        </p:nvSpPr>
+        <p:spPr/>
+        <p:txBody>
+          <a:bodyPr/>
+          <a:lstStyle/>
+          <a:p>
+            <a:r>
+              <a:rPr lang="en-US" dirty="0"/>
+              <a:t>TOP DIRECTORS.</a:t>
+            </a:r>
+            <a:endParaRPr lang="en-KE" dirty="0"/>
+          </a:p>
+        </p:txBody>
+      </p:sp>
+      <p:sp>
+        <p:nvSpPr>
+          <p:cNvPr id="3" name="Content Placeholder 2">
+            <a:extLst>
+              <a:ext uri="{FF2B5EF4-FFF2-40B4-BE49-F238E27FC236}">
+                <a16:creationId xmlns:a16="http://schemas.microsoft.com/office/drawing/2014/main" id="{F686D493-1841-4C5C-93BC-E862F9EBDAF5}"/>
+              </a:ext>
+            </a:extLst>
+          </p:cNvPr>
+          <p:cNvSpPr>
+            <a:spLocks noGrp="1"/>
+          </p:cNvSpPr>
+          <p:nvPr>
+            <p:ph idx="1"/>
+          </p:nvPr>
+        </p:nvSpPr>
+        <p:spPr/>
+        <p:txBody>
+          <a:bodyPr>
+            <a:normAutofit/>
+          </a:bodyPr>
+          <a:lstStyle/>
+          <a:p>
+            <a:r>
+              <a:rPr lang="en-US" b="1" dirty="0"/>
+              <a:t>Invest in Top Directors to Boost Revenue Potential is a conclusion drawn from the directors vs gross income</a:t>
+            </a:r>
+            <a:endParaRPr lang="en-US" dirty="0"/>
+          </a:p>
+          <a:p>
+            <a:r>
+              <a:rPr lang="en-US" dirty="0"/>
+              <a:t>The test comparing films directed by "top directors" versus others showed a statistically significant difference in box office earnings. This suggests that audiences may be more likely to attend films associated with well-known or critically acclaimed directors. </a:t>
+            </a:r>
+          </a:p>
+          <a:p>
+            <a:r>
+              <a:rPr lang="en-US" dirty="0"/>
+              <a:t>Studios should aim to build long-term relationships with top directors or emerging directors who show consistent box office performance.</a:t>
+            </a:r>
+          </a:p>
+          <a:p>
+            <a:endParaRPr lang="en-KE" dirty="0"/>
+          </a:p>
+        </p:txBody>
+      </p:sp>
+    </p:spTree>
+    <p:extLst>
+      <p:ext uri="{BB962C8B-B14F-4D97-AF65-F5344CB8AC3E}">
+        <p14:creationId xmlns:p14="http://schemas.microsoft.com/office/powerpoint/2010/main" val="2170437452"/>
+      </p:ext>
+    </p:extLst>
+  </p:cSld>
+  <p:clrMapOvr>
+    <a:masterClrMapping/>
+  </p:clrMapOvr>
+</p:sld>
+</file>
+
+<file path=ppt/slides/slide24.xml><?xml version="1.0" encoding="utf-8"?>
+<p:sld xmlns:a="http://schemas.openxmlformats.org/drawingml/2006/main" xmlns:r="http://schemas.openxmlformats.org/officeDocument/2006/relationships" xmlns:p="http://schemas.openxmlformats.org/presentationml/2006/main">
+  <p:cSld>
+    <p:spTree>
+      <p:nvGrpSpPr>
+        <p:cNvPr id="1" name=""/>
+        <p:cNvGrpSpPr/>
+        <p:nvPr/>
+      </p:nvGrpSpPr>
+      <p:grpSpPr>
+        <a:xfrm>
+          <a:off x="0" y="0"/>
+          <a:ext cx="0" cy="0"/>
+          <a:chOff x="0" y="0"/>
+          <a:chExt cx="0" cy="0"/>
+        </a:xfrm>
+      </p:grpSpPr>
+      <p:sp>
+        <p:nvSpPr>
+          <p:cNvPr id="2" name="Title 1">
+            <a:extLst>
+              <a:ext uri="{FF2B5EF4-FFF2-40B4-BE49-F238E27FC236}">
+                <a16:creationId xmlns:a16="http://schemas.microsoft.com/office/drawing/2014/main" id="{78F699BE-0C88-4F2E-9776-B9C23998C5A5}"/>
+              </a:ext>
+            </a:extLst>
+          </p:cNvPr>
+          <p:cNvSpPr>
+            <a:spLocks noGrp="1"/>
+          </p:cNvSpPr>
+          <p:nvPr>
+            <p:ph type="title"/>
+          </p:nvPr>
+        </p:nvSpPr>
+        <p:spPr/>
+        <p:txBody>
+          <a:bodyPr/>
+          <a:lstStyle/>
+          <a:p>
+            <a:r>
+              <a:rPr lang="en-US" dirty="0"/>
+              <a:t>STUDIO PERFORMANCE</a:t>
+            </a:r>
+            <a:endParaRPr lang="en-KE" dirty="0"/>
+          </a:p>
+        </p:txBody>
+      </p:sp>
+      <p:sp>
+        <p:nvSpPr>
+          <p:cNvPr id="3" name="Content Placeholder 2">
+            <a:extLst>
+              <a:ext uri="{FF2B5EF4-FFF2-40B4-BE49-F238E27FC236}">
+                <a16:creationId xmlns:a16="http://schemas.microsoft.com/office/drawing/2014/main" id="{8AD2ED58-B523-413E-BEA1-C20C480FFDC5}"/>
+              </a:ext>
+            </a:extLst>
+          </p:cNvPr>
+          <p:cNvSpPr>
+            <a:spLocks noGrp="1"/>
+          </p:cNvSpPr>
+          <p:nvPr>
+            <p:ph idx="1"/>
+          </p:nvPr>
+        </p:nvSpPr>
+        <p:spPr/>
+        <p:txBody>
+          <a:bodyPr/>
+          <a:lstStyle/>
+          <a:p>
+            <a:r>
+              <a:rPr lang="en-US" b="1" dirty="0"/>
+              <a:t>Model After High-Performing Studios that </a:t>
+            </a:r>
+            <a:r>
+              <a:rPr lang="en-US" b="1" dirty="0" err="1"/>
+              <a:t>wer</a:t>
+            </a:r>
+            <a:r>
+              <a:rPr lang="en-US" b="1" dirty="0"/>
+              <a:t> identified in the test above.</a:t>
+            </a:r>
+          </a:p>
+          <a:p>
+            <a:r>
+              <a:rPr lang="en-US" dirty="0"/>
+              <a:t>Test showed that there was significant difference in studio performances.</a:t>
+            </a:r>
+          </a:p>
+          <a:p>
+            <a:r>
+              <a:rPr lang="en-US" dirty="0"/>
+              <a:t>Among the top five studios analyzed, Universal Pictures and Sony Pictures produced films with the highest revenue potential. A new studio could analyze their portfolios, production budgets, and content strategies to learn how to replicate success.</a:t>
+            </a:r>
+          </a:p>
+          <a:p>
+            <a:r>
+              <a:rPr lang="en-US" dirty="0"/>
+              <a:t> Partnering with or hiring experienced executives from these studios could also be advantageous.</a:t>
+            </a:r>
+          </a:p>
+          <a:p>
+            <a:endParaRPr lang="en-KE" dirty="0"/>
+          </a:p>
+        </p:txBody>
+      </p:sp>
+    </p:spTree>
+    <p:extLst>
+      <p:ext uri="{BB962C8B-B14F-4D97-AF65-F5344CB8AC3E}">
+        <p14:creationId xmlns:p14="http://schemas.microsoft.com/office/powerpoint/2010/main" val="2152326801"/>
+      </p:ext>
+    </p:extLst>
+  </p:cSld>
+  <p:clrMapOvr>
+    <a:masterClrMapping/>
+  </p:clrMapOvr>
+</p:sld>
+</file>
+
+<file path=ppt/slides/slide25.xml><?xml version="1.0" encoding="utf-8"?>
+<p:sld xmlns:a="http://schemas.openxmlformats.org/drawingml/2006/main" xmlns:r="http://schemas.openxmlformats.org/officeDocument/2006/relationships" xmlns:p="http://schemas.openxmlformats.org/presentationml/2006/main">
+  <p:cSld>
+    <p:spTree>
+      <p:nvGrpSpPr>
+        <p:cNvPr id="1" name=""/>
+        <p:cNvGrpSpPr/>
+        <p:nvPr/>
+      </p:nvGrpSpPr>
+      <p:grpSpPr>
+        <a:xfrm>
+          <a:off x="0" y="0"/>
+          <a:ext cx="0" cy="0"/>
+          <a:chOff x="0" y="0"/>
+          <a:chExt cx="0" cy="0"/>
+        </a:xfrm>
+      </p:grpSpPr>
+      <p:sp>
+        <p:nvSpPr>
+          <p:cNvPr id="2" name="Title 1">
+            <a:extLst>
+              <a:ext uri="{FF2B5EF4-FFF2-40B4-BE49-F238E27FC236}">
+                <a16:creationId xmlns:a16="http://schemas.microsoft.com/office/drawing/2014/main" id="{CD72B7F5-BB8D-4721-A463-395ACEDE2779}"/>
+              </a:ext>
+            </a:extLst>
+          </p:cNvPr>
+          <p:cNvSpPr>
+            <a:spLocks noGrp="1"/>
+          </p:cNvSpPr>
+          <p:nvPr>
+            <p:ph type="title"/>
+          </p:nvPr>
+        </p:nvSpPr>
+        <p:spPr>
+          <a:xfrm>
+            <a:off x="1451579" y="804519"/>
+            <a:ext cx="9603275" cy="1049235"/>
+          </a:xfrm>
+        </p:spPr>
+        <p:txBody>
+          <a:bodyPr/>
+          <a:lstStyle/>
+          <a:p>
+            <a:r>
+              <a:rPr lang="en-US" dirty="0"/>
+              <a:t>GENRE Performance</a:t>
+            </a:r>
+            <a:endParaRPr lang="en-KE" dirty="0"/>
+          </a:p>
+        </p:txBody>
+      </p:sp>
+      <p:sp>
+        <p:nvSpPr>
+          <p:cNvPr id="3" name="Content Placeholder 2">
+            <a:extLst>
+              <a:ext uri="{FF2B5EF4-FFF2-40B4-BE49-F238E27FC236}">
+                <a16:creationId xmlns:a16="http://schemas.microsoft.com/office/drawing/2014/main" id="{56A53C18-DDBC-4204-BD7D-18A7F8EBDE08}"/>
+              </a:ext>
+            </a:extLst>
+          </p:cNvPr>
+          <p:cNvSpPr>
+            <a:spLocks noGrp="1"/>
+          </p:cNvSpPr>
+          <p:nvPr>
+            <p:ph idx="1"/>
+          </p:nvPr>
+        </p:nvSpPr>
+        <p:spPr/>
+        <p:txBody>
+          <a:bodyPr/>
+          <a:lstStyle/>
+          <a:p>
+            <a:r>
+              <a:rPr lang="en-US" b="1" dirty="0"/>
+              <a:t>Prioritize Animation and Action/Adventure genres when choosing films to produce.</a:t>
+            </a:r>
+          </a:p>
+          <a:p>
+            <a:r>
+              <a:rPr lang="en-US" dirty="0"/>
+              <a:t>The analysis revealed that films in the Animation and Action and Adventure genres consistently achieved the highest median and upper-quartile box office returns.</a:t>
+            </a:r>
+          </a:p>
+          <a:p>
+            <a:r>
+              <a:rPr lang="en-US" dirty="0"/>
+              <a:t>Animation, in particular, showed tightly clustered high-performing results with relatively fewer low outliers.</a:t>
+            </a:r>
+          </a:p>
+          <a:p>
+            <a:endParaRPr lang="en-KE" dirty="0"/>
+          </a:p>
+        </p:txBody>
+      </p:sp>
+    </p:spTree>
+    <p:extLst>
+      <p:ext uri="{BB962C8B-B14F-4D97-AF65-F5344CB8AC3E}">
+        <p14:creationId xmlns:p14="http://schemas.microsoft.com/office/powerpoint/2010/main" val="546283827"/>
+      </p:ext>
+    </p:extLst>
+  </p:cSld>
+  <p:clrMapOvr>
+    <a:masterClrMapping/>
+  </p:clrMapOvr>
+</p:sld>
+</file>
+
+<file path=ppt/slides/slide26.xml><?xml version="1.0" encoding="utf-8"?>
+<p:sld xmlns:a="http://schemas.openxmlformats.org/drawingml/2006/main" xmlns:r="http://schemas.openxmlformats.org/officeDocument/2006/relationships" xmlns:p="http://schemas.openxmlformats.org/presentationml/2006/main">
+  <p:cSld>
+    <p:spTree>
+      <p:nvGrpSpPr>
+        <p:cNvPr id="1" name=""/>
+        <p:cNvGrpSpPr/>
+        <p:nvPr/>
+      </p:nvGrpSpPr>
+      <p:grpSpPr>
+        <a:xfrm>
+          <a:off x="0" y="0"/>
+          <a:ext cx="0" cy="0"/>
+          <a:chOff x="0" y="0"/>
+          <a:chExt cx="0" cy="0"/>
+        </a:xfrm>
+      </p:grpSpPr>
+      <p:sp>
+        <p:nvSpPr>
+          <p:cNvPr id="3" name="Content Placeholder 2">
+            <a:extLst>
+              <a:ext uri="{FF2B5EF4-FFF2-40B4-BE49-F238E27FC236}">
+                <a16:creationId xmlns:a16="http://schemas.microsoft.com/office/drawing/2014/main" id="{CF1F485A-C5F5-43D9-8FE0-A5532557F62D}"/>
+              </a:ext>
+            </a:extLst>
+          </p:cNvPr>
+          <p:cNvSpPr>
+            <a:spLocks noGrp="1"/>
+          </p:cNvSpPr>
+          <p:nvPr>
+            <p:ph idx="1"/>
+          </p:nvPr>
+        </p:nvSpPr>
+        <p:spPr>
+          <a:xfrm>
+            <a:off x="1176968" y="706662"/>
+            <a:ext cx="10515600" cy="1218518"/>
+          </a:xfrm>
+        </p:spPr>
+        <p:txBody>
+          <a:bodyPr>
+            <a:normAutofit/>
+          </a:bodyPr>
+          <a:lstStyle/>
+          <a:p>
+            <a:r>
+              <a:rPr lang="en-US" dirty="0"/>
+              <a:t>For director purposes we compiled a list of top directors according to box office performance that would be </a:t>
+            </a:r>
+            <a:r>
+              <a:rPr lang="en-US" dirty="0" err="1"/>
+              <a:t>favourable</a:t>
+            </a:r>
+            <a:r>
+              <a:rPr lang="en-US" dirty="0"/>
+              <a:t> to boost performance</a:t>
+            </a:r>
+            <a:endParaRPr lang="en-KE" dirty="0"/>
+          </a:p>
+        </p:txBody>
+      </p:sp>
+      <p:pic>
+        <p:nvPicPr>
+          <p:cNvPr id="5" name="Picture 4">
+            <a:extLst>
+              <a:ext uri="{FF2B5EF4-FFF2-40B4-BE49-F238E27FC236}">
+                <a16:creationId xmlns:a16="http://schemas.microsoft.com/office/drawing/2014/main" id="{66C356B0-2AB7-4C8A-AFB1-EBF7AEE62F4E}"/>
+              </a:ext>
+            </a:extLst>
+          </p:cNvPr>
+          <p:cNvPicPr>
+            <a:picLocks noChangeAspect="1"/>
+          </p:cNvPicPr>
+          <p:nvPr/>
+        </p:nvPicPr>
+        <p:blipFill>
+          <a:blip r:embed="rId2"/>
+          <a:stretch>
+            <a:fillRect/>
+          </a:stretch>
+        </p:blipFill>
+        <p:spPr>
+          <a:xfrm>
+            <a:off x="960152" y="2089012"/>
+            <a:ext cx="9088822" cy="4062326"/>
+          </a:xfrm>
+          <a:prstGeom prst="rect">
+            <a:avLst/>
+          </a:prstGeom>
+        </p:spPr>
+      </p:pic>
+    </p:spTree>
+    <p:extLst>
+      <p:ext uri="{BB962C8B-B14F-4D97-AF65-F5344CB8AC3E}">
+        <p14:creationId xmlns:p14="http://schemas.microsoft.com/office/powerpoint/2010/main" val="3644974613"/>
+      </p:ext>
+    </p:extLst>
+  </p:cSld>
+  <p:clrMapOvr>
+    <a:masterClrMapping/>
+  </p:clrMapOvr>
+</p:sld>
+</file>
+
+<file path=ppt/slides/slide27.xml><?xml version="1.0" encoding="utf-8"?>
+<p:sld xmlns:a="http://schemas.openxmlformats.org/drawingml/2006/main" xmlns:r="http://schemas.openxmlformats.org/officeDocument/2006/relationships" xmlns:p="http://schemas.openxmlformats.org/presentationml/2006/main">
+  <p:cSld>
+    <p:spTree>
+      <p:nvGrpSpPr>
+        <p:cNvPr id="1" name=""/>
+        <p:cNvGrpSpPr/>
+        <p:nvPr/>
+      </p:nvGrpSpPr>
+      <p:grpSpPr>
+        <a:xfrm>
+          <a:off x="0" y="0"/>
+          <a:ext cx="0" cy="0"/>
+          <a:chOff x="0" y="0"/>
+          <a:chExt cx="0" cy="0"/>
+        </a:xfrm>
+      </p:grpSpPr>
+      <p:sp>
+        <p:nvSpPr>
           <p:cNvPr id="3" name="Content Placeholder 2">
             <a:extLst>
               <a:ext uri="{FF2B5EF4-FFF2-40B4-BE49-F238E27FC236}">
@@ -6471,7 +6365,7 @@
         </p:nvSpPr>
         <p:spPr>
           <a:xfrm>
-            <a:off x="618280" y="448238"/>
+            <a:off x="1268729" y="683444"/>
             <a:ext cx="10667035" cy="1183792"/>
           </a:xfrm>
         </p:spPr>
@@ -6483,15 +6377,7 @@
           <a:p>
             <a:r>
               <a:rPr lang="en-US" dirty="0"/>
-              <a:t>For studios that performed well we compiled a list of the top 10 studios according to </a:t>
-            </a:r>
-            <a:r>
-              <a:rPr lang="en-US" dirty="0" err="1"/>
-              <a:t>internation</a:t>
-            </a:r>
-            <a:r>
-              <a:rPr lang="en-US" dirty="0"/>
-              <a:t> box office gross income to aid in future collaboration</a:t>
+              <a:t>For studios that performed well we compiled a list of the top 10 studios according to international box office gross income to aid in future collaboration.</a:t>
             </a:r>
             <a:endParaRPr lang="en-KE" dirty="0"/>
           </a:p>
@@ -6519,8 +6405,8 @@
         </p:blipFill>
         <p:spPr>
           <a:xfrm>
-            <a:off x="141130" y="1423867"/>
-            <a:ext cx="11432589" cy="5114927"/>
+            <a:off x="618280" y="1923068"/>
+            <a:ext cx="9715334" cy="4251488"/>
           </a:xfrm>
           <a:prstGeom prst="rect">
             <a:avLst/>
@@ -6531,6 +6417,225 @@
     <p:extLst>
       <p:ext uri="{BB962C8B-B14F-4D97-AF65-F5344CB8AC3E}">
         <p14:creationId xmlns:p14="http://schemas.microsoft.com/office/powerpoint/2010/main" val="1757081610"/>
+      </p:ext>
+    </p:extLst>
+  </p:cSld>
+  <p:clrMapOvr>
+    <a:masterClrMapping/>
+  </p:clrMapOvr>
+</p:sld>
+</file>
+
+<file path=ppt/slides/slide28.xml><?xml version="1.0" encoding="utf-8"?>
+<p:sld xmlns:a="http://schemas.openxmlformats.org/drawingml/2006/main" xmlns:r="http://schemas.openxmlformats.org/officeDocument/2006/relationships" xmlns:p="http://schemas.openxmlformats.org/presentationml/2006/main">
+  <p:cSld>
+    <p:spTree>
+      <p:nvGrpSpPr>
+        <p:cNvPr id="1" name=""/>
+        <p:cNvGrpSpPr/>
+        <p:nvPr/>
+      </p:nvGrpSpPr>
+      <p:grpSpPr>
+        <a:xfrm>
+          <a:off x="0" y="0"/>
+          <a:ext cx="0" cy="0"/>
+          <a:chOff x="0" y="0"/>
+          <a:chExt cx="0" cy="0"/>
+        </a:xfrm>
+      </p:grpSpPr>
+      <p:sp>
+        <p:nvSpPr>
+          <p:cNvPr id="3" name="Content Placeholder 2">
+            <a:extLst>
+              <a:ext uri="{FF2B5EF4-FFF2-40B4-BE49-F238E27FC236}">
+                <a16:creationId xmlns:a16="http://schemas.microsoft.com/office/drawing/2014/main" id="{E470C06D-AFC7-4DA4-AB14-0F2A6F82B0F1}"/>
+              </a:ext>
+            </a:extLst>
+          </p:cNvPr>
+          <p:cNvSpPr>
+            <a:spLocks noGrp="1"/>
+          </p:cNvSpPr>
+          <p:nvPr>
+            <p:ph idx="1"/>
+          </p:nvPr>
+        </p:nvSpPr>
+        <p:spPr>
+          <a:xfrm>
+            <a:off x="1451580" y="2015733"/>
+            <a:ext cx="4920940" cy="1340210"/>
+          </a:xfrm>
+        </p:spPr>
+        <p:txBody>
+          <a:bodyPr>
+            <a:normAutofit/>
+          </a:bodyPr>
+          <a:lstStyle/>
+          <a:p>
+            <a:pPr marL="0" indent="0">
+              <a:buNone/>
+            </a:pPr>
+            <a:r>
+              <a:rPr lang="en-US" sz="4400" b="1" dirty="0">
+                <a:latin typeface="Arial" panose="020B0604020202020204" pitchFamily="34" charset="0"/>
+                <a:cs typeface="Arial" panose="020B0604020202020204" pitchFamily="34" charset="0"/>
+              </a:rPr>
+              <a:t>LIMITATIONS.</a:t>
+            </a:r>
+            <a:endParaRPr lang="en-US" sz="4400" dirty="0">
+              <a:latin typeface="Arial" panose="020B0604020202020204" pitchFamily="34" charset="0"/>
+              <a:cs typeface="Arial" panose="020B0604020202020204" pitchFamily="34" charset="0"/>
+            </a:endParaRPr>
+          </a:p>
+          <a:p>
+            <a:endParaRPr lang="en-KE" sz="4400" dirty="0">
+              <a:latin typeface="Arial" panose="020B0604020202020204" pitchFamily="34" charset="0"/>
+              <a:cs typeface="Arial" panose="020B0604020202020204" pitchFamily="34" charset="0"/>
+            </a:endParaRPr>
+          </a:p>
+        </p:txBody>
+      </p:sp>
+    </p:spTree>
+    <p:extLst>
+      <p:ext uri="{BB962C8B-B14F-4D97-AF65-F5344CB8AC3E}">
+        <p14:creationId xmlns:p14="http://schemas.microsoft.com/office/powerpoint/2010/main" val="3465749520"/>
+      </p:ext>
+    </p:extLst>
+  </p:cSld>
+  <p:clrMapOvr>
+    <a:masterClrMapping/>
+  </p:clrMapOvr>
+</p:sld>
+</file>
+
+<file path=ppt/slides/slide29.xml><?xml version="1.0" encoding="utf-8"?>
+<p:sld xmlns:a="http://schemas.openxmlformats.org/drawingml/2006/main" xmlns:r="http://schemas.openxmlformats.org/officeDocument/2006/relationships" xmlns:p="http://schemas.openxmlformats.org/presentationml/2006/main">
+  <p:cSld>
+    <p:spTree>
+      <p:nvGrpSpPr>
+        <p:cNvPr id="1" name=""/>
+        <p:cNvGrpSpPr/>
+        <p:nvPr/>
+      </p:nvGrpSpPr>
+      <p:grpSpPr>
+        <a:xfrm>
+          <a:off x="0" y="0"/>
+          <a:ext cx="0" cy="0"/>
+          <a:chOff x="0" y="0"/>
+          <a:chExt cx="0" cy="0"/>
+        </a:xfrm>
+      </p:grpSpPr>
+      <p:sp>
+        <p:nvSpPr>
+          <p:cNvPr id="2" name="Title 1">
+            <a:extLst>
+              <a:ext uri="{FF2B5EF4-FFF2-40B4-BE49-F238E27FC236}">
+                <a16:creationId xmlns:a16="http://schemas.microsoft.com/office/drawing/2014/main" id="{36A8CBC7-0BFB-48DE-8ADF-69B9FEC3A657}"/>
+              </a:ext>
+            </a:extLst>
+          </p:cNvPr>
+          <p:cNvSpPr>
+            <a:spLocks noGrp="1"/>
+          </p:cNvSpPr>
+          <p:nvPr>
+            <p:ph type="title"/>
+          </p:nvPr>
+        </p:nvSpPr>
+        <p:spPr/>
+        <p:txBody>
+          <a:bodyPr/>
+          <a:lstStyle/>
+          <a:p>
+            <a:endParaRPr lang="en-KE"/>
+          </a:p>
+        </p:txBody>
+      </p:sp>
+      <p:sp>
+        <p:nvSpPr>
+          <p:cNvPr id="3" name="Content Placeholder 2">
+            <a:extLst>
+              <a:ext uri="{FF2B5EF4-FFF2-40B4-BE49-F238E27FC236}">
+                <a16:creationId xmlns:a16="http://schemas.microsoft.com/office/drawing/2014/main" id="{D56C31EC-F557-49C9-9012-448AE1BBE7E4}"/>
+              </a:ext>
+            </a:extLst>
+          </p:cNvPr>
+          <p:cNvSpPr>
+            <a:spLocks noGrp="1"/>
+          </p:cNvSpPr>
+          <p:nvPr>
+            <p:ph idx="1"/>
+          </p:nvPr>
+        </p:nvSpPr>
+        <p:spPr>
+          <a:xfrm>
+            <a:off x="1451579" y="2015732"/>
+            <a:ext cx="9832306" cy="3866594"/>
+          </a:xfrm>
+        </p:spPr>
+        <p:txBody>
+          <a:bodyPr>
+            <a:normAutofit lnSpcReduction="10000"/>
+          </a:bodyPr>
+          <a:lstStyle/>
+          <a:p>
+            <a:r>
+              <a:rPr lang="en-US" b="1" dirty="0">
+                <a:latin typeface="Arial" panose="020B0604020202020204" pitchFamily="34" charset="0"/>
+                <a:cs typeface="Arial" panose="020B0604020202020204" pitchFamily="34" charset="0"/>
+              </a:rPr>
+              <a:t>Limited Scope of  Variables:</a:t>
+            </a:r>
+            <a:r>
+              <a:rPr lang="en-US" dirty="0">
+                <a:latin typeface="Arial" panose="020B0604020202020204" pitchFamily="34" charset="0"/>
+                <a:cs typeface="Arial" panose="020B0604020202020204" pitchFamily="34" charset="0"/>
+              </a:rPr>
+              <a:t> The dataset does not include several critical variables that affect box office success, such as marketing spend, release timing (e.g., holiday vs. off-season), actor popularity, or franchise value.</a:t>
+            </a:r>
+          </a:p>
+          <a:p>
+            <a:r>
+              <a:rPr lang="en-US" b="1" dirty="0">
+                <a:latin typeface="Arial" panose="020B0604020202020204" pitchFamily="34" charset="0"/>
+                <a:cs typeface="Arial" panose="020B0604020202020204" pitchFamily="34" charset="0"/>
+              </a:rPr>
+              <a:t>Assumption of Independence and Normality:</a:t>
+            </a:r>
+            <a:r>
+              <a:rPr lang="en-US" dirty="0">
+                <a:latin typeface="Arial" panose="020B0604020202020204" pitchFamily="34" charset="0"/>
+                <a:cs typeface="Arial" panose="020B0604020202020204" pitchFamily="34" charset="0"/>
+              </a:rPr>
+              <a:t> Statistical tests such as t-tests and ANOVA assume normally distributed data and independence between groups, assumptions that may not hold perfectly given the large variance and potential clustering in the film industry.</a:t>
+            </a:r>
+          </a:p>
+          <a:p>
+            <a:r>
+              <a:rPr lang="en-US" b="1" dirty="0">
+                <a:latin typeface="Arial" panose="020B0604020202020204" pitchFamily="34" charset="0"/>
+                <a:cs typeface="Arial" panose="020B0604020202020204" pitchFamily="34" charset="0"/>
+              </a:rPr>
+              <a:t>Missing Audience Demographics:</a:t>
+            </a:r>
+            <a:r>
+              <a:rPr lang="en-US" dirty="0">
+                <a:latin typeface="Arial" panose="020B0604020202020204" pitchFamily="34" charset="0"/>
+                <a:cs typeface="Arial" panose="020B0604020202020204" pitchFamily="34" charset="0"/>
+              </a:rPr>
+              <a:t> There's no information on who watched the movies—age, gender, region, etc. This limits your ability to analyze trends by target audience or identify underserved markets.</a:t>
+            </a:r>
+          </a:p>
+          <a:p>
+            <a:endParaRPr lang="en-KE" dirty="0">
+              <a:latin typeface="Arial" panose="020B0604020202020204" pitchFamily="34" charset="0"/>
+              <a:cs typeface="Arial" panose="020B0604020202020204" pitchFamily="34" charset="0"/>
+            </a:endParaRPr>
+          </a:p>
+        </p:txBody>
+      </p:sp>
+    </p:spTree>
+    <p:extLst>
+      <p:ext uri="{BB962C8B-B14F-4D97-AF65-F5344CB8AC3E}">
+        <p14:creationId xmlns:p14="http://schemas.microsoft.com/office/powerpoint/2010/main" val="3581331344"/>
       </p:ext>
     </p:extLst>
   </p:cSld>
@@ -6581,10 +6686,16 @@
           <a:lstStyle/>
           <a:p>
             <a:r>
-              <a:rPr lang="en-US" sz="4000" dirty="0"/>
+              <a:rPr lang="en-US" sz="4000" dirty="0">
+                <a:latin typeface="Arial" panose="020B0604020202020204" pitchFamily="34" charset="0"/>
+                <a:cs typeface="Arial" panose="020B0604020202020204" pitchFamily="34" charset="0"/>
+              </a:rPr>
               <a:t>BUSINESS PROBLEM</a:t>
             </a:r>
-            <a:endParaRPr lang="en-KE" sz="4000" dirty="0"/>
+            <a:endParaRPr lang="en-KE" sz="4000" dirty="0">
+              <a:latin typeface="Arial" panose="020B0604020202020204" pitchFamily="34" charset="0"/>
+              <a:cs typeface="Arial" panose="020B0604020202020204" pitchFamily="34" charset="0"/>
+            </a:endParaRPr>
           </a:p>
         </p:txBody>
       </p:sp>
@@ -6607,39 +6718,44 @@
         <p:spPr>
           <a:xfrm>
             <a:off x="995422" y="2052116"/>
-            <a:ext cx="10174147" cy="4244512"/>
+            <a:ext cx="10174147" cy="3886771"/>
           </a:xfrm>
         </p:spPr>
         <p:txBody>
           <a:bodyPr/>
           <a:lstStyle/>
           <a:p>
-            <a:pPr marL="0" indent="0">
-              <a:buNone/>
-            </a:pPr>
-            <a:r>
-              <a:rPr lang="en-US" dirty="0"/>
-              <a:t>The company has seen all the big companies creating original video content and they want to get in on the fun. Executives have decided to create a new movie studio, but they don’t know anything about creating movies. </a:t>
-            </a:r>
-          </a:p>
-          <a:p>
-            <a:pPr marL="0" indent="0">
-              <a:buNone/>
-            </a:pPr>
-            <a:r>
-              <a:rPr lang="en-US" dirty="0"/>
-              <a:t>The team is charged with exploring what types of films are currently doing the best at the box office. </a:t>
-            </a:r>
-          </a:p>
-          <a:p>
-            <a:pPr marL="0" indent="0">
-              <a:buNone/>
-            </a:pPr>
-            <a:r>
-              <a:rPr lang="en-US" dirty="0"/>
-              <a:t>This then must be translated into actionable insights that the head of the company's new movie studio can use to help decide what type of films to create.</a:t>
-            </a:r>
-            <a:endParaRPr lang="en-KE" dirty="0"/>
+            <a:r>
+              <a:rPr lang="en-US" dirty="0">
+                <a:latin typeface="Arial" panose="020B0604020202020204" pitchFamily="34" charset="0"/>
+                <a:cs typeface="Arial" panose="020B0604020202020204" pitchFamily="34" charset="0"/>
+              </a:rPr>
+              <a:t>In an effort to diversify and remain competitive, the company is planning on launching a new movie production studio to join the growing trend of original content creation.</a:t>
+            </a:r>
+          </a:p>
+          <a:p>
+            <a:r>
+              <a:rPr lang="en-US" dirty="0">
+                <a:latin typeface="Arial" panose="020B0604020202020204" pitchFamily="34" charset="0"/>
+                <a:cs typeface="Arial" panose="020B0604020202020204" pitchFamily="34" charset="0"/>
+              </a:rPr>
+              <a:t>The company however currently lacks expertise in the film industry and is uncertain about which types of movies to produce.</a:t>
+            </a:r>
+          </a:p>
+          <a:p>
+            <a:r>
+              <a:rPr lang="en-US" dirty="0">
+                <a:latin typeface="Arial" panose="020B0604020202020204" pitchFamily="34" charset="0"/>
+                <a:cs typeface="Arial" panose="020B0604020202020204" pitchFamily="34" charset="0"/>
+              </a:rPr>
+              <a:t>To ensure a successful market entry, the leadership needs data-driven insights to guide investment decisions.</a:t>
+            </a:r>
+          </a:p>
+          <a:p>
+            <a:endParaRPr lang="en-US" dirty="0">
+              <a:latin typeface="Arial" panose="020B0604020202020204" pitchFamily="34" charset="0"/>
+              <a:cs typeface="Arial" panose="020B0604020202020204" pitchFamily="34" charset="0"/>
+            </a:endParaRPr>
           </a:p>
         </p:txBody>
       </p:sp>
@@ -6647,6 +6763,97 @@
     <p:extLst>
       <p:ext uri="{BB962C8B-B14F-4D97-AF65-F5344CB8AC3E}">
         <p14:creationId xmlns:p14="http://schemas.microsoft.com/office/powerpoint/2010/main" val="1240635939"/>
+      </p:ext>
+    </p:extLst>
+  </p:cSld>
+  <p:clrMapOvr>
+    <a:masterClrMapping/>
+  </p:clrMapOvr>
+</p:sld>
+</file>
+
+<file path=ppt/slides/slide30.xml><?xml version="1.0" encoding="utf-8"?>
+<p:sld xmlns:a="http://schemas.openxmlformats.org/drawingml/2006/main" xmlns:r="http://schemas.openxmlformats.org/officeDocument/2006/relationships" xmlns:p="http://schemas.openxmlformats.org/presentationml/2006/main">
+  <p:cSld>
+    <p:spTree>
+      <p:nvGrpSpPr>
+        <p:cNvPr id="1" name=""/>
+        <p:cNvGrpSpPr/>
+        <p:nvPr/>
+      </p:nvGrpSpPr>
+      <p:grpSpPr>
+        <a:xfrm>
+          <a:off x="0" y="0"/>
+          <a:ext cx="0" cy="0"/>
+          <a:chOff x="0" y="0"/>
+          <a:chExt cx="0" cy="0"/>
+        </a:xfrm>
+      </p:grpSpPr>
+      <p:sp>
+        <p:nvSpPr>
+          <p:cNvPr id="2" name="Title 1">
+            <a:extLst>
+              <a:ext uri="{FF2B5EF4-FFF2-40B4-BE49-F238E27FC236}">
+                <a16:creationId xmlns:a16="http://schemas.microsoft.com/office/drawing/2014/main" id="{6BEB04E3-D739-4255-BDBF-801BEED2B37E}"/>
+              </a:ext>
+            </a:extLst>
+          </p:cNvPr>
+          <p:cNvSpPr>
+            <a:spLocks noGrp="1"/>
+          </p:cNvSpPr>
+          <p:nvPr>
+            <p:ph type="ctrTitle"/>
+          </p:nvPr>
+        </p:nvSpPr>
+        <p:spPr/>
+        <p:txBody>
+          <a:bodyPr/>
+          <a:lstStyle/>
+          <a:p>
+            <a:pPr algn="ctr"/>
+            <a:r>
+              <a:rPr lang="en-US" dirty="0">
+                <a:latin typeface="Arial" panose="020B0604020202020204" pitchFamily="34" charset="0"/>
+                <a:cs typeface="Arial" panose="020B0604020202020204" pitchFamily="34" charset="0"/>
+              </a:rPr>
+              <a:t>END.</a:t>
+            </a:r>
+            <a:endParaRPr lang="en-KE" dirty="0">
+              <a:latin typeface="Arial" panose="020B0604020202020204" pitchFamily="34" charset="0"/>
+              <a:cs typeface="Arial" panose="020B0604020202020204" pitchFamily="34" charset="0"/>
+            </a:endParaRPr>
+          </a:p>
+        </p:txBody>
+      </p:sp>
+      <p:sp>
+        <p:nvSpPr>
+          <p:cNvPr id="3" name="Subtitle 2">
+            <a:extLst>
+              <a:ext uri="{FF2B5EF4-FFF2-40B4-BE49-F238E27FC236}">
+                <a16:creationId xmlns:a16="http://schemas.microsoft.com/office/drawing/2014/main" id="{A140D49D-8D97-459D-B104-7286A8257E16}"/>
+              </a:ext>
+            </a:extLst>
+          </p:cNvPr>
+          <p:cNvSpPr>
+            <a:spLocks noGrp="1"/>
+          </p:cNvSpPr>
+          <p:nvPr>
+            <p:ph type="subTitle" idx="1"/>
+          </p:nvPr>
+        </p:nvSpPr>
+        <p:spPr/>
+        <p:txBody>
+          <a:bodyPr/>
+          <a:lstStyle/>
+          <a:p>
+            <a:endParaRPr lang="en-KE"/>
+          </a:p>
+        </p:txBody>
+      </p:sp>
+    </p:spTree>
+    <p:extLst>
+      <p:ext uri="{BB962C8B-B14F-4D97-AF65-F5344CB8AC3E}">
+        <p14:creationId xmlns:p14="http://schemas.microsoft.com/office/powerpoint/2010/main" val="2784567153"/>
       </p:ext>
     </p:extLst>
   </p:cSld>
@@ -6675,10 +6882,10 @@
       </p:grpSpPr>
       <p:sp>
         <p:nvSpPr>
-          <p:cNvPr id="2" name="Title 1">
+          <p:cNvPr id="3" name="Content Placeholder 2">
             <a:extLst>
               <a:ext uri="{FF2B5EF4-FFF2-40B4-BE49-F238E27FC236}">
-                <a16:creationId xmlns:a16="http://schemas.microsoft.com/office/drawing/2014/main" id="{9B11E52B-6647-428C-A50E-250CB1B1CB39}"/>
+                <a16:creationId xmlns:a16="http://schemas.microsoft.com/office/drawing/2014/main" id="{4D60C1B4-7581-4B80-BB6B-B30189FCD591}"/>
               </a:ext>
             </a:extLst>
           </p:cNvPr>
@@ -6686,113 +6893,86 @@
             <a:spLocks noGrp="1"/>
           </p:cNvSpPr>
           <p:nvPr>
-            <p:ph type="title"/>
+            <p:ph idx="1"/>
           </p:nvPr>
         </p:nvSpPr>
         <p:spPr/>
         <p:txBody>
-          <a:bodyPr/>
-          <a:lstStyle/>
-          <a:p>
-            <a:r>
-              <a:rPr lang="en-US" dirty="0"/>
-              <a:t>DATA</a:t>
-            </a:r>
-            <a:endParaRPr lang="en-KE" dirty="0"/>
-          </a:p>
-        </p:txBody>
-      </p:sp>
-      <p:sp>
-        <p:nvSpPr>
-          <p:cNvPr id="3" name="Content Placeholder 2">
-            <a:extLst>
-              <a:ext uri="{FF2B5EF4-FFF2-40B4-BE49-F238E27FC236}">
-                <a16:creationId xmlns:a16="http://schemas.microsoft.com/office/drawing/2014/main" id="{63037D68-961A-4B06-B09D-22BDA90C87BE}"/>
-              </a:ext>
-            </a:extLst>
-          </p:cNvPr>
-          <p:cNvSpPr>
-            <a:spLocks noGrp="1"/>
-          </p:cNvSpPr>
-          <p:nvPr>
-            <p:ph idx="1"/>
-          </p:nvPr>
-        </p:nvSpPr>
-        <p:spPr>
-          <a:xfrm>
-            <a:off x="1006997" y="1747777"/>
-            <a:ext cx="10382492" cy="4302167"/>
-          </a:xfrm>
-        </p:spPr>
-        <p:txBody>
           <a:bodyPr>
-            <a:normAutofit/>
+            <a:normAutofit lnSpcReduction="10000"/>
           </a:bodyPr>
           <a:lstStyle/>
           <a:p>
             <a:r>
-              <a:rPr lang="en-US" dirty="0"/>
-              <a:t>The data that was used to provide insight for the project included:</a:t>
+              <a:rPr lang="en-US" sz="2400" dirty="0">
+                <a:latin typeface="Arial" panose="020B0604020202020204" pitchFamily="34" charset="0"/>
+                <a:cs typeface="Arial" panose="020B0604020202020204" pitchFamily="34" charset="0"/>
+              </a:rPr>
+              <a:t>The primary goal of this analysis is to answer key questions such as:</a:t>
             </a:r>
           </a:p>
           <a:p>
             <a:pPr lvl="1"/>
             <a:r>
-              <a:rPr lang="en-US" u="sng" dirty="0"/>
-              <a:t>Box Office Mojo.</a:t>
-            </a:r>
-            <a:endParaRPr lang="en-US" dirty="0"/>
+              <a:rPr lang="en-US" sz="2000" dirty="0">
+                <a:latin typeface="Arial" panose="020B0604020202020204" pitchFamily="34" charset="0"/>
+                <a:cs typeface="Arial" panose="020B0604020202020204" pitchFamily="34" charset="0"/>
+              </a:rPr>
+              <a:t>Which genres are the most profitable?</a:t>
+            </a:r>
           </a:p>
           <a:p>
             <a:pPr lvl="1"/>
             <a:r>
-              <a:rPr lang="en-US" u="sng" dirty="0"/>
-              <a:t>IMDB.</a:t>
-            </a:r>
-            <a:endParaRPr lang="en-US" dirty="0"/>
+              <a:rPr lang="en-US" sz="2000" dirty="0">
+                <a:latin typeface="Arial" panose="020B0604020202020204" pitchFamily="34" charset="0"/>
+                <a:cs typeface="Arial" panose="020B0604020202020204" pitchFamily="34" charset="0"/>
+              </a:rPr>
+              <a:t>What release months or seasons yield the best box office results?</a:t>
+            </a:r>
           </a:p>
           <a:p>
             <a:pPr lvl="1"/>
             <a:r>
-              <a:rPr lang="en-US" u="sng" dirty="0"/>
-              <a:t>Rotten Tomatoes.</a:t>
-            </a:r>
-            <a:endParaRPr lang="en-US" dirty="0"/>
+              <a:rPr lang="en-US" sz="2000" dirty="0">
+                <a:latin typeface="Arial" panose="020B0604020202020204" pitchFamily="34" charset="0"/>
+                <a:cs typeface="Arial" panose="020B0604020202020204" pitchFamily="34" charset="0"/>
+              </a:rPr>
+              <a:t>Does a director play a key role in the success/profitability the films?</a:t>
+            </a:r>
           </a:p>
           <a:p>
             <a:pPr lvl="1"/>
             <a:r>
-              <a:rPr lang="en-US" u="sng" dirty="0" err="1"/>
-              <a:t>TheMovieDB</a:t>
-            </a:r>
-            <a:r>
-              <a:rPr lang="en-US" u="sng" dirty="0"/>
-              <a:t>.</a:t>
-            </a:r>
-            <a:endParaRPr lang="en-US" dirty="0"/>
+              <a:rPr lang="en-US" sz="2000" dirty="0">
+                <a:latin typeface="Arial" panose="020B0604020202020204" pitchFamily="34" charset="0"/>
+                <a:cs typeface="Arial" panose="020B0604020202020204" pitchFamily="34" charset="0"/>
+              </a:rPr>
+              <a:t>How does the production studio influence a movie's financial and overall success?</a:t>
+            </a:r>
           </a:p>
           <a:p>
             <a:pPr lvl="1"/>
             <a:r>
-              <a:rPr lang="en-US" u="sng" dirty="0"/>
-              <a:t>The Numbers.</a:t>
-            </a:r>
-          </a:p>
-          <a:p>
-            <a:r>
-              <a:rPr lang="en-US" dirty="0"/>
-              <a:t>The data had various info on movies including: genres, directors, gross income, release dates, and popularity etc.</a:t>
-            </a:r>
-          </a:p>
-          <a:p>
-            <a:endParaRPr lang="en-US" dirty="0"/>
+              <a:rPr lang="en-US" sz="2000" dirty="0">
+                <a:latin typeface="Arial" panose="020B0604020202020204" pitchFamily="34" charset="0"/>
+                <a:cs typeface="Arial" panose="020B0604020202020204" pitchFamily="34" charset="0"/>
+              </a:rPr>
+              <a:t>Are there trends over time in audience preferences or industry performance?</a:t>
+            </a:r>
+          </a:p>
+          <a:p>
+            <a:endParaRPr lang="en-KE" sz="2400" dirty="0">
+              <a:latin typeface="Arial" panose="020B0604020202020204" pitchFamily="34" charset="0"/>
+              <a:cs typeface="Arial" panose="020B0604020202020204" pitchFamily="34" charset="0"/>
+            </a:endParaRPr>
           </a:p>
         </p:txBody>
       </p:sp>
     </p:spTree>
     <p:extLst>
       <p:ext uri="{BB962C8B-B14F-4D97-AF65-F5344CB8AC3E}">
-        <p14:creationId xmlns:p14="http://schemas.microsoft.com/office/powerpoint/2010/main" val="1298948916"/>
+        <p14:creationId xmlns:p14="http://schemas.microsoft.com/office/powerpoint/2010/main" val="1320711033"/>
       </p:ext>
     </p:extLst>
   </p:cSld>
@@ -6824,7 +7004,7 @@
           <p:cNvPr id="2" name="Title 1">
             <a:extLst>
               <a:ext uri="{FF2B5EF4-FFF2-40B4-BE49-F238E27FC236}">
-                <a16:creationId xmlns:a16="http://schemas.microsoft.com/office/drawing/2014/main" id="{5B941EAD-A5A2-46D2-83D3-C10B0B142DDD}"/>
+                <a16:creationId xmlns:a16="http://schemas.microsoft.com/office/drawing/2014/main" id="{9B11E52B-6647-428C-A50E-250CB1B1CB39}"/>
               </a:ext>
             </a:extLst>
           </p:cNvPr>
@@ -6837,8 +7017,42 @@
         </p:nvSpPr>
         <p:spPr>
           <a:xfrm>
-            <a:off x="1701477" y="0"/>
-            <a:ext cx="9213449" cy="1203767"/>
+            <a:off x="1442154" y="1286758"/>
+            <a:ext cx="1395316" cy="618928"/>
+          </a:xfrm>
+        </p:spPr>
+        <p:txBody>
+          <a:bodyPr/>
+          <a:lstStyle/>
+          <a:p>
+            <a:r>
+              <a:rPr lang="en-US" dirty="0"/>
+              <a:t>DATA</a:t>
+            </a:r>
+            <a:endParaRPr lang="en-KE" dirty="0"/>
+          </a:p>
+        </p:txBody>
+      </p:sp>
+      <p:sp>
+        <p:nvSpPr>
+          <p:cNvPr id="3" name="Content Placeholder 2">
+            <a:extLst>
+              <a:ext uri="{FF2B5EF4-FFF2-40B4-BE49-F238E27FC236}">
+                <a16:creationId xmlns:a16="http://schemas.microsoft.com/office/drawing/2014/main" id="{63037D68-961A-4B06-B09D-22BDA90C87BE}"/>
+              </a:ext>
+            </a:extLst>
+          </p:cNvPr>
+          <p:cNvSpPr>
+            <a:spLocks noGrp="1"/>
+          </p:cNvSpPr>
+          <p:nvPr>
+            <p:ph idx="1"/>
+          </p:nvPr>
+        </p:nvSpPr>
+        <p:spPr>
+          <a:xfrm>
+            <a:off x="1308021" y="2011728"/>
+            <a:ext cx="9890389" cy="3559514"/>
           </a:xfrm>
         </p:spPr>
         <p:txBody>
@@ -6848,804 +7062,99 @@
           <a:lstStyle/>
           <a:p>
             <a:r>
-              <a:rPr lang="en-US" sz="4000" dirty="0"/>
-              <a:t>METHODS</a:t>
-            </a:r>
-            <a:endParaRPr lang="en-KE" sz="4000" dirty="0"/>
-          </a:p>
-        </p:txBody>
-      </p:sp>
-      <p:sp>
-        <p:nvSpPr>
-          <p:cNvPr id="7" name="Rectangle 4">
-            <a:extLst>
-              <a:ext uri="{FF2B5EF4-FFF2-40B4-BE49-F238E27FC236}">
-                <a16:creationId xmlns:a16="http://schemas.microsoft.com/office/drawing/2014/main" id="{3E22313C-BB27-4EC8-A617-1A96FA44ECE3}"/>
-              </a:ext>
-            </a:extLst>
-          </p:cNvPr>
-          <p:cNvSpPr>
-            <a:spLocks noGrp="1" noChangeArrowheads="1"/>
-          </p:cNvSpPr>
-          <p:nvPr>
-            <p:ph idx="1"/>
-          </p:nvPr>
-        </p:nvSpPr>
-        <p:spPr bwMode="auto">
-          <a:xfrm>
-            <a:off x="1116955" y="782121"/>
-            <a:ext cx="10382491" cy="5293757"/>
-          </a:xfrm>
-          <a:prstGeom prst="rect">
-            <a:avLst/>
-          </a:prstGeom>
-          <a:noFill/>
-          <a:ln>
-            <a:noFill/>
-          </a:ln>
-          <a:effectLst/>
-          <a:extLst>
-            <a:ext uri="{909E8E84-426E-40DD-AFC4-6F175D3DCCD1}">
-              <a14:hiddenFill xmlns:a14="http://schemas.microsoft.com/office/drawing/2010/main">
-                <a:solidFill>
-                  <a:schemeClr val="accent1"/>
-                </a:solidFill>
-              </a14:hiddenFill>
-            </a:ext>
-            <a:ext uri="{91240B29-F687-4F45-9708-019B960494DF}">
-              <a14:hiddenLine xmlns:a14="http://schemas.microsoft.com/office/drawing/2010/main" w="9525">
-                <a:solidFill>
-                  <a:schemeClr val="tx1"/>
-                </a:solidFill>
-                <a:miter lim="800000"/>
-                <a:headEnd/>
-                <a:tailEnd/>
-              </a14:hiddenLine>
-            </a:ext>
-            <a:ext uri="{AF507438-7753-43E0-B8FC-AC1667EBCBE1}">
-              <a14:hiddenEffects xmlns:a14="http://schemas.microsoft.com/office/drawing/2010/main">
-                <a:effectLst>
-                  <a:outerShdw dist="35921" dir="2700000" algn="ctr" rotWithShape="0">
-                    <a:schemeClr val="bg2"/>
-                  </a:outerShdw>
-                </a:effectLst>
-              </a14:hiddenEffects>
-            </a:ext>
-          </a:extLst>
-        </p:spPr>
-        <p:txBody>
-          <a:bodyPr vert="horz" wrap="square" lIns="91440" tIns="45720" rIns="91440" bIns="45720" numCol="1" anchor="ctr" anchorCtr="0" compatLnSpc="1">
-            <a:prstTxWarp prst="textNoShape">
-              <a:avLst/>
-            </a:prstTxWarp>
-            <a:spAutoFit/>
-          </a:bodyPr>
-          <a:lstStyle/>
-          <a:p>
-            <a:pPr marL="0" marR="0" lvl="0" indent="0" algn="l" defTabSz="914400" rtl="0" eaLnBrk="0" fontAlgn="base" latinLnBrk="0" hangingPunct="0">
-              <a:lnSpc>
-                <a:spcPct val="100000"/>
-              </a:lnSpc>
-              <a:spcBef>
-                <a:spcPct val="0"/>
-              </a:spcBef>
-              <a:spcAft>
-                <a:spcPct val="0"/>
-              </a:spcAft>
-              <a:buClrTx/>
-              <a:buSzTx/>
-              <a:buFontTx/>
-              <a:buChar char="•"/>
-              <a:tabLst/>
-            </a:pPr>
-            <a:r>
-              <a:rPr kumimoji="0" lang="en-KE" altLang="en-KE" sz="2000" b="1" i="0" u="none" strike="noStrike" cap="none" normalizeH="0" baseline="0" dirty="0">
-                <a:ln>
-                  <a:noFill/>
-                </a:ln>
-                <a:solidFill>
-                  <a:schemeClr val="tx1"/>
-                </a:solidFill>
-                <a:effectLst/>
-                <a:latin typeface="Arial" panose="020B0604020202020204" pitchFamily="34" charset="0"/>
-              </a:rPr>
-              <a:t>Exploratory Data Analysis (EDA):</a:t>
-            </a:r>
-            <a:endParaRPr kumimoji="0" lang="en-KE" altLang="en-KE" sz="2000" b="0" i="0" u="none" strike="noStrike" cap="none" normalizeH="0" baseline="0" dirty="0">
-              <a:ln>
-                <a:noFill/>
-              </a:ln>
-              <a:solidFill>
-                <a:schemeClr val="tx1"/>
-              </a:solidFill>
-              <a:effectLst/>
+              <a:rPr lang="en-US" dirty="0">
+                <a:latin typeface="Arial" panose="020B0604020202020204" pitchFamily="34" charset="0"/>
+                <a:cs typeface="Arial" panose="020B0604020202020204" pitchFamily="34" charset="0"/>
+              </a:rPr>
+              <a:t>The data that was used to provide insight for the project included:</a:t>
+            </a:r>
+          </a:p>
+          <a:p>
+            <a:pPr lvl="1"/>
+            <a:r>
+              <a:rPr lang="en-US" u="sng" dirty="0">
+                <a:latin typeface="Arial" panose="020B0604020202020204" pitchFamily="34" charset="0"/>
+                <a:cs typeface="Arial" panose="020B0604020202020204" pitchFamily="34" charset="0"/>
+              </a:rPr>
+              <a:t>Box Office Mojo.</a:t>
+            </a:r>
+            <a:endParaRPr lang="en-US" dirty="0">
               <a:latin typeface="Arial" panose="020B0604020202020204" pitchFamily="34" charset="0"/>
+              <a:cs typeface="Arial" panose="020B0604020202020204" pitchFamily="34" charset="0"/>
             </a:endParaRPr>
           </a:p>
           <a:p>
-            <a:pPr marL="457200" lvl="1" indent="0" eaLnBrk="0" fontAlgn="base" hangingPunct="0">
-              <a:lnSpc>
-                <a:spcPct val="100000"/>
-              </a:lnSpc>
-              <a:spcBef>
-                <a:spcPct val="0"/>
-              </a:spcBef>
-              <a:spcAft>
-                <a:spcPct val="0"/>
-              </a:spcAft>
-              <a:buFontTx/>
-              <a:buChar char="•"/>
-            </a:pPr>
-            <a:r>
-              <a:rPr kumimoji="0" lang="en-KE" altLang="en-KE" sz="2000" b="0" i="0" u="none" strike="noStrike" cap="none" normalizeH="0" baseline="0" dirty="0">
-                <a:ln>
-                  <a:noFill/>
-                </a:ln>
-                <a:solidFill>
-                  <a:schemeClr val="tx1"/>
-                </a:solidFill>
-                <a:effectLst/>
-                <a:latin typeface="Arial" panose="020B0604020202020204" pitchFamily="34" charset="0"/>
-              </a:rPr>
-              <a:t>Reviewed dataset for missing values, duplicates, and outliers</a:t>
-            </a:r>
-          </a:p>
-          <a:p>
-            <a:pPr marL="457200" lvl="1" indent="0" eaLnBrk="0" fontAlgn="base" hangingPunct="0">
-              <a:lnSpc>
-                <a:spcPct val="100000"/>
-              </a:lnSpc>
-              <a:spcBef>
-                <a:spcPct val="0"/>
-              </a:spcBef>
-              <a:spcAft>
-                <a:spcPct val="0"/>
-              </a:spcAft>
-              <a:buFontTx/>
-              <a:buChar char="•"/>
-            </a:pPr>
-            <a:r>
-              <a:rPr kumimoji="0" lang="en-KE" altLang="en-KE" sz="2000" b="0" i="0" u="none" strike="noStrike" cap="none" normalizeH="0" baseline="0" dirty="0" err="1">
-                <a:ln>
-                  <a:noFill/>
-                </a:ln>
-                <a:solidFill>
-                  <a:schemeClr val="tx1"/>
-                </a:solidFill>
-                <a:effectLst/>
-                <a:latin typeface="Arial" panose="020B0604020202020204" pitchFamily="34" charset="0"/>
-              </a:rPr>
-              <a:t>Analyzed</a:t>
-            </a:r>
-            <a:r>
-              <a:rPr kumimoji="0" lang="en-KE" altLang="en-KE" sz="2000" b="0" i="0" u="none" strike="noStrike" cap="none" normalizeH="0" baseline="0" dirty="0">
-                <a:ln>
-                  <a:noFill/>
-                </a:ln>
-                <a:solidFill>
-                  <a:schemeClr val="tx1"/>
-                </a:solidFill>
-                <a:effectLst/>
-                <a:latin typeface="Arial" panose="020B0604020202020204" pitchFamily="34" charset="0"/>
-              </a:rPr>
-              <a:t> distributions of key variables (genre, rating, revenue)</a:t>
-            </a:r>
-          </a:p>
-          <a:p>
-            <a:pPr marL="0" marR="0" lvl="0" indent="0" algn="l" defTabSz="914400" rtl="0" eaLnBrk="0" fontAlgn="base" latinLnBrk="0" hangingPunct="0">
-              <a:lnSpc>
-                <a:spcPct val="100000"/>
-              </a:lnSpc>
-              <a:spcBef>
-                <a:spcPct val="0"/>
-              </a:spcBef>
-              <a:spcAft>
-                <a:spcPct val="0"/>
-              </a:spcAft>
-              <a:buClrTx/>
-              <a:buSzTx/>
-              <a:buFontTx/>
-              <a:buChar char="•"/>
-              <a:tabLst/>
-            </a:pPr>
-            <a:r>
-              <a:rPr kumimoji="0" lang="en-KE" altLang="en-KE" sz="2000" b="1" i="0" u="none" strike="noStrike" cap="none" normalizeH="0" baseline="0" dirty="0">
-                <a:ln>
-                  <a:noFill/>
-                </a:ln>
-                <a:solidFill>
-                  <a:schemeClr val="tx1"/>
-                </a:solidFill>
-                <a:effectLst/>
-                <a:latin typeface="Arial" panose="020B0604020202020204" pitchFamily="34" charset="0"/>
-              </a:rPr>
-              <a:t>T-Test:</a:t>
-            </a:r>
-            <a:endParaRPr kumimoji="0" lang="en-KE" altLang="en-KE" sz="2000" b="0" i="0" u="none" strike="noStrike" cap="none" normalizeH="0" baseline="0" dirty="0">
-              <a:ln>
-                <a:noFill/>
-              </a:ln>
-              <a:solidFill>
-                <a:schemeClr val="tx1"/>
-              </a:solidFill>
-              <a:effectLst/>
+            <a:pPr lvl="1"/>
+            <a:r>
+              <a:rPr lang="en-US" u="sng" dirty="0">
+                <a:latin typeface="Arial" panose="020B0604020202020204" pitchFamily="34" charset="0"/>
+                <a:cs typeface="Arial" panose="020B0604020202020204" pitchFamily="34" charset="0"/>
+              </a:rPr>
+              <a:t>IMDB.</a:t>
+            </a:r>
+            <a:endParaRPr lang="en-US" dirty="0">
               <a:latin typeface="Arial" panose="020B0604020202020204" pitchFamily="34" charset="0"/>
+              <a:cs typeface="Arial" panose="020B0604020202020204" pitchFamily="34" charset="0"/>
             </a:endParaRPr>
           </a:p>
           <a:p>
-            <a:pPr marL="457200" lvl="1" indent="0" eaLnBrk="0" fontAlgn="base" hangingPunct="0">
-              <a:lnSpc>
-                <a:spcPct val="100000"/>
-              </a:lnSpc>
-              <a:spcBef>
-                <a:spcPct val="0"/>
-              </a:spcBef>
-              <a:spcAft>
-                <a:spcPct val="0"/>
-              </a:spcAft>
-              <a:buFontTx/>
-              <a:buChar char="•"/>
-            </a:pPr>
-            <a:r>
-              <a:rPr kumimoji="0" lang="en-KE" altLang="en-KE" sz="2000" b="0" i="0" u="none" strike="noStrike" cap="none" normalizeH="0" baseline="0" dirty="0">
-                <a:ln>
-                  <a:noFill/>
-                </a:ln>
-                <a:solidFill>
-                  <a:schemeClr val="tx1"/>
-                </a:solidFill>
-                <a:effectLst/>
-                <a:latin typeface="Arial" panose="020B0604020202020204" pitchFamily="34" charset="0"/>
-              </a:rPr>
-              <a:t>Compared average </a:t>
-            </a:r>
-            <a:r>
-              <a:rPr kumimoji="0" lang="en-US" altLang="en-KE" sz="2000" b="0" i="0" u="none" strike="noStrike" cap="none" normalizeH="0" baseline="0" dirty="0">
-                <a:ln>
-                  <a:noFill/>
-                </a:ln>
-                <a:solidFill>
-                  <a:schemeClr val="tx1"/>
-                </a:solidFill>
-                <a:effectLst/>
-                <a:latin typeface="Arial" panose="020B0604020202020204" pitchFamily="34" charset="0"/>
-              </a:rPr>
-              <a:t>income</a:t>
-            </a:r>
-            <a:r>
-              <a:rPr kumimoji="0" lang="en-KE" altLang="en-KE" sz="2000" b="0" i="0" u="none" strike="noStrike" cap="none" normalizeH="0" baseline="0" dirty="0">
-                <a:ln>
-                  <a:noFill/>
-                </a:ln>
-                <a:solidFill>
-                  <a:schemeClr val="tx1"/>
-                </a:solidFill>
-                <a:effectLst/>
-                <a:latin typeface="Arial" panose="020B0604020202020204" pitchFamily="34" charset="0"/>
-              </a:rPr>
-              <a:t> between </a:t>
-            </a:r>
-            <a:r>
-              <a:rPr kumimoji="0" lang="en-US" altLang="en-KE" sz="2000" b="0" i="0" u="none" strike="noStrike" cap="none" normalizeH="0" baseline="0" dirty="0">
-                <a:ln>
-                  <a:noFill/>
-                </a:ln>
-                <a:solidFill>
-                  <a:schemeClr val="tx1"/>
-                </a:solidFill>
-                <a:effectLst/>
-                <a:latin typeface="Arial" panose="020B0604020202020204" pitchFamily="34" charset="0"/>
-              </a:rPr>
-              <a:t>varying genres, directors</a:t>
-            </a:r>
-            <a:endParaRPr kumimoji="0" lang="en-KE" altLang="en-KE" sz="2000" b="0" i="0" u="none" strike="noStrike" cap="none" normalizeH="0" baseline="0" dirty="0">
-              <a:ln>
-                <a:noFill/>
-              </a:ln>
-              <a:solidFill>
-                <a:schemeClr val="tx1"/>
-              </a:solidFill>
-              <a:effectLst/>
+            <a:pPr lvl="1"/>
+            <a:r>
+              <a:rPr lang="en-US" u="sng" dirty="0">
+                <a:latin typeface="Arial" panose="020B0604020202020204" pitchFamily="34" charset="0"/>
+                <a:cs typeface="Arial" panose="020B0604020202020204" pitchFamily="34" charset="0"/>
+              </a:rPr>
+              <a:t>Rotten Tomatoes.</a:t>
+            </a:r>
+            <a:endParaRPr lang="en-US" dirty="0">
               <a:latin typeface="Arial" panose="020B0604020202020204" pitchFamily="34" charset="0"/>
+              <a:cs typeface="Arial" panose="020B0604020202020204" pitchFamily="34" charset="0"/>
             </a:endParaRPr>
           </a:p>
           <a:p>
-            <a:pPr marL="457200" lvl="1" indent="0" eaLnBrk="0" fontAlgn="base" hangingPunct="0">
-              <a:lnSpc>
-                <a:spcPct val="100000"/>
-              </a:lnSpc>
-              <a:spcBef>
-                <a:spcPct val="0"/>
-              </a:spcBef>
-              <a:spcAft>
-                <a:spcPct val="0"/>
-              </a:spcAft>
-              <a:buFontTx/>
-              <a:buChar char="•"/>
-            </a:pPr>
-            <a:r>
-              <a:rPr kumimoji="0" lang="en-KE" altLang="en-KE" sz="2000" b="0" i="0" u="none" strike="noStrike" cap="none" normalizeH="0" baseline="0" dirty="0">
-                <a:ln>
-                  <a:noFill/>
-                </a:ln>
-                <a:solidFill>
-                  <a:schemeClr val="tx1"/>
-                </a:solidFill>
-                <a:effectLst/>
-                <a:latin typeface="Arial" panose="020B0604020202020204" pitchFamily="34" charset="0"/>
-              </a:rPr>
-              <a:t>Determined if observed differences were statistically significant</a:t>
-            </a:r>
-          </a:p>
-          <a:p>
-            <a:pPr marL="0" marR="0" lvl="0" indent="0" algn="l" defTabSz="914400" rtl="0" eaLnBrk="0" fontAlgn="base" latinLnBrk="0" hangingPunct="0">
-              <a:lnSpc>
-                <a:spcPct val="100000"/>
-              </a:lnSpc>
-              <a:spcBef>
-                <a:spcPct val="0"/>
-              </a:spcBef>
-              <a:spcAft>
-                <a:spcPct val="0"/>
-              </a:spcAft>
-              <a:buClrTx/>
-              <a:buSzTx/>
-              <a:buFontTx/>
-              <a:buChar char="•"/>
-              <a:tabLst/>
-            </a:pPr>
-            <a:r>
-              <a:rPr kumimoji="0" lang="en-KE" altLang="en-KE" sz="2000" b="1" i="0" u="none" strike="noStrike" cap="none" normalizeH="0" baseline="0" dirty="0">
-                <a:ln>
-                  <a:noFill/>
-                </a:ln>
-                <a:solidFill>
-                  <a:schemeClr val="tx1"/>
-                </a:solidFill>
-                <a:effectLst/>
-                <a:latin typeface="Arial" panose="020B0604020202020204" pitchFamily="34" charset="0"/>
-              </a:rPr>
-              <a:t>ANOVA (Analysis of Variance):</a:t>
-            </a:r>
-            <a:endParaRPr kumimoji="0" lang="en-KE" altLang="en-KE" sz="2000" b="0" i="0" u="none" strike="noStrike" cap="none" normalizeH="0" baseline="0" dirty="0">
-              <a:ln>
-                <a:noFill/>
-              </a:ln>
-              <a:solidFill>
-                <a:schemeClr val="tx1"/>
-              </a:solidFill>
-              <a:effectLst/>
+            <a:pPr lvl="1"/>
+            <a:r>
+              <a:rPr lang="en-US" u="sng" dirty="0" err="1">
+                <a:latin typeface="Arial" panose="020B0604020202020204" pitchFamily="34" charset="0"/>
+                <a:cs typeface="Arial" panose="020B0604020202020204" pitchFamily="34" charset="0"/>
+              </a:rPr>
+              <a:t>TheMovieDB</a:t>
+            </a:r>
+            <a:r>
+              <a:rPr lang="en-US" u="sng" dirty="0">
+                <a:latin typeface="Arial" panose="020B0604020202020204" pitchFamily="34" charset="0"/>
+                <a:cs typeface="Arial" panose="020B0604020202020204" pitchFamily="34" charset="0"/>
+              </a:rPr>
+              <a:t>.</a:t>
+            </a:r>
+            <a:endParaRPr lang="en-US" dirty="0">
               <a:latin typeface="Arial" panose="020B0604020202020204" pitchFamily="34" charset="0"/>
+              <a:cs typeface="Arial" panose="020B0604020202020204" pitchFamily="34" charset="0"/>
             </a:endParaRPr>
           </a:p>
           <a:p>
-            <a:pPr marL="457200" lvl="1" indent="0" eaLnBrk="0" fontAlgn="base" hangingPunct="0">
-              <a:lnSpc>
-                <a:spcPct val="100000"/>
-              </a:lnSpc>
-              <a:spcBef>
-                <a:spcPct val="0"/>
-              </a:spcBef>
-              <a:spcAft>
-                <a:spcPct val="0"/>
-              </a:spcAft>
-              <a:buFontTx/>
-              <a:buChar char="•"/>
-            </a:pPr>
-            <a:r>
-              <a:rPr kumimoji="0" lang="en-KE" altLang="en-KE" sz="2000" b="0" i="0" u="none" strike="noStrike" cap="none" normalizeH="0" baseline="0" dirty="0">
-                <a:ln>
-                  <a:noFill/>
-                </a:ln>
-                <a:solidFill>
-                  <a:schemeClr val="tx1"/>
-                </a:solidFill>
-                <a:effectLst/>
-                <a:latin typeface="Arial" panose="020B0604020202020204" pitchFamily="34" charset="0"/>
-              </a:rPr>
-              <a:t>Tested whether average revenues varied significantly across multiple genres</a:t>
-            </a:r>
-            <a:r>
-              <a:rPr kumimoji="0" lang="en-US" altLang="en-KE" sz="2000" b="0" i="0" u="none" strike="noStrike" cap="none" normalizeH="0" baseline="0" dirty="0">
-                <a:ln>
-                  <a:noFill/>
-                </a:ln>
-                <a:solidFill>
-                  <a:schemeClr val="tx1"/>
-                </a:solidFill>
-                <a:effectLst/>
-                <a:latin typeface="Arial" panose="020B0604020202020204" pitchFamily="34" charset="0"/>
-              </a:rPr>
-              <a:t> and also directors</a:t>
-            </a:r>
-            <a:endParaRPr kumimoji="0" lang="en-KE" altLang="en-KE" sz="2000" b="0" i="0" u="none" strike="noStrike" cap="none" normalizeH="0" baseline="0" dirty="0">
-              <a:ln>
-                <a:noFill/>
-              </a:ln>
-              <a:solidFill>
-                <a:schemeClr val="tx1"/>
-              </a:solidFill>
-              <a:effectLst/>
+            <a:pPr lvl="1"/>
+            <a:r>
+              <a:rPr lang="en-US" u="sng" dirty="0">
+                <a:latin typeface="Arial" panose="020B0604020202020204" pitchFamily="34" charset="0"/>
+                <a:cs typeface="Arial" panose="020B0604020202020204" pitchFamily="34" charset="0"/>
+              </a:rPr>
+              <a:t>The Numbers.</a:t>
+            </a:r>
+          </a:p>
+          <a:p>
+            <a:r>
+              <a:rPr lang="en-US" dirty="0">
+                <a:latin typeface="Arial" panose="020B0604020202020204" pitchFamily="34" charset="0"/>
+                <a:cs typeface="Arial" panose="020B0604020202020204" pitchFamily="34" charset="0"/>
+              </a:rPr>
+              <a:t>The data had various info on movies including: genres, directors, gross income, release dates, and popularity etc.</a:t>
+            </a:r>
+          </a:p>
+          <a:p>
+            <a:endParaRPr lang="en-US" dirty="0">
               <a:latin typeface="Arial" panose="020B0604020202020204" pitchFamily="34" charset="0"/>
-            </a:endParaRPr>
-          </a:p>
-          <a:p>
-            <a:pPr marL="457200" lvl="1" indent="0" eaLnBrk="0" fontAlgn="base" hangingPunct="0">
-              <a:lnSpc>
-                <a:spcPct val="100000"/>
-              </a:lnSpc>
-              <a:spcBef>
-                <a:spcPct val="0"/>
-              </a:spcBef>
-              <a:spcAft>
-                <a:spcPct val="0"/>
-              </a:spcAft>
-              <a:buFontTx/>
-              <a:buChar char="•"/>
-            </a:pPr>
-            <a:r>
-              <a:rPr kumimoji="0" lang="en-KE" altLang="en-KE" sz="2000" b="0" i="0" u="none" strike="noStrike" cap="none" normalizeH="0" baseline="0" dirty="0">
-                <a:ln>
-                  <a:noFill/>
-                </a:ln>
-                <a:solidFill>
-                  <a:schemeClr val="tx1"/>
-                </a:solidFill>
-                <a:effectLst/>
-                <a:latin typeface="Arial" panose="020B0604020202020204" pitchFamily="34" charset="0"/>
-              </a:rPr>
-              <a:t>Identified which genres stood out in performance</a:t>
-            </a:r>
-          </a:p>
-          <a:p>
-            <a:pPr marL="0" marR="0" lvl="0" indent="0" algn="l" defTabSz="914400" rtl="0" eaLnBrk="0" fontAlgn="base" latinLnBrk="0" hangingPunct="0">
-              <a:lnSpc>
-                <a:spcPct val="100000"/>
-              </a:lnSpc>
-              <a:spcBef>
-                <a:spcPct val="0"/>
-              </a:spcBef>
-              <a:spcAft>
-                <a:spcPct val="0"/>
-              </a:spcAft>
-              <a:buClrTx/>
-              <a:buSzTx/>
-              <a:buFontTx/>
-              <a:buChar char="•"/>
-              <a:tabLst/>
-            </a:pPr>
-            <a:r>
-              <a:rPr kumimoji="0" lang="en-KE" altLang="en-KE" sz="2000" b="1" i="0" u="none" strike="noStrike" cap="none" normalizeH="0" baseline="0" dirty="0">
-                <a:ln>
-                  <a:noFill/>
-                </a:ln>
-                <a:solidFill>
-                  <a:schemeClr val="tx1"/>
-                </a:solidFill>
-                <a:effectLst/>
-                <a:latin typeface="Arial" panose="020B0604020202020204" pitchFamily="34" charset="0"/>
-              </a:rPr>
-              <a:t>Chi-Square Test of Independence:</a:t>
-            </a:r>
-            <a:endParaRPr kumimoji="0" lang="en-KE" altLang="en-KE" sz="2000" b="0" i="0" u="none" strike="noStrike" cap="none" normalizeH="0" baseline="0" dirty="0">
-              <a:ln>
-                <a:noFill/>
-              </a:ln>
-              <a:solidFill>
-                <a:schemeClr val="tx1"/>
-              </a:solidFill>
-              <a:effectLst/>
-              <a:latin typeface="Arial" panose="020B0604020202020204" pitchFamily="34" charset="0"/>
-            </a:endParaRPr>
-          </a:p>
-          <a:p>
-            <a:pPr marL="457200" lvl="1" indent="0" eaLnBrk="0" fontAlgn="base" hangingPunct="0">
-              <a:lnSpc>
-                <a:spcPct val="100000"/>
-              </a:lnSpc>
-              <a:spcBef>
-                <a:spcPct val="0"/>
-              </a:spcBef>
-              <a:spcAft>
-                <a:spcPct val="0"/>
-              </a:spcAft>
-              <a:buFontTx/>
-              <a:buChar char="•"/>
-            </a:pPr>
-            <a:r>
-              <a:rPr kumimoji="0" lang="en-KE" altLang="en-KE" sz="2000" b="0" i="0" u="none" strike="noStrike" cap="none" normalizeH="0" baseline="0" dirty="0">
-                <a:ln>
-                  <a:noFill/>
-                </a:ln>
-                <a:solidFill>
-                  <a:schemeClr val="tx1"/>
-                </a:solidFill>
-                <a:effectLst/>
-                <a:latin typeface="Arial" panose="020B0604020202020204" pitchFamily="34" charset="0"/>
-              </a:rPr>
-              <a:t>Assessed whether categorical variables (genre and </a:t>
-            </a:r>
-            <a:r>
-              <a:rPr kumimoji="0" lang="en-US" altLang="en-KE" sz="2000" b="0" i="0" u="none" strike="noStrike" cap="none" normalizeH="0" baseline="0" dirty="0">
-                <a:ln>
-                  <a:noFill/>
-                </a:ln>
-                <a:solidFill>
-                  <a:schemeClr val="tx1"/>
-                </a:solidFill>
-                <a:effectLst/>
-                <a:latin typeface="Arial" panose="020B0604020202020204" pitchFamily="34" charset="0"/>
-              </a:rPr>
-              <a:t>release date</a:t>
-            </a:r>
-            <a:r>
-              <a:rPr kumimoji="0" lang="en-KE" altLang="en-KE" sz="2000" b="0" i="0" u="none" strike="noStrike" cap="none" normalizeH="0" baseline="0" dirty="0">
-                <a:ln>
-                  <a:noFill/>
-                </a:ln>
-                <a:solidFill>
-                  <a:schemeClr val="tx1"/>
-                </a:solidFill>
-                <a:effectLst/>
-                <a:latin typeface="Arial" panose="020B0604020202020204" pitchFamily="34" charset="0"/>
-              </a:rPr>
-              <a:t>) were related</a:t>
-            </a:r>
-          </a:p>
-          <a:p>
-            <a:pPr marL="457200" lvl="1" indent="0" eaLnBrk="0" fontAlgn="base" hangingPunct="0">
-              <a:lnSpc>
-                <a:spcPct val="100000"/>
-              </a:lnSpc>
-              <a:spcBef>
-                <a:spcPct val="0"/>
-              </a:spcBef>
-              <a:spcAft>
-                <a:spcPct val="0"/>
-              </a:spcAft>
-              <a:buFontTx/>
-              <a:buChar char="•"/>
-            </a:pPr>
-            <a:r>
-              <a:rPr kumimoji="0" lang="en-KE" altLang="en-KE" sz="2000" b="0" i="0" u="none" strike="noStrike" cap="none" normalizeH="0" baseline="0" dirty="0">
-                <a:ln>
-                  <a:noFill/>
-                </a:ln>
-                <a:solidFill>
-                  <a:schemeClr val="tx1"/>
-                </a:solidFill>
-                <a:effectLst/>
-                <a:latin typeface="Arial" panose="020B0604020202020204" pitchFamily="34" charset="0"/>
-              </a:rPr>
-              <a:t>Tested if the distribution of success was independent of genre</a:t>
-            </a:r>
-            <a:endParaRPr kumimoji="0" lang="en-US" altLang="en-KE" sz="2000" b="0" i="0" u="none" strike="noStrike" cap="none" normalizeH="0" baseline="0" dirty="0">
-              <a:ln>
-                <a:noFill/>
-              </a:ln>
-              <a:solidFill>
-                <a:schemeClr val="tx1"/>
-              </a:solidFill>
-              <a:effectLst/>
-              <a:latin typeface="Arial" panose="020B0604020202020204" pitchFamily="34" charset="0"/>
-            </a:endParaRPr>
-          </a:p>
-          <a:p>
-            <a:pPr marL="457200" lvl="1" indent="0" eaLnBrk="0" fontAlgn="base" hangingPunct="0">
-              <a:lnSpc>
-                <a:spcPct val="100000"/>
-              </a:lnSpc>
-              <a:spcBef>
-                <a:spcPct val="0"/>
-              </a:spcBef>
-              <a:spcAft>
-                <a:spcPct val="0"/>
-              </a:spcAft>
-              <a:buNone/>
-            </a:pPr>
-            <a:endParaRPr kumimoji="0" lang="en-US" altLang="en-KE" sz="2000" b="0" i="0" u="none" strike="noStrike" cap="none" normalizeH="0" baseline="0" dirty="0">
-              <a:ln>
-                <a:noFill/>
-              </a:ln>
-              <a:solidFill>
-                <a:schemeClr val="tx1"/>
-              </a:solidFill>
-              <a:effectLst/>
-              <a:latin typeface="Arial" panose="020B0604020202020204" pitchFamily="34" charset="0"/>
-            </a:endParaRPr>
-          </a:p>
-          <a:p>
-            <a:pPr marL="0" marR="0" lvl="0" indent="0" algn="l" defTabSz="914400" rtl="0" eaLnBrk="0" fontAlgn="base" latinLnBrk="0" hangingPunct="0">
-              <a:lnSpc>
-                <a:spcPct val="100000"/>
-              </a:lnSpc>
-              <a:spcBef>
-                <a:spcPct val="0"/>
-              </a:spcBef>
-              <a:spcAft>
-                <a:spcPct val="0"/>
-              </a:spcAft>
-              <a:buClrTx/>
-              <a:buSzTx/>
-              <a:buFontTx/>
-              <a:buChar char="•"/>
-              <a:tabLst/>
-            </a:pPr>
-            <a:r>
-              <a:rPr kumimoji="0" lang="en-KE" altLang="en-KE" sz="2000" b="1" i="0" u="none" strike="noStrike" cap="none" normalizeH="0" baseline="0" dirty="0">
-                <a:ln>
-                  <a:noFill/>
-                </a:ln>
-                <a:solidFill>
-                  <a:schemeClr val="tx1"/>
-                </a:solidFill>
-                <a:effectLst/>
-                <a:latin typeface="Arial" panose="020B0604020202020204" pitchFamily="34" charset="0"/>
-              </a:rPr>
-              <a:t>Tools Used:</a:t>
-            </a:r>
-            <a:endParaRPr kumimoji="0" lang="en-KE" altLang="en-KE" sz="2000" b="0" i="0" u="none" strike="noStrike" cap="none" normalizeH="0" baseline="0" dirty="0">
-              <a:ln>
-                <a:noFill/>
-              </a:ln>
-              <a:solidFill>
-                <a:schemeClr val="tx1"/>
-              </a:solidFill>
-              <a:effectLst/>
-              <a:latin typeface="Arial" panose="020B0604020202020204" pitchFamily="34" charset="0"/>
-            </a:endParaRPr>
-          </a:p>
-          <a:p>
-            <a:pPr marL="457200" lvl="1" indent="0" eaLnBrk="0" fontAlgn="base" hangingPunct="0">
-              <a:lnSpc>
-                <a:spcPct val="100000"/>
-              </a:lnSpc>
-              <a:spcBef>
-                <a:spcPct val="0"/>
-              </a:spcBef>
-              <a:spcAft>
-                <a:spcPct val="0"/>
-              </a:spcAft>
-              <a:buFontTx/>
-              <a:buChar char="•"/>
-            </a:pPr>
-            <a:r>
-              <a:rPr kumimoji="0" lang="en-KE" altLang="en-KE" sz="2000" b="0" i="0" u="none" strike="noStrike" cap="none" normalizeH="0" baseline="0" dirty="0">
-                <a:ln>
-                  <a:noFill/>
-                </a:ln>
-                <a:solidFill>
-                  <a:schemeClr val="tx1"/>
-                </a:solidFill>
-                <a:effectLst/>
-                <a:latin typeface="Arial" panose="020B0604020202020204" pitchFamily="34" charset="0"/>
-              </a:rPr>
-              <a:t>Python libraries: </a:t>
-            </a:r>
-            <a:r>
-              <a:rPr kumimoji="0" lang="en-KE" altLang="en-KE" sz="2000" b="0" i="0" u="none" strike="noStrike" cap="none" normalizeH="0" baseline="0" dirty="0">
-                <a:ln>
-                  <a:noFill/>
-                </a:ln>
-                <a:solidFill>
-                  <a:schemeClr val="tx1"/>
-                </a:solidFill>
-                <a:effectLst/>
-                <a:latin typeface="Arial Unicode MS"/>
-              </a:rPr>
-              <a:t>pandas</a:t>
-            </a:r>
-            <a:r>
-              <a:rPr kumimoji="0" lang="en-KE" altLang="en-KE" sz="2000" b="0" i="0" u="none" strike="noStrike" cap="none" normalizeH="0" baseline="0" dirty="0">
-                <a:ln>
-                  <a:noFill/>
-                </a:ln>
-                <a:solidFill>
-                  <a:schemeClr val="tx1"/>
-                </a:solidFill>
-                <a:effectLst/>
-              </a:rPr>
-              <a:t>, </a:t>
-            </a:r>
-            <a:r>
-              <a:rPr kumimoji="0" lang="en-KE" altLang="en-KE" sz="2000" b="0" i="0" u="none" strike="noStrike" cap="none" normalizeH="0" baseline="0" dirty="0" err="1">
-                <a:ln>
-                  <a:noFill/>
-                </a:ln>
-                <a:solidFill>
-                  <a:schemeClr val="tx1"/>
-                </a:solidFill>
-                <a:effectLst/>
-                <a:latin typeface="Arial Unicode MS"/>
-              </a:rPr>
-              <a:t>scipy.stats</a:t>
-            </a:r>
-            <a:r>
-              <a:rPr kumimoji="0" lang="en-KE" altLang="en-KE" sz="2000" b="0" i="0" u="none" strike="noStrike" cap="none" normalizeH="0" baseline="0" dirty="0">
-                <a:ln>
-                  <a:noFill/>
-                </a:ln>
-                <a:solidFill>
-                  <a:schemeClr val="tx1"/>
-                </a:solidFill>
-                <a:effectLst/>
-              </a:rPr>
-              <a:t>, </a:t>
-            </a:r>
-            <a:r>
-              <a:rPr kumimoji="0" lang="en-KE" altLang="en-KE" sz="2000" b="0" i="0" u="none" strike="noStrike" cap="none" normalizeH="0" baseline="0" dirty="0">
-                <a:ln>
-                  <a:noFill/>
-                </a:ln>
-                <a:solidFill>
-                  <a:schemeClr val="tx1"/>
-                </a:solidFill>
-                <a:effectLst/>
-                <a:latin typeface="Arial Unicode MS"/>
-              </a:rPr>
-              <a:t>matplotlib</a:t>
-            </a:r>
-            <a:r>
-              <a:rPr kumimoji="0" lang="en-KE" altLang="en-KE" sz="2000" b="0" i="0" u="none" strike="noStrike" cap="none" normalizeH="0" baseline="0" dirty="0">
-                <a:ln>
-                  <a:noFill/>
-                </a:ln>
-                <a:solidFill>
-                  <a:schemeClr val="tx1"/>
-                </a:solidFill>
-                <a:effectLst/>
-              </a:rPr>
-              <a:t>, and </a:t>
-            </a:r>
-            <a:r>
-              <a:rPr kumimoji="0" lang="en-KE" altLang="en-KE" sz="2000" b="0" i="0" u="none" strike="noStrike" cap="none" normalizeH="0" baseline="0" dirty="0">
-                <a:ln>
-                  <a:noFill/>
-                </a:ln>
-                <a:solidFill>
-                  <a:schemeClr val="tx1"/>
-                </a:solidFill>
-                <a:effectLst/>
-                <a:latin typeface="Arial Unicode MS"/>
-              </a:rPr>
-              <a:t>seaborn</a:t>
-            </a:r>
-            <a:endParaRPr kumimoji="0" lang="en-KE" altLang="en-KE" sz="2000" b="0" i="0" u="none" strike="noStrike" cap="none" normalizeH="0" baseline="0" dirty="0">
-              <a:ln>
-                <a:noFill/>
-              </a:ln>
-              <a:solidFill>
-                <a:schemeClr val="tx1"/>
-              </a:solidFill>
-              <a:effectLst/>
-            </a:endParaRPr>
-          </a:p>
-          <a:p>
-            <a:pPr marL="0" marR="0" lvl="0" indent="0" algn="l" defTabSz="914400" rtl="0" eaLnBrk="0" fontAlgn="base" latinLnBrk="0" hangingPunct="0">
-              <a:lnSpc>
-                <a:spcPct val="100000"/>
-              </a:lnSpc>
-              <a:spcBef>
-                <a:spcPct val="0"/>
-              </a:spcBef>
-              <a:spcAft>
-                <a:spcPct val="0"/>
-              </a:spcAft>
-              <a:buClrTx/>
-              <a:buSzTx/>
-              <a:buFontTx/>
-              <a:buNone/>
-              <a:tabLst/>
-            </a:pPr>
-            <a:endParaRPr kumimoji="0" lang="en-KE" altLang="en-KE" sz="1800" b="0" i="0" u="none" strike="noStrike" cap="none" normalizeH="0" baseline="0" dirty="0">
-              <a:ln>
-                <a:noFill/>
-              </a:ln>
-              <a:solidFill>
-                <a:schemeClr val="tx1"/>
-              </a:solidFill>
-              <a:effectLst/>
-              <a:latin typeface="Arial" panose="020B0604020202020204" pitchFamily="34" charset="0"/>
+              <a:cs typeface="Arial" panose="020B0604020202020204" pitchFamily="34" charset="0"/>
             </a:endParaRPr>
           </a:p>
         </p:txBody>
@@ -7653,7 +7162,7 @@
     </p:spTree>
     <p:extLst>
       <p:ext uri="{BB962C8B-B14F-4D97-AF65-F5344CB8AC3E}">
-        <p14:creationId xmlns:p14="http://schemas.microsoft.com/office/powerpoint/2010/main" val="3756511627"/>
+        <p14:creationId xmlns:p14="http://schemas.microsoft.com/office/powerpoint/2010/main" val="1298948916"/>
       </p:ext>
     </p:extLst>
   </p:cSld>
@@ -7685,7 +7194,7 @@
           <p:cNvPr id="2" name="Title 1">
             <a:extLst>
               <a:ext uri="{FF2B5EF4-FFF2-40B4-BE49-F238E27FC236}">
-                <a16:creationId xmlns:a16="http://schemas.microsoft.com/office/drawing/2014/main" id="{CB97C7AF-A0A3-4981-A9F8-60EE370E1C58}"/>
+                <a16:creationId xmlns:a16="http://schemas.microsoft.com/office/drawing/2014/main" id="{04EB44DD-79B3-4626-B11F-58E176E4D183}"/>
               </a:ext>
             </a:extLst>
           </p:cNvPr>
@@ -7696,29 +7205,112 @@
             <p:ph type="title"/>
           </p:nvPr>
         </p:nvSpPr>
-        <p:spPr>
-          <a:xfrm>
-            <a:off x="960699" y="2664886"/>
-            <a:ext cx="10324618" cy="1325563"/>
-          </a:xfrm>
-        </p:spPr>
+        <p:spPr/>
         <p:txBody>
           <a:bodyPr/>
           <a:lstStyle/>
           <a:p>
-            <a:pPr algn="ctr"/>
             <a:r>
               <a:rPr lang="en-US" dirty="0"/>
-              <a:t>RESULTS</a:t>
+              <a:t>OBJECTIVES</a:t>
             </a:r>
             <a:endParaRPr lang="en-KE" dirty="0"/>
+          </a:p>
+        </p:txBody>
+      </p:sp>
+      <p:sp>
+        <p:nvSpPr>
+          <p:cNvPr id="3" name="Content Placeholder 2">
+            <a:extLst>
+              <a:ext uri="{FF2B5EF4-FFF2-40B4-BE49-F238E27FC236}">
+                <a16:creationId xmlns:a16="http://schemas.microsoft.com/office/drawing/2014/main" id="{63014B44-1B6F-4237-BBBB-880B6CAABF30}"/>
+              </a:ext>
+            </a:extLst>
+          </p:cNvPr>
+          <p:cNvSpPr>
+            <a:spLocks noGrp="1"/>
+          </p:cNvSpPr>
+          <p:nvPr>
+            <p:ph idx="1"/>
+          </p:nvPr>
+        </p:nvSpPr>
+        <p:spPr/>
+        <p:txBody>
+          <a:bodyPr>
+            <a:normAutofit/>
+          </a:bodyPr>
+          <a:lstStyle/>
+          <a:p>
+            <a:r>
+              <a:rPr lang="en-US" dirty="0">
+                <a:latin typeface="Arial" panose="020B0604020202020204" pitchFamily="34" charset="0"/>
+                <a:cs typeface="Arial" panose="020B0604020202020204" pitchFamily="34" charset="0"/>
+              </a:rPr>
+              <a:t>This project main objectives include:</a:t>
+            </a:r>
+          </a:p>
+          <a:p>
+            <a:pPr lvl="1"/>
+            <a:r>
+              <a:rPr lang="en-US" dirty="0">
+                <a:latin typeface="Arial" panose="020B0604020202020204" pitchFamily="34" charset="0"/>
+                <a:cs typeface="Arial" panose="020B0604020202020204" pitchFamily="34" charset="0"/>
+              </a:rPr>
+              <a:t>Perform exploratory data analysis (EDA) to identify trends and patterns in the film industry.</a:t>
+            </a:r>
+          </a:p>
+          <a:p>
+            <a:pPr lvl="1"/>
+            <a:r>
+              <a:rPr lang="en-US" dirty="0">
+                <a:latin typeface="Arial" panose="020B0604020202020204" pitchFamily="34" charset="0"/>
+                <a:cs typeface="Arial" panose="020B0604020202020204" pitchFamily="34" charset="0"/>
+              </a:rPr>
+              <a:t>Visualize the film data .</a:t>
+            </a:r>
+          </a:p>
+          <a:p>
+            <a:pPr lvl="1"/>
+            <a:r>
+              <a:rPr lang="en-US" dirty="0">
+                <a:latin typeface="Arial" panose="020B0604020202020204" pitchFamily="34" charset="0"/>
+                <a:cs typeface="Arial" panose="020B0604020202020204" pitchFamily="34" charset="0"/>
+              </a:rPr>
+              <a:t>Highlight key factors contributing to the financial and critical success of films.</a:t>
+            </a:r>
+          </a:p>
+          <a:p>
+            <a:pPr lvl="1"/>
+            <a:r>
+              <a:rPr lang="en-US" dirty="0">
+                <a:latin typeface="Arial" panose="020B0604020202020204" pitchFamily="34" charset="0"/>
+                <a:cs typeface="Arial" panose="020B0604020202020204" pitchFamily="34" charset="0"/>
+              </a:rPr>
+              <a:t>Provide data-driven recommendations to ensure a safe and profitable entry into the industry.</a:t>
+            </a:r>
+            <a:br>
+              <a:rPr lang="en-US" dirty="0">
+                <a:latin typeface="Arial" panose="020B0604020202020204" pitchFamily="34" charset="0"/>
+                <a:cs typeface="Arial" panose="020B0604020202020204" pitchFamily="34" charset="0"/>
+              </a:rPr>
+            </a:br>
+            <a:endParaRPr lang="en-US" dirty="0">
+              <a:latin typeface="Arial" panose="020B0604020202020204" pitchFamily="34" charset="0"/>
+              <a:cs typeface="Arial" panose="020B0604020202020204" pitchFamily="34" charset="0"/>
+            </a:endParaRPr>
+          </a:p>
+          <a:p>
+            <a:endParaRPr lang="en-KE" dirty="0">
+              <a:latin typeface="Arial" panose="020B0604020202020204" pitchFamily="34" charset="0"/>
+              <a:cs typeface="Arial" panose="020B0604020202020204" pitchFamily="34" charset="0"/>
+            </a:endParaRPr>
           </a:p>
         </p:txBody>
       </p:sp>
     </p:spTree>
     <p:extLst>
       <p:ext uri="{BB962C8B-B14F-4D97-AF65-F5344CB8AC3E}">
-        <p14:creationId xmlns:p14="http://schemas.microsoft.com/office/powerpoint/2010/main" val="1494599635"/>
+        <p14:creationId xmlns:p14="http://schemas.microsoft.com/office/powerpoint/2010/main" val="367316325"/>
       </p:ext>
     </p:extLst>
   </p:cSld>
@@ -7750,7 +7342,7 @@
           <p:cNvPr id="2" name="Title 1">
             <a:extLst>
               <a:ext uri="{FF2B5EF4-FFF2-40B4-BE49-F238E27FC236}">
-                <a16:creationId xmlns:a16="http://schemas.microsoft.com/office/drawing/2014/main" id="{F6D5200B-0E24-4A62-84AE-50DBF6928113}"/>
+                <a16:creationId xmlns:a16="http://schemas.microsoft.com/office/drawing/2014/main" id="{CB97C7AF-A0A3-4981-A9F8-60EE370E1C58}"/>
               </a:ext>
             </a:extLst>
           </p:cNvPr>
@@ -7763,71 +7355,18 @@
         </p:nvSpPr>
         <p:spPr>
           <a:xfrm>
-            <a:off x="2611808" y="669160"/>
-            <a:ext cx="7958331" cy="1286962"/>
+            <a:off x="960699" y="2664886"/>
+            <a:ext cx="10324618" cy="1325563"/>
           </a:xfrm>
         </p:spPr>
         <p:txBody>
-          <a:bodyPr>
-            <a:noAutofit/>
-          </a:bodyPr>
-          <a:lstStyle/>
-          <a:p>
-            <a:br>
-              <a:rPr lang="en-US" sz="4000" dirty="0"/>
-            </a:br>
-            <a:r>
-              <a:rPr lang="en-US" sz="4000" dirty="0"/>
-              <a:t>STUDIO VS BOX OFFICE.</a:t>
-            </a:r>
-            <a:br>
-              <a:rPr lang="en-US" sz="4000" dirty="0"/>
-            </a:br>
-            <a:endParaRPr lang="en-KE" sz="4000" dirty="0"/>
-          </a:p>
-        </p:txBody>
-      </p:sp>
-      <p:sp>
-        <p:nvSpPr>
-          <p:cNvPr id="3" name="Content Placeholder 2">
-            <a:extLst>
-              <a:ext uri="{FF2B5EF4-FFF2-40B4-BE49-F238E27FC236}">
-                <a16:creationId xmlns:a16="http://schemas.microsoft.com/office/drawing/2014/main" id="{91B1817F-CB3B-48FB-A86D-699420B9D4B9}"/>
-              </a:ext>
-            </a:extLst>
-          </p:cNvPr>
-          <p:cNvSpPr>
-            <a:spLocks noGrp="1"/>
-          </p:cNvSpPr>
-          <p:nvPr>
-            <p:ph idx="1"/>
-          </p:nvPr>
-        </p:nvSpPr>
-        <p:spPr>
-          <a:xfrm>
-            <a:off x="1006996" y="2291789"/>
-            <a:ext cx="10706583" cy="3796496"/>
-          </a:xfrm>
-        </p:spPr>
-        <p:txBody>
           <a:bodyPr/>
           <a:lstStyle/>
           <a:p>
+            <a:pPr algn="ctr"/>
             <a:r>
               <a:rPr lang="en-US" dirty="0"/>
-              <a:t>We began first with looking into the studio vs box office grossing incomes.</a:t>
-            </a:r>
-          </a:p>
-          <a:p>
-            <a:r>
-              <a:rPr lang="en-US" dirty="0"/>
-              <a:t>This comparison would show us if there is a significant difference in performance of movies according to the studio which produced it showing that there are actual factors that lead to high performance of movies.</a:t>
-            </a:r>
-          </a:p>
-          <a:p>
-            <a:r>
-              <a:rPr lang="en-US" dirty="0"/>
-              <a:t>We began first with top 5 studios according to the box office performance</a:t>
+              <a:t>RESULTS</a:t>
             </a:r>
             <a:endParaRPr lang="en-KE" dirty="0"/>
           </a:p>
@@ -7836,7 +7375,7 @@
     </p:spTree>
     <p:extLst>
       <p:ext uri="{BB962C8B-B14F-4D97-AF65-F5344CB8AC3E}">
-        <p14:creationId xmlns:p14="http://schemas.microsoft.com/office/powerpoint/2010/main" val="2536769592"/>
+        <p14:creationId xmlns:p14="http://schemas.microsoft.com/office/powerpoint/2010/main" val="1494599635"/>
       </p:ext>
     </p:extLst>
   </p:cSld>
@@ -7863,162 +7402,90 @@
           <a:chExt cx="0" cy="0"/>
         </a:xfrm>
       </p:grpSpPr>
-      <p:pic>
-        <p:nvPicPr>
-          <p:cNvPr id="5" name="Content Placeholder 4">
+      <p:sp>
+        <p:nvSpPr>
+          <p:cNvPr id="2" name="Title 1">
             <a:extLst>
               <a:ext uri="{FF2B5EF4-FFF2-40B4-BE49-F238E27FC236}">
-                <a16:creationId xmlns:a16="http://schemas.microsoft.com/office/drawing/2014/main" id="{233BF73F-147E-478E-B35D-AACF87ECBA2E}"/>
+                <a16:creationId xmlns:a16="http://schemas.microsoft.com/office/drawing/2014/main" id="{F6D5200B-0E24-4A62-84AE-50DBF6928113}"/>
               </a:ext>
             </a:extLst>
           </p:cNvPr>
-          <p:cNvPicPr>
-            <a:picLocks noGrp="1" noChangeAspect="1"/>
-          </p:cNvPicPr>
-          <p:nvPr>
-            <p:ph idx="1"/>
-          </p:nvPr>
-        </p:nvPicPr>
-        <p:blipFill>
-          <a:blip r:embed="rId2">
-            <a:extLst>
-              <a:ext uri="{28A0092B-C50C-407E-A947-70E740481C1C}">
-                <a14:useLocalDpi xmlns:a14="http://schemas.microsoft.com/office/drawing/2010/main" val="0"/>
-              </a:ext>
-            </a:extLst>
-          </a:blip>
-          <a:stretch>
-            <a:fillRect/>
-          </a:stretch>
-        </p:blipFill>
+          <p:cNvSpPr>
+            <a:spLocks noGrp="1"/>
+          </p:cNvSpPr>
+          <p:nvPr>
+            <p:ph type="title"/>
+          </p:nvPr>
+        </p:nvSpPr>
         <p:spPr>
           <a:xfrm>
-            <a:off x="-76548" y="290513"/>
-            <a:ext cx="6706682" cy="5785168"/>
+            <a:off x="2611808" y="669160"/>
+            <a:ext cx="7958331" cy="1286962"/>
           </a:xfrm>
         </p:spPr>
-      </p:pic>
-      <p:sp>
-        <p:nvSpPr>
-          <p:cNvPr id="7" name="TextBox 6">
+        <p:txBody>
+          <a:bodyPr>
+            <a:noAutofit/>
+          </a:bodyPr>
+          <a:lstStyle/>
+          <a:p>
+            <a:br>
+              <a:rPr lang="en-US" sz="4000" dirty="0"/>
+            </a:br>
+            <a:r>
+              <a:rPr lang="en-US" sz="4000" dirty="0"/>
+              <a:t>STUDIO VS BOX OFFICE.</a:t>
+            </a:r>
+            <a:br>
+              <a:rPr lang="en-US" sz="4000" dirty="0"/>
+            </a:br>
+            <a:endParaRPr lang="en-KE" sz="4000" dirty="0"/>
+          </a:p>
+        </p:txBody>
+      </p:sp>
+      <p:sp>
+        <p:nvSpPr>
+          <p:cNvPr id="3" name="Content Placeholder 2">
             <a:extLst>
               <a:ext uri="{FF2B5EF4-FFF2-40B4-BE49-F238E27FC236}">
-                <a16:creationId xmlns:a16="http://schemas.microsoft.com/office/drawing/2014/main" id="{EFDD1252-83EA-47C3-A4C0-65DEF78DCDD2}"/>
+                <a16:creationId xmlns:a16="http://schemas.microsoft.com/office/drawing/2014/main" id="{91B1817F-CB3B-48FB-A86D-699420B9D4B9}"/>
               </a:ext>
             </a:extLst>
           </p:cNvPr>
-          <p:cNvSpPr txBox="1"/>
-          <p:nvPr/>
+          <p:cNvSpPr>
+            <a:spLocks noGrp="1"/>
+          </p:cNvSpPr>
+          <p:nvPr>
+            <p:ph idx="1"/>
+          </p:nvPr>
         </p:nvSpPr>
         <p:spPr>
           <a:xfrm>
-            <a:off x="6752590" y="671125"/>
-            <a:ext cx="5317490" cy="6463308"/>
+            <a:off x="1006996" y="2291789"/>
+            <a:ext cx="10706583" cy="3796496"/>
           </a:xfrm>
-          <a:prstGeom prst="rect">
-            <a:avLst/>
-          </a:prstGeom>
-          <a:noFill/>
-          <a:ln>
-            <a:noFill/>
-            <a:prstDash val="solid"/>
-          </a:ln>
         </p:spPr>
         <p:txBody>
-          <a:bodyPr wrap="square" rtlCol="0">
-            <a:spAutoFit/>
-          </a:bodyPr>
-          <a:lstStyle/>
-          <a:p>
-            <a:pPr marL="285750" indent="-285750">
-              <a:buFont typeface="Arial" panose="020B0604020202020204" pitchFamily="34" charset="0"/>
-              <a:buChar char="•"/>
-            </a:pPr>
+          <a:bodyPr/>
+          <a:lstStyle/>
+          <a:p>
             <a:r>
               <a:rPr lang="en-US" dirty="0"/>
-              <a:t>The top 5 list gave us the following studios as seen on the boxplots shown on the graph on the right.</a:t>
-            </a:r>
-          </a:p>
-          <a:p>
-            <a:pPr marL="285750" indent="-285750">
-              <a:buFont typeface="Arial" panose="020B0604020202020204" pitchFamily="34" charset="0"/>
-              <a:buChar char="•"/>
-            </a:pPr>
+              <a:t>We began first with looking into the studio vs box office grossing incomes.</a:t>
+            </a:r>
+          </a:p>
+          <a:p>
             <a:r>
               <a:rPr lang="en-US" dirty="0"/>
-              <a:t>As seen on the graph we can see that there is a visible difference in the distribution of the box office earnings of each of the top 5 studios according to no of movies produced.</a:t>
-            </a:r>
-          </a:p>
-          <a:p>
-            <a:endParaRPr lang="en-US" dirty="0"/>
-          </a:p>
-          <a:p>
-            <a:pPr marL="285750" indent="-285750">
-              <a:buFont typeface="Arial" panose="020B0604020202020204" pitchFamily="34" charset="0"/>
-              <a:buChar char="•"/>
-            </a:pPr>
+              <a:t>This comparison would show us if there is a significant difference in performance of movies according to the studio which produced it showing that there are actual factors that lead to high performance of movies.</a:t>
+            </a:r>
+          </a:p>
+          <a:p>
             <a:r>
               <a:rPr lang="en-US" dirty="0"/>
-              <a:t>This then led to a </a:t>
-            </a:r>
-            <a:r>
-              <a:rPr lang="en-US" dirty="0" err="1"/>
-              <a:t>Anova</a:t>
-            </a:r>
-            <a:r>
-              <a:rPr lang="en-US" dirty="0"/>
-              <a:t> test to check if there was a significance, with the hypothesis:</a:t>
-            </a:r>
-          </a:p>
-          <a:p>
-            <a:pPr marL="742950" lvl="1" indent="-285750">
-              <a:buFont typeface="Arial" panose="020B0604020202020204" pitchFamily="34" charset="0"/>
-              <a:buChar char="•"/>
-            </a:pPr>
-            <a:r>
-              <a:rPr lang="en-US" b="1" dirty="0"/>
-              <a:t>Null Hypothesis (H₀):</a:t>
-            </a:r>
-          </a:p>
-          <a:p>
-            <a:r>
-              <a:rPr lang="en-US" dirty="0"/>
-              <a:t>There is no significant difference in the average box office performance between the studios.</a:t>
-            </a:r>
-          </a:p>
-          <a:p>
-            <a:pPr marL="742950" lvl="1" indent="-285750">
-              <a:buFont typeface="Arial" panose="020B0604020202020204" pitchFamily="34" charset="0"/>
-              <a:buChar char="•"/>
-            </a:pPr>
-            <a:r>
-              <a:rPr lang="en-US" b="1" dirty="0"/>
-              <a:t>Alternative Hypothesis (H₁):</a:t>
-            </a:r>
-          </a:p>
-          <a:p>
-            <a:r>
-              <a:rPr lang="en-US" dirty="0"/>
-              <a:t>There is a significant difference in the average box office performance between at least two studios.</a:t>
-            </a:r>
-          </a:p>
-          <a:p>
-            <a:endParaRPr lang="en-US" dirty="0"/>
-          </a:p>
-          <a:p>
-            <a:pPr marL="285750" indent="-285750">
-              <a:buFont typeface="Arial" panose="020B0604020202020204" pitchFamily="34" charset="0"/>
-              <a:buChar char="•"/>
-            </a:pPr>
-            <a:r>
-              <a:rPr lang="en-US" dirty="0"/>
-              <a:t>This suggests that the studio does play a role in determining box office success, and there is a meaningful difference in how the studios perform.</a:t>
-            </a:r>
-          </a:p>
-          <a:p>
-            <a:endParaRPr lang="en-US" dirty="0"/>
-          </a:p>
-          <a:p>
+              <a:t>We began first with top 5 studios according to the box office performance</a:t>
+            </a:r>
             <a:endParaRPr lang="en-KE" dirty="0"/>
           </a:p>
         </p:txBody>
@@ -8026,7 +7493,7 @@
     </p:spTree>
     <p:extLst>
       <p:ext uri="{BB962C8B-B14F-4D97-AF65-F5344CB8AC3E}">
-        <p14:creationId xmlns:p14="http://schemas.microsoft.com/office/powerpoint/2010/main" val="2188061256"/>
+        <p14:creationId xmlns:p14="http://schemas.microsoft.com/office/powerpoint/2010/main" val="2536769592"/>
       </p:ext>
     </p:extLst>
   </p:cSld>
@@ -8053,152 +7520,122 @@
           <a:chExt cx="0" cy="0"/>
         </a:xfrm>
       </p:grpSpPr>
-      <p:sp>
-        <p:nvSpPr>
-          <p:cNvPr id="3" name="Content Placeholder 2">
+      <p:pic>
+        <p:nvPicPr>
+          <p:cNvPr id="4" name="Content Placeholder 4">
             <a:extLst>
               <a:ext uri="{FF2B5EF4-FFF2-40B4-BE49-F238E27FC236}">
-                <a16:creationId xmlns:a16="http://schemas.microsoft.com/office/drawing/2014/main" id="{8EBACC88-DEA5-405D-BC59-082864F9EE39}"/>
+                <a16:creationId xmlns:a16="http://schemas.microsoft.com/office/drawing/2014/main" id="{66E88A01-D20D-410F-B889-AC073A6A57E0}"/>
               </a:ext>
             </a:extLst>
           </p:cNvPr>
-          <p:cNvSpPr>
-            <a:spLocks noGrp="1"/>
-          </p:cNvSpPr>
+          <p:cNvPicPr>
+            <a:picLocks noGrp="1" noChangeAspect="1"/>
+          </p:cNvPicPr>
           <p:nvPr>
             <p:ph idx="1"/>
           </p:nvPr>
-        </p:nvSpPr>
+        </p:nvPicPr>
+        <p:blipFill>
+          <a:blip r:embed="rId2">
+            <a:extLst>
+              <a:ext uri="{28A0092B-C50C-407E-A947-70E740481C1C}">
+                <a14:useLocalDpi xmlns:a14="http://schemas.microsoft.com/office/drawing/2010/main" val="0"/>
+              </a:ext>
+            </a:extLst>
+          </a:blip>
+          <a:stretch>
+            <a:fillRect/>
+          </a:stretch>
+        </p:blipFill>
         <p:spPr>
           <a:xfrm>
-            <a:off x="902825" y="0"/>
-            <a:ext cx="10440365" cy="6858000"/>
+            <a:off x="84842" y="301658"/>
+            <a:ext cx="7057922" cy="4477731"/>
           </a:xfrm>
         </p:spPr>
-        <p:txBody>
-          <a:bodyPr>
-            <a:noAutofit/>
+      </p:pic>
+      <p:sp>
+        <p:nvSpPr>
+          <p:cNvPr id="5" name="TextBox 4">
+            <a:extLst>
+              <a:ext uri="{FF2B5EF4-FFF2-40B4-BE49-F238E27FC236}">
+                <a16:creationId xmlns:a16="http://schemas.microsoft.com/office/drawing/2014/main" id="{500CEF6C-D32A-4F8E-A475-684092D19253}"/>
+              </a:ext>
+            </a:extLst>
+          </p:cNvPr>
+          <p:cNvSpPr txBox="1"/>
+          <p:nvPr/>
+        </p:nvSpPr>
+        <p:spPr>
+          <a:xfrm>
+            <a:off x="7142764" y="2308923"/>
+            <a:ext cx="4964394" cy="3477875"/>
+          </a:xfrm>
+          <a:prstGeom prst="rect">
+            <a:avLst/>
+          </a:prstGeom>
+          <a:noFill/>
+        </p:spPr>
+        <p:txBody>
+          <a:bodyPr wrap="square" rtlCol="0">
+            <a:spAutoFit/>
           </a:bodyPr>
           <a:lstStyle/>
           <a:p>
-            <a:pPr marL="0" indent="0">
-              <a:buNone/>
+            <a:pPr marL="285750" indent="-285750">
+              <a:buFont typeface="Arial" panose="020B0604020202020204" pitchFamily="34" charset="0"/>
+              <a:buChar char="•"/>
             </a:pPr>
             <a:r>
-              <a:rPr lang="en-US" sz="1800" dirty="0"/>
-              <a:t>The output of the </a:t>
-            </a:r>
-            <a:r>
-              <a:rPr lang="en-US" sz="1800" b="1" dirty="0"/>
-              <a:t>ANOVA test</a:t>
-            </a:r>
-            <a:r>
-              <a:rPr lang="en-US" sz="1800" dirty="0"/>
-              <a:t> was as follows:</a:t>
-            </a:r>
-          </a:p>
-          <a:p>
-            <a:r>
-              <a:rPr lang="en-US" sz="1800" b="1" dirty="0"/>
-              <a:t>F-statistic: 136.53</a:t>
-            </a:r>
-          </a:p>
-          <a:p>
-            <a:pPr lvl="1"/>
-            <a:r>
-              <a:rPr lang="en-US" dirty="0"/>
-              <a:t>Indicates a large difference between the means of the groups (i.e., the studios) relative to the variation within each group. This suggests that </a:t>
-            </a:r>
-            <a:r>
-              <a:rPr lang="en-US" b="1" dirty="0"/>
-              <a:t>the box office performance between the studios is highly variable</a:t>
-            </a:r>
-            <a:r>
-              <a:rPr lang="en-US" dirty="0"/>
-              <a:t> and that the studio factor plays a significant role in determining box office success.</a:t>
-            </a:r>
-          </a:p>
-          <a:p>
-            <a:r>
-              <a:rPr lang="en-US" sz="1800" b="1" dirty="0"/>
-              <a:t>P-value: 0.0</a:t>
-            </a:r>
-          </a:p>
-          <a:p>
-            <a:pPr lvl="1"/>
-            <a:r>
-              <a:rPr lang="en-US" dirty="0"/>
-              <a:t>A </a:t>
-            </a:r>
-            <a:r>
-              <a:rPr lang="en-US" b="1" dirty="0"/>
-              <a:t>p-value of 0.0 </a:t>
-            </a:r>
-            <a:r>
-              <a:rPr lang="en-US" dirty="0"/>
-              <a:t>indicates </a:t>
-            </a:r>
-            <a:r>
-              <a:rPr lang="en-US" b="1" dirty="0"/>
-              <a:t>extremely strong evidence against the null hypothesis confirms that there is a statistically significant difference</a:t>
-            </a:r>
-            <a:r>
-              <a:rPr lang="en-US" dirty="0"/>
-              <a:t> in box office earnings across the different studios The null hypothesis in this case is that there is no difference in box office performance between the studios.</a:t>
-            </a:r>
-          </a:p>
-          <a:p>
-            <a:r>
-              <a:rPr kumimoji="0" lang="en-KE" altLang="en-KE" sz="1800" b="1" i="0" u="none" strike="noStrike" cap="none" normalizeH="0" baseline="0" dirty="0">
-                <a:ln>
-                  <a:noFill/>
-                </a:ln>
-                <a:solidFill>
-                  <a:schemeClr val="tx1"/>
-                </a:solidFill>
-                <a:effectLst/>
-                <a:latin typeface="Arial" panose="020B0604020202020204" pitchFamily="34" charset="0"/>
-              </a:rPr>
-              <a:t>Conclusion</a:t>
-            </a:r>
-            <a:endParaRPr lang="en-US" altLang="en-KE" sz="1800" dirty="0">
+              <a:rPr lang="en-US" sz="2000" dirty="0">
+                <a:latin typeface="Arial" panose="020B0604020202020204" pitchFamily="34" charset="0"/>
+                <a:cs typeface="Arial" panose="020B0604020202020204" pitchFamily="34" charset="0"/>
+              </a:rPr>
+              <a:t>The top 5 list gave us the following studios as seen on the boxplots shown on the graph on the right.</a:t>
+            </a:r>
+          </a:p>
+          <a:p>
+            <a:endParaRPr lang="en-US" sz="2000" dirty="0">
               <a:latin typeface="Arial" panose="020B0604020202020204" pitchFamily="34" charset="0"/>
+              <a:cs typeface="Arial" panose="020B0604020202020204" pitchFamily="34" charset="0"/>
             </a:endParaRPr>
           </a:p>
           <a:p>
-            <a:pPr lvl="1"/>
-            <a:r>
-              <a:rPr kumimoji="0" lang="en-KE" altLang="en-KE" b="0" i="0" u="none" strike="noStrike" cap="none" normalizeH="0" baseline="0" dirty="0">
-                <a:ln>
-                  <a:noFill/>
-                </a:ln>
-                <a:solidFill>
-                  <a:schemeClr val="tx1"/>
-                </a:solidFill>
-                <a:effectLst/>
-                <a:latin typeface="Arial" panose="020B0604020202020204" pitchFamily="34" charset="0"/>
-              </a:rPr>
-              <a:t>There is a significant difference in box office performance between the studios. This means that some studios are performing significantly better than others at the box office.</a:t>
-            </a:r>
-          </a:p>
-          <a:p>
-            <a:pPr lvl="1"/>
-            <a:r>
-              <a:rPr lang="en-KE" altLang="en-KE" dirty="0">
-                <a:latin typeface="Arial" panose="020B0604020202020204" pitchFamily="34" charset="0"/>
-              </a:rPr>
-              <a:t>The studio behind a movie seems to play an important role in its box office success. Therefore, the studio factor is a major determinant of a film's financial performance.</a:t>
-            </a:r>
-          </a:p>
-          <a:p>
-            <a:endParaRPr lang="en-KE" sz="1800" dirty="0"/>
+            <a:pPr marL="285750" indent="-285750">
+              <a:buFont typeface="Arial" panose="020B0604020202020204" pitchFamily="34" charset="0"/>
+              <a:buChar char="•"/>
+            </a:pPr>
+            <a:r>
+              <a:rPr lang="en-US" sz="2000" dirty="0">
+                <a:latin typeface="Arial" panose="020B0604020202020204" pitchFamily="34" charset="0"/>
+                <a:cs typeface="Arial" panose="020B0604020202020204" pitchFamily="34" charset="0"/>
+              </a:rPr>
+              <a:t>We can see that there is a visible difference in the distribution of the box office earnings of each of the top 5 studios according to no of movies produced.</a:t>
+            </a:r>
+          </a:p>
+          <a:p>
+            <a:pPr marL="285750" indent="-285750">
+              <a:buFont typeface="Arial" panose="020B0604020202020204" pitchFamily="34" charset="0"/>
+              <a:buChar char="•"/>
+            </a:pPr>
+            <a:endParaRPr lang="en-US" sz="2000" dirty="0">
+              <a:latin typeface="Arial" panose="020B0604020202020204" pitchFamily="34" charset="0"/>
+              <a:cs typeface="Arial" panose="020B0604020202020204" pitchFamily="34" charset="0"/>
+            </a:endParaRPr>
+          </a:p>
+          <a:p>
+            <a:endParaRPr lang="en-KE" sz="2000" dirty="0">
+              <a:latin typeface="Arial" panose="020B0604020202020204" pitchFamily="34" charset="0"/>
+              <a:cs typeface="Arial" panose="020B0604020202020204" pitchFamily="34" charset="0"/>
+            </a:endParaRPr>
           </a:p>
         </p:txBody>
       </p:sp>
     </p:spTree>
     <p:extLst>
       <p:ext uri="{BB962C8B-B14F-4D97-AF65-F5344CB8AC3E}">
-        <p14:creationId xmlns:p14="http://schemas.microsoft.com/office/powerpoint/2010/main" val="753180281"/>
+        <p14:creationId xmlns:p14="http://schemas.microsoft.com/office/powerpoint/2010/main" val="344165834"/>
       </p:ext>
     </p:extLst>
   </p:cSld>

</xml_diff>